<commit_message>
Updated upto branches creation and deletion
</commit_message>
<xml_diff>
--- a/Crash course on git and github.pptx
+++ b/Crash course on git and github.pptx
@@ -37,6 +37,21 @@
     <p:sldId id="286" r:id="rId31"/>
     <p:sldId id="287" r:id="rId32"/>
     <p:sldId id="288" r:id="rId33"/>
+    <p:sldId id="290" r:id="rId34"/>
+    <p:sldId id="292" r:id="rId35"/>
+    <p:sldId id="293" r:id="rId36"/>
+    <p:sldId id="294" r:id="rId37"/>
+    <p:sldId id="295" r:id="rId38"/>
+    <p:sldId id="296" r:id="rId39"/>
+    <p:sldId id="297" r:id="rId40"/>
+    <p:sldId id="298" r:id="rId41"/>
+    <p:sldId id="299" r:id="rId42"/>
+    <p:sldId id="300" r:id="rId43"/>
+    <p:sldId id="301" r:id="rId44"/>
+    <p:sldId id="302" r:id="rId45"/>
+    <p:sldId id="303" r:id="rId46"/>
+    <p:sldId id="304" r:id="rId47"/>
+    <p:sldId id="305" r:id="rId48"/>
   </p:sldIdLst>
   <p:sldSz cx="12192000" cy="6858000"/>
   <p:notesSz cx="6858000" cy="9144000"/>
@@ -172,6 +187,21 @@
             <p14:sldId id="286"/>
             <p14:sldId id="287"/>
             <p14:sldId id="288"/>
+            <p14:sldId id="290"/>
+            <p14:sldId id="292"/>
+            <p14:sldId id="293"/>
+            <p14:sldId id="294"/>
+            <p14:sldId id="295"/>
+            <p14:sldId id="296"/>
+            <p14:sldId id="297"/>
+            <p14:sldId id="298"/>
+            <p14:sldId id="299"/>
+            <p14:sldId id="300"/>
+            <p14:sldId id="301"/>
+            <p14:sldId id="302"/>
+            <p14:sldId id="303"/>
+            <p14:sldId id="304"/>
+            <p14:sldId id="305"/>
           </p14:sldIdLst>
         </p14:section>
       </p14:sectionLst>
@@ -409,7 +439,7 @@
           <a:p>
             <a:fld id="{5AA8B0B3-855D-4491-B631-C6E068ADA4B8}" type="datetimeFigureOut">
               <a:rPr lang="en-US" smtClean="0"/>
-              <a:t>1/7/2020</a:t>
+              <a:t>1/8/2020</a:t>
             </a:fld>
             <a:endParaRPr lang="en-US"/>
           </a:p>
@@ -617,7 +647,7 @@
           <a:p>
             <a:fld id="{5AA8B0B3-855D-4491-B631-C6E068ADA4B8}" type="datetimeFigureOut">
               <a:rPr lang="en-US" smtClean="0"/>
-              <a:t>1/7/2020</a:t>
+              <a:t>1/8/2020</a:t>
             </a:fld>
             <a:endParaRPr lang="en-US"/>
           </a:p>
@@ -873,7 +903,7 @@
           <a:p>
             <a:fld id="{5AA8B0B3-855D-4491-B631-C6E068ADA4B8}" type="datetimeFigureOut">
               <a:rPr lang="en-US" smtClean="0"/>
-              <a:t>1/7/2020</a:t>
+              <a:t>1/8/2020</a:t>
             </a:fld>
             <a:endParaRPr lang="en-US"/>
           </a:p>
@@ -1047,7 +1077,7 @@
           <a:p>
             <a:fld id="{5AA8B0B3-855D-4491-B631-C6E068ADA4B8}" type="datetimeFigureOut">
               <a:rPr lang="en-US" smtClean="0"/>
-              <a:t>1/7/2020</a:t>
+              <a:t>1/8/2020</a:t>
             </a:fld>
             <a:endParaRPr lang="en-US"/>
           </a:p>
@@ -1390,7 +1420,7 @@
           <a:p>
             <a:fld id="{5AA8B0B3-855D-4491-B631-C6E068ADA4B8}" type="datetimeFigureOut">
               <a:rPr lang="en-US" smtClean="0"/>
-              <a:t>1/7/2020</a:t>
+              <a:t>1/8/2020</a:t>
             </a:fld>
             <a:endParaRPr lang="en-US"/>
           </a:p>
@@ -1665,7 +1695,7 @@
           <a:p>
             <a:fld id="{5AA8B0B3-855D-4491-B631-C6E068ADA4B8}" type="datetimeFigureOut">
               <a:rPr lang="en-US" smtClean="0"/>
-              <a:t>1/7/2020</a:t>
+              <a:t>1/8/2020</a:t>
             </a:fld>
             <a:endParaRPr lang="en-US"/>
           </a:p>
@@ -2044,7 +2074,7 @@
           <a:p>
             <a:fld id="{5AA8B0B3-855D-4491-B631-C6E068ADA4B8}" type="datetimeFigureOut">
               <a:rPr lang="en-US" smtClean="0"/>
-              <a:t>1/7/2020</a:t>
+              <a:t>1/8/2020</a:t>
             </a:fld>
             <a:endParaRPr lang="en-US"/>
           </a:p>
@@ -2162,7 +2192,7 @@
           <a:p>
             <a:fld id="{5AA8B0B3-855D-4491-B631-C6E068ADA4B8}" type="datetimeFigureOut">
               <a:rPr lang="en-US" smtClean="0"/>
-              <a:t>1/7/2020</a:t>
+              <a:t>1/8/2020</a:t>
             </a:fld>
             <a:endParaRPr lang="en-US"/>
           </a:p>
@@ -2333,7 +2363,7 @@
           <a:p>
             <a:fld id="{5AA8B0B3-855D-4491-B631-C6E068ADA4B8}" type="datetimeFigureOut">
               <a:rPr lang="en-US" smtClean="0"/>
-              <a:t>1/7/2020</a:t>
+              <a:t>1/8/2020</a:t>
             </a:fld>
             <a:endParaRPr lang="en-US"/>
           </a:p>
@@ -2687,7 +2717,7 @@
           <a:p>
             <a:fld id="{5AA8B0B3-855D-4491-B631-C6E068ADA4B8}" type="datetimeFigureOut">
               <a:rPr lang="en-US" smtClean="0"/>
-              <a:t>1/7/2020</a:t>
+              <a:t>1/8/2020</a:t>
             </a:fld>
             <a:endParaRPr lang="en-US"/>
           </a:p>
@@ -3069,7 +3099,7 @@
           <a:p>
             <a:fld id="{5AA8B0B3-855D-4491-B631-C6E068ADA4B8}" type="datetimeFigureOut">
               <a:rPr lang="en-US" smtClean="0"/>
-              <a:t>1/7/2020</a:t>
+              <a:t>1/8/2020</a:t>
             </a:fld>
             <a:endParaRPr lang="en-US"/>
           </a:p>
@@ -3356,7 +3386,7 @@
           <a:p>
             <a:fld id="{5AA8B0B3-855D-4491-B631-C6E068ADA4B8}" type="datetimeFigureOut">
               <a:rPr lang="en-US" smtClean="0"/>
-              <a:t>1/7/2020</a:t>
+              <a:t>1/8/2020</a:t>
             </a:fld>
             <a:endParaRPr lang="en-US"/>
           </a:p>
@@ -5979,7 +6009,7 @@
           <a:p>
             <a:r>
               <a:rPr lang="en-US" dirty="0"/>
-              <a:t>Now, the output will indicate that there is untrack file.</a:t>
+              <a:t>Now, the output will indicate that there is untracked file.</a:t>
             </a:r>
           </a:p>
           <a:p>
@@ -8068,7 +8098,7 @@
         </p:nvSpPr>
         <p:spPr>
           <a:xfrm>
-            <a:off x="1036320" y="4146249"/>
+            <a:off x="1036320" y="4127587"/>
             <a:ext cx="2855169" cy="384421"/>
           </a:xfrm>
           <a:prstGeom prst="round2DiagRect">
@@ -8165,8 +8195,8 @@
         </p:nvSpPr>
         <p:spPr>
           <a:xfrm>
-            <a:off x="7119257" y="2127380"/>
-            <a:ext cx="4982548" cy="3623337"/>
+            <a:off x="6904653" y="2127380"/>
+            <a:ext cx="5505062" cy="3623337"/>
           </a:xfrm>
           <a:prstGeom prst="cloudCallout">
             <a:avLst/>
@@ -8210,7 +8240,7 @@
               <a:rPr lang="en-US" sz="2400" b="1" dirty="0">
                 <a:latin typeface="Ink Free" panose="03080402000500000000" pitchFamily="66" charset="0"/>
               </a:rPr>
-              <a:t>No need use </a:t>
+              <a:t>No need to use </a:t>
             </a:r>
             <a:r>
               <a:rPr lang="en-US" sz="2000" dirty="0">
@@ -8324,12 +8354,2087 @@
               <a:t>command quickly and observe the output.</a:t>
             </a:r>
           </a:p>
+          <a:p>
+            <a:r>
+              <a:rPr lang="en-US" dirty="0"/>
+              <a:t>Instead of opening a text editor to input commit message, we can embed it in command form as:</a:t>
+            </a:r>
+          </a:p>
+          <a:p>
+            <a:r>
+              <a:rPr lang="en-US" dirty="0">
+                <a:latin typeface="Consolas" panose="020B0609020204030204" pitchFamily="49" charset="0"/>
+              </a:rPr>
+              <a:t>git commit -m “Commit message”</a:t>
+            </a:r>
+          </a:p>
+          <a:p>
+            <a:endParaRPr lang="en-US" dirty="0">
+              <a:latin typeface="Consolas" panose="020B0609020204030204" pitchFamily="49" charset="0"/>
+            </a:endParaRPr>
+          </a:p>
+          <a:p>
+            <a:r>
+              <a:rPr lang="en-US" dirty="0"/>
+              <a:t>Now, lets see the log using the command</a:t>
+            </a:r>
+          </a:p>
+          <a:p>
+            <a:r>
+              <a:rPr lang="en-US" dirty="0">
+                <a:latin typeface="Consolas" panose="020B0609020204030204" pitchFamily="49" charset="0"/>
+              </a:rPr>
+              <a:t>git log</a:t>
+            </a:r>
+          </a:p>
+        </p:txBody>
+      </p:sp>
+      <p:sp>
+        <p:nvSpPr>
+          <p:cNvPr id="4" name="Rectangle: Diagonal Corners Rounded 3">
+            <a:extLst>
+              <a:ext uri="{FF2B5EF4-FFF2-40B4-BE49-F238E27FC236}">
+                <a16:creationId xmlns:a16="http://schemas.microsoft.com/office/drawing/2014/main" id="{9F826C3B-E916-4D1E-AFFD-F708C603F563}"/>
+              </a:ext>
+            </a:extLst>
+          </p:cNvPr>
+          <p:cNvSpPr/>
+          <p:nvPr/>
+        </p:nvSpPr>
+        <p:spPr>
+          <a:xfrm>
+            <a:off x="1097280" y="3044579"/>
+            <a:ext cx="4482426" cy="384421"/>
+          </a:xfrm>
+          <a:prstGeom prst="round2DiagRect">
+            <a:avLst/>
+          </a:prstGeom>
+          <a:noFill/>
+        </p:spPr>
+        <p:style>
+          <a:lnRef idx="2">
+            <a:schemeClr val="accent1">
+              <a:shade val="50000"/>
+            </a:schemeClr>
+          </a:lnRef>
+          <a:fillRef idx="1">
+            <a:schemeClr val="accent1"/>
+          </a:fillRef>
+          <a:effectRef idx="0">
+            <a:schemeClr val="accent1"/>
+          </a:effectRef>
+          <a:fontRef idx="minor">
+            <a:schemeClr val="lt1"/>
+          </a:fontRef>
+        </p:style>
+        <p:txBody>
+          <a:bodyPr rtlCol="0" anchor="ctr"/>
+          <a:lstStyle/>
+          <a:p>
+            <a:pPr algn="ctr"/>
+            <a:r>
+              <a:rPr lang="en-US" sz="2000" dirty="0"/>
+              <a:t>0</a:t>
+            </a:r>
+          </a:p>
+        </p:txBody>
+      </p:sp>
+      <p:sp>
+        <p:nvSpPr>
+          <p:cNvPr id="5" name="Rectangle: Diagonal Corners Rounded 4">
+            <a:extLst>
+              <a:ext uri="{FF2B5EF4-FFF2-40B4-BE49-F238E27FC236}">
+                <a16:creationId xmlns:a16="http://schemas.microsoft.com/office/drawing/2014/main" id="{555198BC-8EE7-4F88-BC36-745C66251304}"/>
+              </a:ext>
+            </a:extLst>
+          </p:cNvPr>
+          <p:cNvSpPr/>
+          <p:nvPr/>
+        </p:nvSpPr>
+        <p:spPr>
+          <a:xfrm>
+            <a:off x="895117" y="4363305"/>
+            <a:ext cx="1904067" cy="384421"/>
+          </a:xfrm>
+          <a:prstGeom prst="round2DiagRect">
+            <a:avLst/>
+          </a:prstGeom>
+          <a:noFill/>
+        </p:spPr>
+        <p:style>
+          <a:lnRef idx="2">
+            <a:schemeClr val="accent1">
+              <a:shade val="50000"/>
+            </a:schemeClr>
+          </a:lnRef>
+          <a:fillRef idx="1">
+            <a:schemeClr val="accent1"/>
+          </a:fillRef>
+          <a:effectRef idx="0">
+            <a:schemeClr val="accent1"/>
+          </a:effectRef>
+          <a:fontRef idx="minor">
+            <a:schemeClr val="lt1"/>
+          </a:fontRef>
+        </p:style>
+        <p:txBody>
+          <a:bodyPr rtlCol="0" anchor="ctr"/>
+          <a:lstStyle/>
+          <a:p>
+            <a:pPr algn="ctr"/>
+            <a:r>
+              <a:rPr lang="en-US" sz="2000" dirty="0"/>
+              <a:t>0</a:t>
+            </a:r>
+          </a:p>
         </p:txBody>
       </p:sp>
     </p:spTree>
     <p:extLst>
       <p:ext uri="{BB962C8B-B14F-4D97-AF65-F5344CB8AC3E}">
         <p14:creationId xmlns:p14="http://schemas.microsoft.com/office/powerpoint/2010/main" val="3778004405"/>
+      </p:ext>
+    </p:extLst>
+  </p:cSld>
+  <p:clrMapOvr>
+    <a:masterClrMapping/>
+  </p:clrMapOvr>
+</p:sld>
+</file>
+
+<file path=ppt/slides/slide33.xml><?xml version="1.0" encoding="utf-8"?>
+<p:sld xmlns:a="http://schemas.openxmlformats.org/drawingml/2006/main" xmlns:r="http://schemas.openxmlformats.org/officeDocument/2006/relationships" xmlns:p="http://schemas.openxmlformats.org/presentationml/2006/main">
+  <p:cSld>
+    <p:spTree>
+      <p:nvGrpSpPr>
+        <p:cNvPr id="1" name=""/>
+        <p:cNvGrpSpPr/>
+        <p:nvPr/>
+      </p:nvGrpSpPr>
+      <p:grpSpPr>
+        <a:xfrm>
+          <a:off x="0" y="0"/>
+          <a:ext cx="0" cy="0"/>
+          <a:chOff x="0" y="0"/>
+          <a:chExt cx="0" cy="0"/>
+        </a:xfrm>
+      </p:grpSpPr>
+      <p:sp>
+        <p:nvSpPr>
+          <p:cNvPr id="2" name="Title 1">
+            <a:extLst>
+              <a:ext uri="{FF2B5EF4-FFF2-40B4-BE49-F238E27FC236}">
+                <a16:creationId xmlns:a16="http://schemas.microsoft.com/office/drawing/2014/main" id="{0A402D15-63D0-4395-A00F-C94DF1B5900F}"/>
+              </a:ext>
+            </a:extLst>
+          </p:cNvPr>
+          <p:cNvSpPr>
+            <a:spLocks noGrp="1"/>
+          </p:cNvSpPr>
+          <p:nvPr>
+            <p:ph type="title"/>
+          </p:nvPr>
+        </p:nvSpPr>
+        <p:spPr>
+          <a:xfrm>
+            <a:off x="1189645" y="217765"/>
+            <a:ext cx="10058400" cy="1450757"/>
+          </a:xfrm>
+        </p:spPr>
+        <p:txBody>
+          <a:bodyPr/>
+          <a:lstStyle/>
+          <a:p>
+            <a:r>
+              <a:rPr lang="en-US" dirty="0"/>
+              <a:t>git log</a:t>
+            </a:r>
+          </a:p>
+        </p:txBody>
+      </p:sp>
+      <p:sp>
+        <p:nvSpPr>
+          <p:cNvPr id="3" name="Content Placeholder 2">
+            <a:extLst>
+              <a:ext uri="{FF2B5EF4-FFF2-40B4-BE49-F238E27FC236}">
+                <a16:creationId xmlns:a16="http://schemas.microsoft.com/office/drawing/2014/main" id="{55043689-EA48-4C3A-8E1A-54E845E0F038}"/>
+              </a:ext>
+            </a:extLst>
+          </p:cNvPr>
+          <p:cNvSpPr>
+            <a:spLocks noGrp="1"/>
+          </p:cNvSpPr>
+          <p:nvPr>
+            <p:ph idx="1"/>
+          </p:nvPr>
+        </p:nvSpPr>
+        <p:spPr/>
+        <p:txBody>
+          <a:bodyPr/>
+          <a:lstStyle/>
+          <a:p>
+            <a:r>
+              <a:rPr lang="en-US" dirty="0"/>
+              <a:t>Several parameters can be added to the basic ‘git log’ command to format the output as required.</a:t>
+            </a:r>
+          </a:p>
+          <a:p>
+            <a:endParaRPr lang="en-US" dirty="0"/>
+          </a:p>
+        </p:txBody>
+      </p:sp>
+      <p:graphicFrame>
+        <p:nvGraphicFramePr>
+          <p:cNvPr id="4" name="Table 4">
+            <a:extLst>
+              <a:ext uri="{FF2B5EF4-FFF2-40B4-BE49-F238E27FC236}">
+                <a16:creationId xmlns:a16="http://schemas.microsoft.com/office/drawing/2014/main" id="{68E8AD87-2409-46B6-B358-B5B0DB9D82D2}"/>
+              </a:ext>
+            </a:extLst>
+          </p:cNvPr>
+          <p:cNvGraphicFramePr>
+            <a:graphicFrameLocks noGrp="1"/>
+          </p:cNvGraphicFramePr>
+          <p:nvPr>
+            <p:extLst>
+              <p:ext uri="{D42A27DB-BD31-4B8C-83A1-F6EECF244321}">
+                <p14:modId xmlns:p14="http://schemas.microsoft.com/office/powerpoint/2010/main" val="4123146448"/>
+              </p:ext>
+            </p:extLst>
+          </p:nvPr>
+        </p:nvGraphicFramePr>
+        <p:xfrm>
+          <a:off x="1097280" y="2563017"/>
+          <a:ext cx="8128000" cy="3024228"/>
+        </p:xfrm>
+        <a:graphic>
+          <a:graphicData uri="http://schemas.openxmlformats.org/drawingml/2006/table">
+            <a:tbl>
+              <a:tblPr firstRow="1" bandRow="1">
+                <a:tableStyleId>{E8034E78-7F5D-4C2E-B375-FC64B27BC917}</a:tableStyleId>
+              </a:tblPr>
+              <a:tblGrid>
+                <a:gridCol w="2621280">
+                  <a:extLst>
+                    <a:ext uri="{9D8B030D-6E8A-4147-A177-3AD203B41FA5}">
+                      <a16:colId xmlns:a16="http://schemas.microsoft.com/office/drawing/2014/main" val="4077254984"/>
+                    </a:ext>
+                  </a:extLst>
+                </a:gridCol>
+                <a:gridCol w="5506720">
+                  <a:extLst>
+                    <a:ext uri="{9D8B030D-6E8A-4147-A177-3AD203B41FA5}">
+                      <a16:colId xmlns:a16="http://schemas.microsoft.com/office/drawing/2014/main" val="2589090411"/>
+                    </a:ext>
+                  </a:extLst>
+                </a:gridCol>
+              </a:tblGrid>
+              <a:tr h="390223">
+                <a:tc>
+                  <a:txBody>
+                    <a:bodyPr/>
+                    <a:lstStyle/>
+                    <a:p>
+                      <a:pPr marL="0" indent="0">
+                        <a:buFont typeface="Arial" panose="020B0604020202020204" pitchFamily="34" charset="0"/>
+                        <a:buNone/>
+                      </a:pPr>
+                      <a:r>
+                        <a:rPr lang="en-US" dirty="0">
+                          <a:latin typeface="Courier New" panose="02070309020205020404" pitchFamily="49" charset="0"/>
+                          <a:cs typeface="Courier New" panose="02070309020205020404" pitchFamily="49" charset="0"/>
+                        </a:rPr>
+                        <a:t>Parameter</a:t>
+                      </a:r>
+                    </a:p>
+                  </a:txBody>
+                  <a:tcPr>
+                    <a:solidFill>
+                      <a:srgbClr val="002060"/>
+                    </a:solidFill>
+                  </a:tcPr>
+                </a:tc>
+                <a:tc>
+                  <a:txBody>
+                    <a:bodyPr/>
+                    <a:lstStyle/>
+                    <a:p>
+                      <a:pPr marL="0" indent="0">
+                        <a:buFont typeface="Arial" panose="020B0604020202020204" pitchFamily="34" charset="0"/>
+                        <a:buNone/>
+                      </a:pPr>
+                      <a:r>
+                        <a:rPr lang="en-US" dirty="0">
+                          <a:latin typeface="Courier New" panose="02070309020205020404" pitchFamily="49" charset="0"/>
+                          <a:cs typeface="Courier New" panose="02070309020205020404" pitchFamily="49" charset="0"/>
+                        </a:rPr>
+                        <a:t>What does it do?</a:t>
+                      </a:r>
+                    </a:p>
+                  </a:txBody>
+                  <a:tcPr>
+                    <a:solidFill>
+                      <a:srgbClr val="002060"/>
+                    </a:solidFill>
+                  </a:tcPr>
+                </a:tc>
+                <a:extLst>
+                  <a:ext uri="{0D108BD9-81ED-4DB2-BD59-A6C34878D82A}">
+                    <a16:rowId xmlns:a16="http://schemas.microsoft.com/office/drawing/2014/main" val="4191666356"/>
+                  </a:ext>
+                </a:extLst>
+              </a:tr>
+              <a:tr h="390223">
+                <a:tc>
+                  <a:txBody>
+                    <a:bodyPr/>
+                    <a:lstStyle/>
+                    <a:p>
+                      <a:pPr marL="0" indent="0">
+                        <a:buFont typeface="Arial" panose="020B0604020202020204" pitchFamily="34" charset="0"/>
+                        <a:buNone/>
+                      </a:pPr>
+                      <a:r>
+                        <a:rPr lang="en-US" dirty="0">
+                          <a:latin typeface="Consolas" panose="020B0609020204030204" pitchFamily="49" charset="0"/>
+                        </a:rPr>
+                        <a:t>--</a:t>
+                      </a:r>
+                      <a:r>
+                        <a:rPr lang="en-US" dirty="0" err="1">
+                          <a:latin typeface="Consolas" panose="020B0609020204030204" pitchFamily="49" charset="0"/>
+                        </a:rPr>
+                        <a:t>oneline</a:t>
+                      </a:r>
+                      <a:endParaRPr lang="en-US" dirty="0">
+                        <a:latin typeface="Consolas" panose="020B0609020204030204" pitchFamily="49" charset="0"/>
+                      </a:endParaRPr>
+                    </a:p>
+                  </a:txBody>
+                  <a:tcPr>
+                    <a:solidFill>
+                      <a:srgbClr val="002060"/>
+                    </a:solidFill>
+                  </a:tcPr>
+                </a:tc>
+                <a:tc>
+                  <a:txBody>
+                    <a:bodyPr/>
+                    <a:lstStyle/>
+                    <a:p>
+                      <a:pPr marL="0" indent="0">
+                        <a:buFont typeface="Arial" panose="020B0604020202020204" pitchFamily="34" charset="0"/>
+                        <a:buNone/>
+                      </a:pPr>
+                      <a:r>
+                        <a:rPr lang="en-US" dirty="0"/>
+                        <a:t>Shortens the log of each commit to single line</a:t>
+                      </a:r>
+                    </a:p>
+                  </a:txBody>
+                  <a:tcPr>
+                    <a:solidFill>
+                      <a:srgbClr val="002060"/>
+                    </a:solidFill>
+                  </a:tcPr>
+                </a:tc>
+                <a:extLst>
+                  <a:ext uri="{0D108BD9-81ED-4DB2-BD59-A6C34878D82A}">
+                    <a16:rowId xmlns:a16="http://schemas.microsoft.com/office/drawing/2014/main" val="59046013"/>
+                  </a:ext>
+                </a:extLst>
+              </a:tr>
+              <a:tr h="390223">
+                <a:tc>
+                  <a:txBody>
+                    <a:bodyPr/>
+                    <a:lstStyle/>
+                    <a:p>
+                      <a:pPr marL="0" indent="0">
+                        <a:buFont typeface="Arial" panose="020B0604020202020204" pitchFamily="34" charset="0"/>
+                        <a:buNone/>
+                      </a:pPr>
+                      <a:r>
+                        <a:rPr lang="en-US" dirty="0">
+                          <a:latin typeface="Consolas" panose="020B0609020204030204" pitchFamily="49" charset="0"/>
+                        </a:rPr>
+                        <a:t>--graph</a:t>
+                      </a:r>
+                    </a:p>
+                  </a:txBody>
+                  <a:tcPr>
+                    <a:solidFill>
+                      <a:srgbClr val="002060"/>
+                    </a:solidFill>
+                  </a:tcPr>
+                </a:tc>
+                <a:tc>
+                  <a:txBody>
+                    <a:bodyPr/>
+                    <a:lstStyle/>
+                    <a:p>
+                      <a:pPr marL="0" indent="0">
+                        <a:buFont typeface="Arial" panose="020B0604020202020204" pitchFamily="34" charset="0"/>
+                        <a:buNone/>
+                      </a:pPr>
+                      <a:r>
+                        <a:rPr lang="en-US" dirty="0"/>
+                        <a:t>Shows in graph format, </a:t>
+                      </a:r>
+                      <a:r>
+                        <a:rPr lang="en-US" dirty="0" err="1"/>
+                        <a:t>i.e</a:t>
+                      </a:r>
+                      <a:r>
+                        <a:rPr lang="en-US" dirty="0"/>
+                        <a:t> shows links between commits</a:t>
+                      </a:r>
+                    </a:p>
+                  </a:txBody>
+                  <a:tcPr>
+                    <a:solidFill>
+                      <a:srgbClr val="002060"/>
+                    </a:solidFill>
+                  </a:tcPr>
+                </a:tc>
+                <a:extLst>
+                  <a:ext uri="{0D108BD9-81ED-4DB2-BD59-A6C34878D82A}">
+                    <a16:rowId xmlns:a16="http://schemas.microsoft.com/office/drawing/2014/main" val="4258120468"/>
+                  </a:ext>
+                </a:extLst>
+              </a:tr>
+              <a:tr h="390223">
+                <a:tc>
+                  <a:txBody>
+                    <a:bodyPr/>
+                    <a:lstStyle/>
+                    <a:p>
+                      <a:pPr marL="0" indent="0">
+                        <a:buFont typeface="Arial" panose="020B0604020202020204" pitchFamily="34" charset="0"/>
+                        <a:buNone/>
+                      </a:pPr>
+                      <a:r>
+                        <a:rPr lang="en-US" dirty="0">
+                          <a:latin typeface="Consolas" panose="020B0609020204030204" pitchFamily="49" charset="0"/>
+                        </a:rPr>
+                        <a:t>--stat</a:t>
+                      </a:r>
+                    </a:p>
+                  </a:txBody>
+                  <a:tcPr>
+                    <a:solidFill>
+                      <a:srgbClr val="002060"/>
+                    </a:solidFill>
+                  </a:tcPr>
+                </a:tc>
+                <a:tc>
+                  <a:txBody>
+                    <a:bodyPr/>
+                    <a:lstStyle/>
+                    <a:p>
+                      <a:pPr marL="0" indent="0">
+                        <a:buFont typeface="Arial" panose="020B0604020202020204" pitchFamily="34" charset="0"/>
+                        <a:buNone/>
+                      </a:pPr>
+                      <a:r>
+                        <a:rPr lang="en-US" dirty="0"/>
+                        <a:t>Shows detailed log</a:t>
+                      </a:r>
+                    </a:p>
+                  </a:txBody>
+                  <a:tcPr>
+                    <a:solidFill>
+                      <a:srgbClr val="002060"/>
+                    </a:solidFill>
+                  </a:tcPr>
+                </a:tc>
+                <a:extLst>
+                  <a:ext uri="{0D108BD9-81ED-4DB2-BD59-A6C34878D82A}">
+                    <a16:rowId xmlns:a16="http://schemas.microsoft.com/office/drawing/2014/main" val="2490078121"/>
+                  </a:ext>
+                </a:extLst>
+              </a:tr>
+              <a:tr h="682890">
+                <a:tc>
+                  <a:txBody>
+                    <a:bodyPr/>
+                    <a:lstStyle/>
+                    <a:p>
+                      <a:pPr marL="0" indent="0">
+                        <a:buFont typeface="Arial" panose="020B0604020202020204" pitchFamily="34" charset="0"/>
+                        <a:buNone/>
+                      </a:pPr>
+                      <a:r>
+                        <a:rPr lang="en-US" dirty="0">
+                          <a:latin typeface="Consolas" panose="020B0609020204030204" pitchFamily="49" charset="0"/>
+                        </a:rPr>
+                        <a:t>-p</a:t>
+                      </a:r>
+                    </a:p>
+                  </a:txBody>
+                  <a:tcPr>
+                    <a:solidFill>
+                      <a:srgbClr val="002060"/>
+                    </a:solidFill>
+                  </a:tcPr>
+                </a:tc>
+                <a:tc>
+                  <a:txBody>
+                    <a:bodyPr/>
+                    <a:lstStyle/>
+                    <a:p>
+                      <a:pPr marL="0" indent="0">
+                        <a:buFont typeface="Arial" panose="020B0604020202020204" pitchFamily="34" charset="0"/>
+                        <a:buNone/>
+                      </a:pPr>
+                      <a:r>
+                        <a:rPr lang="en-US" dirty="0"/>
+                        <a:t>Shows even more detailed log, including changes brought in each commit</a:t>
+                      </a:r>
+                    </a:p>
+                  </a:txBody>
+                  <a:tcPr>
+                    <a:solidFill>
+                      <a:srgbClr val="002060"/>
+                    </a:solidFill>
+                  </a:tcPr>
+                </a:tc>
+                <a:extLst>
+                  <a:ext uri="{0D108BD9-81ED-4DB2-BD59-A6C34878D82A}">
+                    <a16:rowId xmlns:a16="http://schemas.microsoft.com/office/drawing/2014/main" val="3834116057"/>
+                  </a:ext>
+                </a:extLst>
+              </a:tr>
+              <a:tr h="390223">
+                <a:tc>
+                  <a:txBody>
+                    <a:bodyPr/>
+                    <a:lstStyle/>
+                    <a:p>
+                      <a:pPr marL="0" indent="0">
+                        <a:buFont typeface="Arial" panose="020B0604020202020204" pitchFamily="34" charset="0"/>
+                        <a:buNone/>
+                      </a:pPr>
+                      <a:r>
+                        <a:rPr lang="en-US" dirty="0">
+                          <a:latin typeface="Consolas" panose="020B0609020204030204" pitchFamily="49" charset="0"/>
+                        </a:rPr>
+                        <a:t>--reverse</a:t>
+                      </a:r>
+                    </a:p>
+                  </a:txBody>
+                  <a:tcPr>
+                    <a:solidFill>
+                      <a:srgbClr val="002060"/>
+                    </a:solidFill>
+                  </a:tcPr>
+                </a:tc>
+                <a:tc>
+                  <a:txBody>
+                    <a:bodyPr/>
+                    <a:lstStyle/>
+                    <a:p>
+                      <a:pPr marL="0" indent="0">
+                        <a:buFont typeface="Arial" panose="020B0604020202020204" pitchFamily="34" charset="0"/>
+                        <a:buNone/>
+                      </a:pPr>
+                      <a:r>
+                        <a:rPr lang="en-US" dirty="0"/>
+                        <a:t>Shows log in reverse order, oldest…latest </a:t>
+                      </a:r>
+                    </a:p>
+                  </a:txBody>
+                  <a:tcPr>
+                    <a:solidFill>
+                      <a:srgbClr val="002060"/>
+                    </a:solidFill>
+                  </a:tcPr>
+                </a:tc>
+                <a:extLst>
+                  <a:ext uri="{0D108BD9-81ED-4DB2-BD59-A6C34878D82A}">
+                    <a16:rowId xmlns:a16="http://schemas.microsoft.com/office/drawing/2014/main" val="1711495805"/>
+                  </a:ext>
+                </a:extLst>
+              </a:tr>
+              <a:tr h="390223">
+                <a:tc>
+                  <a:txBody>
+                    <a:bodyPr/>
+                    <a:lstStyle/>
+                    <a:p>
+                      <a:pPr marL="0" indent="0">
+                        <a:buFont typeface="Arial" panose="020B0604020202020204" pitchFamily="34" charset="0"/>
+                        <a:buNone/>
+                      </a:pPr>
+                      <a:r>
+                        <a:rPr lang="en-US" dirty="0">
+                          <a:latin typeface="Consolas" panose="020B0609020204030204" pitchFamily="49" charset="0"/>
+                        </a:rPr>
+                        <a:t>And many more</a:t>
+                      </a:r>
+                    </a:p>
+                  </a:txBody>
+                  <a:tcPr>
+                    <a:solidFill>
+                      <a:srgbClr val="002060"/>
+                    </a:solidFill>
+                  </a:tcPr>
+                </a:tc>
+                <a:tc>
+                  <a:txBody>
+                    <a:bodyPr/>
+                    <a:lstStyle/>
+                    <a:p>
+                      <a:pPr marL="0" indent="0">
+                        <a:buFont typeface="Arial" panose="020B0604020202020204" pitchFamily="34" charset="0"/>
+                        <a:buNone/>
+                      </a:pPr>
+                      <a:endParaRPr lang="en-US" dirty="0"/>
+                    </a:p>
+                  </a:txBody>
+                  <a:tcPr>
+                    <a:solidFill>
+                      <a:srgbClr val="002060"/>
+                    </a:solidFill>
+                  </a:tcPr>
+                </a:tc>
+                <a:extLst>
+                  <a:ext uri="{0D108BD9-81ED-4DB2-BD59-A6C34878D82A}">
+                    <a16:rowId xmlns:a16="http://schemas.microsoft.com/office/drawing/2014/main" val="194257713"/>
+                  </a:ext>
+                </a:extLst>
+              </a:tr>
+            </a:tbl>
+          </a:graphicData>
+        </a:graphic>
+      </p:graphicFrame>
+      <p:sp>
+        <p:nvSpPr>
+          <p:cNvPr id="6" name="TextBox 5">
+            <a:extLst>
+              <a:ext uri="{FF2B5EF4-FFF2-40B4-BE49-F238E27FC236}">
+                <a16:creationId xmlns:a16="http://schemas.microsoft.com/office/drawing/2014/main" id="{38B4CD76-2F75-48F2-818B-91CB89014E45}"/>
+              </a:ext>
+            </a:extLst>
+          </p:cNvPr>
+          <p:cNvSpPr txBox="1"/>
+          <p:nvPr/>
+        </p:nvSpPr>
+        <p:spPr>
+          <a:xfrm>
+            <a:off x="1036320" y="5821352"/>
+            <a:ext cx="6816033" cy="400110"/>
+          </a:xfrm>
+          <a:prstGeom prst="rect">
+            <a:avLst/>
+          </a:prstGeom>
+          <a:noFill/>
+        </p:spPr>
+        <p:txBody>
+          <a:bodyPr wrap="none" rtlCol="0">
+            <a:spAutoFit/>
+          </a:bodyPr>
+          <a:lstStyle/>
+          <a:p>
+            <a:r>
+              <a:rPr lang="en-US" sz="2000" dirty="0"/>
+              <a:t>Note: Several parameters can used at once. Example: live demo!</a:t>
+            </a:r>
+          </a:p>
+        </p:txBody>
+      </p:sp>
+      <p:sp>
+        <p:nvSpPr>
+          <p:cNvPr id="7" name="Rectangle: Top Corners One Rounded and One Snipped 6">
+            <a:extLst>
+              <a:ext uri="{FF2B5EF4-FFF2-40B4-BE49-F238E27FC236}">
+                <a16:creationId xmlns:a16="http://schemas.microsoft.com/office/drawing/2014/main" id="{430722EE-1615-46E6-BE03-F374AB2D8D95}"/>
+              </a:ext>
+            </a:extLst>
+          </p:cNvPr>
+          <p:cNvSpPr/>
+          <p:nvPr/>
+        </p:nvSpPr>
+        <p:spPr>
+          <a:xfrm>
+            <a:off x="867747" y="5809965"/>
+            <a:ext cx="7156580" cy="422884"/>
+          </a:xfrm>
+          <a:prstGeom prst="snipRoundRect">
+            <a:avLst/>
+          </a:prstGeom>
+          <a:noFill/>
+        </p:spPr>
+        <p:style>
+          <a:lnRef idx="2">
+            <a:schemeClr val="accent1">
+              <a:shade val="50000"/>
+            </a:schemeClr>
+          </a:lnRef>
+          <a:fillRef idx="1">
+            <a:schemeClr val="accent1"/>
+          </a:fillRef>
+          <a:effectRef idx="0">
+            <a:schemeClr val="accent1"/>
+          </a:effectRef>
+          <a:fontRef idx="minor">
+            <a:schemeClr val="lt1"/>
+          </a:fontRef>
+        </p:style>
+        <p:txBody>
+          <a:bodyPr rtlCol="0" anchor="ctr"/>
+          <a:lstStyle/>
+          <a:p>
+            <a:pPr algn="ctr"/>
+            <a:endParaRPr lang="en-US"/>
+          </a:p>
+        </p:txBody>
+      </p:sp>
+    </p:spTree>
+    <p:extLst>
+      <p:ext uri="{BB962C8B-B14F-4D97-AF65-F5344CB8AC3E}">
+        <p14:creationId xmlns:p14="http://schemas.microsoft.com/office/powerpoint/2010/main" val="33838221"/>
+      </p:ext>
+    </p:extLst>
+  </p:cSld>
+  <p:clrMapOvr>
+    <a:masterClrMapping/>
+  </p:clrMapOvr>
+</p:sld>
+</file>
+
+<file path=ppt/slides/slide34.xml><?xml version="1.0" encoding="utf-8"?>
+<p:sld xmlns:a="http://schemas.openxmlformats.org/drawingml/2006/main" xmlns:r="http://schemas.openxmlformats.org/officeDocument/2006/relationships" xmlns:p="http://schemas.openxmlformats.org/presentationml/2006/main">
+  <p:cSld>
+    <p:spTree>
+      <p:nvGrpSpPr>
+        <p:cNvPr id="1" name=""/>
+        <p:cNvGrpSpPr/>
+        <p:nvPr/>
+      </p:nvGrpSpPr>
+      <p:grpSpPr>
+        <a:xfrm>
+          <a:off x="0" y="0"/>
+          <a:ext cx="0" cy="0"/>
+          <a:chOff x="0" y="0"/>
+          <a:chExt cx="0" cy="0"/>
+        </a:xfrm>
+      </p:grpSpPr>
+      <p:sp>
+        <p:nvSpPr>
+          <p:cNvPr id="2" name="Title 1">
+            <a:extLst>
+              <a:ext uri="{FF2B5EF4-FFF2-40B4-BE49-F238E27FC236}">
+                <a16:creationId xmlns:a16="http://schemas.microsoft.com/office/drawing/2014/main" id="{5BB97251-AE46-4EC6-939E-D72A376382AB}"/>
+              </a:ext>
+            </a:extLst>
+          </p:cNvPr>
+          <p:cNvSpPr>
+            <a:spLocks noGrp="1"/>
+          </p:cNvSpPr>
+          <p:nvPr>
+            <p:ph type="title"/>
+          </p:nvPr>
+        </p:nvSpPr>
+        <p:spPr/>
+        <p:txBody>
+          <a:bodyPr/>
+          <a:lstStyle/>
+          <a:p>
+            <a:r>
+              <a:rPr lang="en-US" dirty="0"/>
+              <a:t>Working with Remotes</a:t>
+            </a:r>
+          </a:p>
+        </p:txBody>
+      </p:sp>
+      <p:sp>
+        <p:nvSpPr>
+          <p:cNvPr id="3" name="Content Placeholder 2">
+            <a:extLst>
+              <a:ext uri="{FF2B5EF4-FFF2-40B4-BE49-F238E27FC236}">
+                <a16:creationId xmlns:a16="http://schemas.microsoft.com/office/drawing/2014/main" id="{9896BCF8-5534-42FF-BE81-366C290848BF}"/>
+              </a:ext>
+            </a:extLst>
+          </p:cNvPr>
+          <p:cNvSpPr>
+            <a:spLocks noGrp="1"/>
+          </p:cNvSpPr>
+          <p:nvPr>
+            <p:ph idx="1"/>
+          </p:nvPr>
+        </p:nvSpPr>
+        <p:spPr/>
+        <p:txBody>
+          <a:bodyPr/>
+          <a:lstStyle/>
+          <a:p>
+            <a:r>
+              <a:rPr lang="en-US" dirty="0"/>
+              <a:t>Remote repositories are versions of your project that are hosted on the Internet or</a:t>
+            </a:r>
+            <a:br>
+              <a:rPr lang="en-US" dirty="0"/>
+            </a:br>
+            <a:r>
+              <a:rPr lang="en-US" dirty="0"/>
+              <a:t>network somewhere. </a:t>
+            </a:r>
+          </a:p>
+          <a:p>
+            <a:pPr marL="0" indent="0">
+              <a:buNone/>
+            </a:pPr>
+            <a:r>
+              <a:rPr lang="en-US" dirty="0"/>
+              <a:t>We will be uploading our local repository to GitHub.</a:t>
+            </a:r>
+          </a:p>
+          <a:p>
+            <a:pPr marL="0" indent="0">
+              <a:buNone/>
+            </a:pPr>
+            <a:r>
+              <a:rPr lang="en-US" dirty="0"/>
+              <a:t>Let’s create a blank repository on GitHub</a:t>
+            </a:r>
+          </a:p>
+          <a:p>
+            <a:pPr marL="0" indent="0">
+              <a:buNone/>
+            </a:pPr>
+            <a:br>
+              <a:rPr lang="en-US" dirty="0"/>
+            </a:br>
+            <a:endParaRPr lang="en-US" dirty="0"/>
+          </a:p>
+        </p:txBody>
+      </p:sp>
+      <p:pic>
+        <p:nvPicPr>
+          <p:cNvPr id="4" name="Picture 3">
+            <a:extLst>
+              <a:ext uri="{FF2B5EF4-FFF2-40B4-BE49-F238E27FC236}">
+                <a16:creationId xmlns:a16="http://schemas.microsoft.com/office/drawing/2014/main" id="{2F1D5608-92D8-4710-AAA2-874D6D359CF5}"/>
+              </a:ext>
+            </a:extLst>
+          </p:cNvPr>
+          <p:cNvPicPr>
+            <a:picLocks noChangeAspect="1"/>
+          </p:cNvPicPr>
+          <p:nvPr/>
+        </p:nvPicPr>
+        <p:blipFill>
+          <a:blip r:embed="rId2"/>
+          <a:stretch>
+            <a:fillRect/>
+          </a:stretch>
+        </p:blipFill>
+        <p:spPr>
+          <a:xfrm>
+            <a:off x="890773" y="3429000"/>
+            <a:ext cx="3755872" cy="2794518"/>
+          </a:xfrm>
+          <a:prstGeom prst="rect">
+            <a:avLst/>
+          </a:prstGeom>
+        </p:spPr>
+      </p:pic>
+      <p:sp>
+        <p:nvSpPr>
+          <p:cNvPr id="8" name="Oval 7">
+            <a:extLst>
+              <a:ext uri="{FF2B5EF4-FFF2-40B4-BE49-F238E27FC236}">
+                <a16:creationId xmlns:a16="http://schemas.microsoft.com/office/drawing/2014/main" id="{86FCAFCE-9896-45A1-9B1A-D13504445B5E}"/>
+              </a:ext>
+            </a:extLst>
+          </p:cNvPr>
+          <p:cNvSpPr/>
+          <p:nvPr/>
+        </p:nvSpPr>
+        <p:spPr>
+          <a:xfrm>
+            <a:off x="3489649" y="5178490"/>
+            <a:ext cx="1091682" cy="615820"/>
+          </a:xfrm>
+          <a:prstGeom prst="ellipse">
+            <a:avLst/>
+          </a:prstGeom>
+          <a:noFill/>
+        </p:spPr>
+        <p:style>
+          <a:lnRef idx="2">
+            <a:schemeClr val="accent1">
+              <a:shade val="50000"/>
+            </a:schemeClr>
+          </a:lnRef>
+          <a:fillRef idx="1">
+            <a:schemeClr val="accent1"/>
+          </a:fillRef>
+          <a:effectRef idx="0">
+            <a:schemeClr val="accent1"/>
+          </a:effectRef>
+          <a:fontRef idx="minor">
+            <a:schemeClr val="lt1"/>
+          </a:fontRef>
+        </p:style>
+        <p:txBody>
+          <a:bodyPr rtlCol="0" anchor="ctr"/>
+          <a:lstStyle/>
+          <a:p>
+            <a:pPr algn="ctr"/>
+            <a:endParaRPr lang="en-US"/>
+          </a:p>
+        </p:txBody>
+      </p:sp>
+    </p:spTree>
+    <p:extLst>
+      <p:ext uri="{BB962C8B-B14F-4D97-AF65-F5344CB8AC3E}">
+        <p14:creationId xmlns:p14="http://schemas.microsoft.com/office/powerpoint/2010/main" val="385574611"/>
+      </p:ext>
+    </p:extLst>
+  </p:cSld>
+  <p:clrMapOvr>
+    <a:masterClrMapping/>
+  </p:clrMapOvr>
+</p:sld>
+</file>
+
+<file path=ppt/slides/slide35.xml><?xml version="1.0" encoding="utf-8"?>
+<p:sld xmlns:a="http://schemas.openxmlformats.org/drawingml/2006/main" xmlns:r="http://schemas.openxmlformats.org/officeDocument/2006/relationships" xmlns:p="http://schemas.openxmlformats.org/presentationml/2006/main">
+  <p:cSld>
+    <p:spTree>
+      <p:nvGrpSpPr>
+        <p:cNvPr id="1" name=""/>
+        <p:cNvGrpSpPr/>
+        <p:nvPr/>
+      </p:nvGrpSpPr>
+      <p:grpSpPr>
+        <a:xfrm>
+          <a:off x="0" y="0"/>
+          <a:ext cx="0" cy="0"/>
+          <a:chOff x="0" y="0"/>
+          <a:chExt cx="0" cy="0"/>
+        </a:xfrm>
+      </p:grpSpPr>
+      <p:sp>
+        <p:nvSpPr>
+          <p:cNvPr id="2" name="Title 1">
+            <a:extLst>
+              <a:ext uri="{FF2B5EF4-FFF2-40B4-BE49-F238E27FC236}">
+                <a16:creationId xmlns:a16="http://schemas.microsoft.com/office/drawing/2014/main" id="{34AF12FF-AC72-4F11-8DB9-9FE28A010694}"/>
+              </a:ext>
+            </a:extLst>
+          </p:cNvPr>
+          <p:cNvSpPr>
+            <a:spLocks noGrp="1"/>
+          </p:cNvSpPr>
+          <p:nvPr>
+            <p:ph type="title"/>
+          </p:nvPr>
+        </p:nvSpPr>
+        <p:spPr/>
+        <p:txBody>
+          <a:bodyPr/>
+          <a:lstStyle/>
+          <a:p>
+            <a:endParaRPr lang="en-US"/>
+          </a:p>
+        </p:txBody>
+      </p:sp>
+      <p:sp>
+        <p:nvSpPr>
+          <p:cNvPr id="3" name="Content Placeholder 2">
+            <a:extLst>
+              <a:ext uri="{FF2B5EF4-FFF2-40B4-BE49-F238E27FC236}">
+                <a16:creationId xmlns:a16="http://schemas.microsoft.com/office/drawing/2014/main" id="{82AEA580-5605-4CFA-BD3F-1F86F54C98F1}"/>
+              </a:ext>
+            </a:extLst>
+          </p:cNvPr>
+          <p:cNvSpPr>
+            <a:spLocks noGrp="1"/>
+          </p:cNvSpPr>
+          <p:nvPr>
+            <p:ph idx="1"/>
+          </p:nvPr>
+        </p:nvSpPr>
+        <p:spPr/>
+        <p:txBody>
+          <a:bodyPr/>
+          <a:lstStyle/>
+          <a:p>
+            <a:endParaRPr lang="en-US"/>
+          </a:p>
+        </p:txBody>
+      </p:sp>
+      <p:pic>
+        <p:nvPicPr>
+          <p:cNvPr id="4" name="Picture 3">
+            <a:extLst>
+              <a:ext uri="{FF2B5EF4-FFF2-40B4-BE49-F238E27FC236}">
+                <a16:creationId xmlns:a16="http://schemas.microsoft.com/office/drawing/2014/main" id="{083A30D0-FCE2-43B5-8A27-ED0E186DB834}"/>
+              </a:ext>
+            </a:extLst>
+          </p:cNvPr>
+          <p:cNvPicPr>
+            <a:picLocks noChangeAspect="1"/>
+          </p:cNvPicPr>
+          <p:nvPr/>
+        </p:nvPicPr>
+        <p:blipFill>
+          <a:blip r:embed="rId2"/>
+          <a:stretch>
+            <a:fillRect/>
+          </a:stretch>
+        </p:blipFill>
+        <p:spPr>
+          <a:xfrm>
+            <a:off x="1036320" y="286603"/>
+            <a:ext cx="9610951" cy="5804881"/>
+          </a:xfrm>
+          <a:prstGeom prst="rect">
+            <a:avLst/>
+          </a:prstGeom>
+        </p:spPr>
+      </p:pic>
+      <p:sp>
+        <p:nvSpPr>
+          <p:cNvPr id="5" name="TextBox 4">
+            <a:extLst>
+              <a:ext uri="{FF2B5EF4-FFF2-40B4-BE49-F238E27FC236}">
+                <a16:creationId xmlns:a16="http://schemas.microsoft.com/office/drawing/2014/main" id="{E7AFA068-27DE-4797-8A76-8B1B7BB0D0C3}"/>
+              </a:ext>
+            </a:extLst>
+          </p:cNvPr>
+          <p:cNvSpPr txBox="1"/>
+          <p:nvPr/>
+        </p:nvSpPr>
+        <p:spPr>
+          <a:xfrm>
+            <a:off x="1362269" y="615820"/>
+            <a:ext cx="1039708" cy="369332"/>
+          </a:xfrm>
+          <a:prstGeom prst="rect">
+            <a:avLst/>
+          </a:prstGeom>
+          <a:noFill/>
+        </p:spPr>
+        <p:txBody>
+          <a:bodyPr wrap="none" rtlCol="0">
+            <a:spAutoFit/>
+          </a:bodyPr>
+          <a:lstStyle/>
+          <a:p>
+            <a:r>
+              <a:rPr lang="en-US" dirty="0"/>
+              <a:t>Example:</a:t>
+            </a:r>
+          </a:p>
+        </p:txBody>
+      </p:sp>
+      <p:sp>
+        <p:nvSpPr>
+          <p:cNvPr id="6" name="Oval 5">
+            <a:extLst>
+              <a:ext uri="{FF2B5EF4-FFF2-40B4-BE49-F238E27FC236}">
+                <a16:creationId xmlns:a16="http://schemas.microsoft.com/office/drawing/2014/main" id="{C494B3D0-0D16-4E8C-815F-534162F2C8C4}"/>
+              </a:ext>
+            </a:extLst>
+          </p:cNvPr>
+          <p:cNvSpPr/>
+          <p:nvPr/>
+        </p:nvSpPr>
+        <p:spPr>
+          <a:xfrm>
+            <a:off x="2584578" y="5361648"/>
+            <a:ext cx="1772817" cy="838210"/>
+          </a:xfrm>
+          <a:prstGeom prst="ellipse">
+            <a:avLst/>
+          </a:prstGeom>
+          <a:noFill/>
+          <a:ln w="38100"/>
+        </p:spPr>
+        <p:style>
+          <a:lnRef idx="2">
+            <a:schemeClr val="accent1">
+              <a:shade val="50000"/>
+            </a:schemeClr>
+          </a:lnRef>
+          <a:fillRef idx="1">
+            <a:schemeClr val="accent1"/>
+          </a:fillRef>
+          <a:effectRef idx="0">
+            <a:schemeClr val="accent1"/>
+          </a:effectRef>
+          <a:fontRef idx="minor">
+            <a:schemeClr val="lt1"/>
+          </a:fontRef>
+        </p:style>
+        <p:txBody>
+          <a:bodyPr rtlCol="0" anchor="ctr"/>
+          <a:lstStyle/>
+          <a:p>
+            <a:pPr algn="ctr"/>
+            <a:endParaRPr lang="en-US"/>
+          </a:p>
+        </p:txBody>
+      </p:sp>
+    </p:spTree>
+    <p:extLst>
+      <p:ext uri="{BB962C8B-B14F-4D97-AF65-F5344CB8AC3E}">
+        <p14:creationId xmlns:p14="http://schemas.microsoft.com/office/powerpoint/2010/main" val="490339972"/>
+      </p:ext>
+    </p:extLst>
+  </p:cSld>
+  <p:clrMapOvr>
+    <a:masterClrMapping/>
+  </p:clrMapOvr>
+</p:sld>
+</file>
+
+<file path=ppt/slides/slide36.xml><?xml version="1.0" encoding="utf-8"?>
+<p:sld xmlns:a="http://schemas.openxmlformats.org/drawingml/2006/main" xmlns:r="http://schemas.openxmlformats.org/officeDocument/2006/relationships" xmlns:p="http://schemas.openxmlformats.org/presentationml/2006/main">
+  <p:cSld>
+    <p:spTree>
+      <p:nvGrpSpPr>
+        <p:cNvPr id="1" name=""/>
+        <p:cNvGrpSpPr/>
+        <p:nvPr/>
+      </p:nvGrpSpPr>
+      <p:grpSpPr>
+        <a:xfrm>
+          <a:off x="0" y="0"/>
+          <a:ext cx="0" cy="0"/>
+          <a:chOff x="0" y="0"/>
+          <a:chExt cx="0" cy="0"/>
+        </a:xfrm>
+      </p:grpSpPr>
+      <p:sp>
+        <p:nvSpPr>
+          <p:cNvPr id="2" name="Title 1">
+            <a:extLst>
+              <a:ext uri="{FF2B5EF4-FFF2-40B4-BE49-F238E27FC236}">
+                <a16:creationId xmlns:a16="http://schemas.microsoft.com/office/drawing/2014/main" id="{3643F6A5-DD2D-406D-A34E-5E9B8367BC7F}"/>
+              </a:ext>
+            </a:extLst>
+          </p:cNvPr>
+          <p:cNvSpPr>
+            <a:spLocks noGrp="1"/>
+          </p:cNvSpPr>
+          <p:nvPr>
+            <p:ph type="title"/>
+          </p:nvPr>
+        </p:nvSpPr>
+        <p:spPr/>
+        <p:txBody>
+          <a:bodyPr/>
+          <a:lstStyle/>
+          <a:p>
+            <a:endParaRPr lang="en-US" dirty="0"/>
+          </a:p>
+        </p:txBody>
+      </p:sp>
+      <p:pic>
+        <p:nvPicPr>
+          <p:cNvPr id="4" name="Content Placeholder 3">
+            <a:extLst>
+              <a:ext uri="{FF2B5EF4-FFF2-40B4-BE49-F238E27FC236}">
+                <a16:creationId xmlns:a16="http://schemas.microsoft.com/office/drawing/2014/main" id="{E49FA359-0278-4FF2-9542-DFD53ACCC5C5}"/>
+              </a:ext>
+            </a:extLst>
+          </p:cNvPr>
+          <p:cNvPicPr>
+            <a:picLocks noGrp="1" noChangeAspect="1"/>
+          </p:cNvPicPr>
+          <p:nvPr>
+            <p:ph idx="1"/>
+          </p:nvPr>
+        </p:nvPicPr>
+        <p:blipFill>
+          <a:blip r:embed="rId2"/>
+          <a:stretch>
+            <a:fillRect/>
+          </a:stretch>
+        </p:blipFill>
+        <p:spPr>
+          <a:xfrm>
+            <a:off x="823444" y="1737360"/>
+            <a:ext cx="6463245" cy="3450457"/>
+          </a:xfrm>
+          <a:prstGeom prst="rect">
+            <a:avLst/>
+          </a:prstGeom>
+        </p:spPr>
+      </p:pic>
+      <p:cxnSp>
+        <p:nvCxnSpPr>
+          <p:cNvPr id="11" name="Connector: Curved 10">
+            <a:extLst>
+              <a:ext uri="{FF2B5EF4-FFF2-40B4-BE49-F238E27FC236}">
+                <a16:creationId xmlns:a16="http://schemas.microsoft.com/office/drawing/2014/main" id="{20DAC2A5-1D47-460D-8177-3960C1C2239B}"/>
+              </a:ext>
+            </a:extLst>
+          </p:cNvPr>
+          <p:cNvCxnSpPr>
+            <a:cxnSpLocks/>
+          </p:cNvCxnSpPr>
+          <p:nvPr/>
+        </p:nvCxnSpPr>
+        <p:spPr>
+          <a:xfrm>
+            <a:off x="5505062" y="3795694"/>
+            <a:ext cx="2006081" cy="524378"/>
+          </a:xfrm>
+          <a:prstGeom prst="curvedConnector3">
+            <a:avLst/>
+          </a:prstGeom>
+          <a:ln>
+            <a:headEnd type="triangle"/>
+            <a:tailEnd type="triangle"/>
+          </a:ln>
+        </p:spPr>
+        <p:style>
+          <a:lnRef idx="3">
+            <a:schemeClr val="accent2"/>
+          </a:lnRef>
+          <a:fillRef idx="0">
+            <a:schemeClr val="accent2"/>
+          </a:fillRef>
+          <a:effectRef idx="2">
+            <a:schemeClr val="accent2"/>
+          </a:effectRef>
+          <a:fontRef idx="minor">
+            <a:schemeClr val="tx1"/>
+          </a:fontRef>
+        </p:style>
+      </p:cxnSp>
+      <p:sp>
+        <p:nvSpPr>
+          <p:cNvPr id="12" name="Thought Bubble: Cloud 11">
+            <a:extLst>
+              <a:ext uri="{FF2B5EF4-FFF2-40B4-BE49-F238E27FC236}">
+                <a16:creationId xmlns:a16="http://schemas.microsoft.com/office/drawing/2014/main" id="{5B5C54D9-0FCB-4FD5-822C-13988F860FFE}"/>
+              </a:ext>
+            </a:extLst>
+          </p:cNvPr>
+          <p:cNvSpPr/>
+          <p:nvPr/>
+        </p:nvSpPr>
+        <p:spPr>
+          <a:xfrm>
+            <a:off x="6457025" y="1462107"/>
+            <a:ext cx="5511282" cy="2997926"/>
+          </a:xfrm>
+          <a:prstGeom prst="cloudCallout">
+            <a:avLst/>
+          </a:prstGeom>
+        </p:spPr>
+        <p:style>
+          <a:lnRef idx="2">
+            <a:schemeClr val="accent1"/>
+          </a:lnRef>
+          <a:fillRef idx="1">
+            <a:schemeClr val="lt1"/>
+          </a:fillRef>
+          <a:effectRef idx="0">
+            <a:schemeClr val="accent1"/>
+          </a:effectRef>
+          <a:fontRef idx="minor">
+            <a:schemeClr val="dk1"/>
+          </a:fontRef>
+        </p:style>
+        <p:txBody>
+          <a:bodyPr rtlCol="0" anchor="ctr"/>
+          <a:lstStyle/>
+          <a:p>
+            <a:pPr algn="just"/>
+            <a:r>
+              <a:rPr lang="en-US" sz="2400" dirty="0">
+                <a:latin typeface="Ink Free" panose="03080402000500000000" pitchFamily="66" charset="0"/>
+              </a:rPr>
+              <a:t>We will be uploading our local repository to this GitHub hosted repository.</a:t>
+            </a:r>
+          </a:p>
+          <a:p>
+            <a:pPr algn="just"/>
+            <a:r>
+              <a:rPr lang="en-US" sz="2400" dirty="0">
+                <a:latin typeface="Ink Free" panose="03080402000500000000" pitchFamily="66" charset="0"/>
+              </a:rPr>
+              <a:t>So copy the link (.git link)</a:t>
+            </a:r>
+          </a:p>
+          <a:p>
+            <a:pPr algn="ctr"/>
+            <a:endParaRPr lang="en-US" sz="2400" b="1" dirty="0">
+              <a:latin typeface="Ink Free" panose="03080402000500000000" pitchFamily="66" charset="0"/>
+            </a:endParaRPr>
+          </a:p>
+        </p:txBody>
+      </p:sp>
+    </p:spTree>
+    <p:extLst>
+      <p:ext uri="{BB962C8B-B14F-4D97-AF65-F5344CB8AC3E}">
+        <p14:creationId xmlns:p14="http://schemas.microsoft.com/office/powerpoint/2010/main" val="3414935120"/>
+      </p:ext>
+    </p:extLst>
+  </p:cSld>
+  <p:clrMapOvr>
+    <a:masterClrMapping/>
+  </p:clrMapOvr>
+</p:sld>
+</file>
+
+<file path=ppt/slides/slide37.xml><?xml version="1.0" encoding="utf-8"?>
+<p:sld xmlns:a="http://schemas.openxmlformats.org/drawingml/2006/main" xmlns:r="http://schemas.openxmlformats.org/officeDocument/2006/relationships" xmlns:p="http://schemas.openxmlformats.org/presentationml/2006/main">
+  <p:cSld>
+    <p:spTree>
+      <p:nvGrpSpPr>
+        <p:cNvPr id="1" name=""/>
+        <p:cNvGrpSpPr/>
+        <p:nvPr/>
+      </p:nvGrpSpPr>
+      <p:grpSpPr>
+        <a:xfrm>
+          <a:off x="0" y="0"/>
+          <a:ext cx="0" cy="0"/>
+          <a:chOff x="0" y="0"/>
+          <a:chExt cx="0" cy="0"/>
+        </a:xfrm>
+      </p:grpSpPr>
+      <p:sp>
+        <p:nvSpPr>
+          <p:cNvPr id="2" name="Title 1">
+            <a:extLst>
+              <a:ext uri="{FF2B5EF4-FFF2-40B4-BE49-F238E27FC236}">
+                <a16:creationId xmlns:a16="http://schemas.microsoft.com/office/drawing/2014/main" id="{40C155C1-BCA4-4416-8772-8630A0D88240}"/>
+              </a:ext>
+            </a:extLst>
+          </p:cNvPr>
+          <p:cNvSpPr>
+            <a:spLocks noGrp="1"/>
+          </p:cNvSpPr>
+          <p:nvPr>
+            <p:ph type="title"/>
+          </p:nvPr>
+        </p:nvSpPr>
+        <p:spPr/>
+        <p:txBody>
+          <a:bodyPr/>
+          <a:lstStyle/>
+          <a:p>
+            <a:r>
+              <a:rPr lang="en-US" dirty="0"/>
+              <a:t>Uploading to remote repository</a:t>
+            </a:r>
+          </a:p>
+        </p:txBody>
+      </p:sp>
+      <p:sp>
+        <p:nvSpPr>
+          <p:cNvPr id="3" name="Content Placeholder 2">
+            <a:extLst>
+              <a:ext uri="{FF2B5EF4-FFF2-40B4-BE49-F238E27FC236}">
+                <a16:creationId xmlns:a16="http://schemas.microsoft.com/office/drawing/2014/main" id="{5275E6B4-FBCE-4763-8BA1-CAE168FED0E7}"/>
+              </a:ext>
+            </a:extLst>
+          </p:cNvPr>
+          <p:cNvSpPr>
+            <a:spLocks noGrp="1"/>
+          </p:cNvSpPr>
+          <p:nvPr>
+            <p:ph idx="1"/>
+          </p:nvPr>
+        </p:nvSpPr>
+        <p:spPr/>
+        <p:txBody>
+          <a:bodyPr/>
+          <a:lstStyle/>
+          <a:p>
+            <a:r>
+              <a:rPr lang="en-US" dirty="0"/>
+              <a:t>In such cases, the ‘</a:t>
+            </a:r>
+            <a:r>
+              <a:rPr lang="en-US" dirty="0">
+                <a:latin typeface="Consolas" panose="020B0609020204030204" pitchFamily="49" charset="0"/>
+              </a:rPr>
+              <a:t>git remote’ </a:t>
+            </a:r>
+            <a:r>
+              <a:rPr lang="en-US" dirty="0"/>
+              <a:t>command is used with its several parameters.</a:t>
+            </a:r>
+          </a:p>
+          <a:p>
+            <a:r>
+              <a:rPr lang="en-US" dirty="0"/>
+              <a:t>Run a ‘</a:t>
+            </a:r>
+            <a:r>
+              <a:rPr lang="en-US" dirty="0">
+                <a:latin typeface="Consolas" panose="020B0609020204030204" pitchFamily="49" charset="0"/>
+              </a:rPr>
+              <a:t>git remote’ on git-bash.</a:t>
+            </a:r>
+          </a:p>
+          <a:p>
+            <a:r>
+              <a:rPr lang="en-US" dirty="0"/>
+              <a:t>There will be not output since we have not configured remote repository with this local repository yet.</a:t>
+            </a:r>
+          </a:p>
+          <a:p>
+            <a:endParaRPr lang="en-US" dirty="0"/>
+          </a:p>
+          <a:p>
+            <a:r>
+              <a:rPr lang="en-US" dirty="0"/>
+              <a:t>Note:</a:t>
+            </a:r>
+          </a:p>
+          <a:p>
+            <a:r>
+              <a:rPr lang="en-US" dirty="0"/>
+              <a:t> ‘</a:t>
+            </a:r>
+            <a:r>
+              <a:rPr lang="en-US" dirty="0">
+                <a:latin typeface="Consolas" panose="020B0609020204030204" pitchFamily="49" charset="0"/>
+              </a:rPr>
+              <a:t>git remote’ </a:t>
+            </a:r>
+            <a:r>
+              <a:rPr lang="en-US" dirty="0"/>
+              <a:t>will show the list of remote repositories.</a:t>
+            </a:r>
+          </a:p>
+          <a:p>
+            <a:r>
+              <a:rPr lang="en-US" dirty="0"/>
+              <a:t>‘</a:t>
+            </a:r>
+            <a:r>
+              <a:rPr lang="en-US" dirty="0">
+                <a:latin typeface="Consolas" panose="020B0609020204030204" pitchFamily="49" charset="0"/>
+              </a:rPr>
+              <a:t>git remote -v’ </a:t>
+            </a:r>
+            <a:r>
+              <a:rPr lang="en-US" dirty="0"/>
+              <a:t>will also show list of remote repositories but with their respective links.</a:t>
+            </a:r>
+          </a:p>
+        </p:txBody>
+      </p:sp>
+      <p:sp>
+        <p:nvSpPr>
+          <p:cNvPr id="4" name="Flowchart: Alternate Process 3">
+            <a:extLst>
+              <a:ext uri="{FF2B5EF4-FFF2-40B4-BE49-F238E27FC236}">
+                <a16:creationId xmlns:a16="http://schemas.microsoft.com/office/drawing/2014/main" id="{426D9839-4731-420A-BDE8-EDF82B916579}"/>
+              </a:ext>
+            </a:extLst>
+          </p:cNvPr>
+          <p:cNvSpPr/>
+          <p:nvPr/>
+        </p:nvSpPr>
+        <p:spPr>
+          <a:xfrm>
+            <a:off x="951722" y="3694922"/>
+            <a:ext cx="9946433" cy="1828799"/>
+          </a:xfrm>
+          <a:prstGeom prst="flowChartAlternateProcess">
+            <a:avLst/>
+          </a:prstGeom>
+          <a:noFill/>
+          <a:ln w="38100">
+            <a:solidFill>
+              <a:srgbClr val="BD582C"/>
+            </a:solidFill>
+          </a:ln>
+        </p:spPr>
+        <p:style>
+          <a:lnRef idx="2">
+            <a:schemeClr val="accent1">
+              <a:shade val="50000"/>
+            </a:schemeClr>
+          </a:lnRef>
+          <a:fillRef idx="1">
+            <a:schemeClr val="accent1"/>
+          </a:fillRef>
+          <a:effectRef idx="0">
+            <a:schemeClr val="accent1"/>
+          </a:effectRef>
+          <a:fontRef idx="minor">
+            <a:schemeClr val="lt1"/>
+          </a:fontRef>
+        </p:style>
+        <p:txBody>
+          <a:bodyPr rtlCol="0" anchor="ctr"/>
+          <a:lstStyle/>
+          <a:p>
+            <a:pPr algn="ctr"/>
+            <a:endParaRPr lang="en-US"/>
+          </a:p>
+        </p:txBody>
+      </p:sp>
+    </p:spTree>
+    <p:extLst>
+      <p:ext uri="{BB962C8B-B14F-4D97-AF65-F5344CB8AC3E}">
+        <p14:creationId xmlns:p14="http://schemas.microsoft.com/office/powerpoint/2010/main" val="1730389312"/>
+      </p:ext>
+    </p:extLst>
+  </p:cSld>
+  <p:clrMapOvr>
+    <a:masterClrMapping/>
+  </p:clrMapOvr>
+</p:sld>
+</file>
+
+<file path=ppt/slides/slide38.xml><?xml version="1.0" encoding="utf-8"?>
+<p:sld xmlns:a="http://schemas.openxmlformats.org/drawingml/2006/main" xmlns:r="http://schemas.openxmlformats.org/officeDocument/2006/relationships" xmlns:p="http://schemas.openxmlformats.org/presentationml/2006/main">
+  <p:cSld>
+    <p:spTree>
+      <p:nvGrpSpPr>
+        <p:cNvPr id="1" name=""/>
+        <p:cNvGrpSpPr/>
+        <p:nvPr/>
+      </p:nvGrpSpPr>
+      <p:grpSpPr>
+        <a:xfrm>
+          <a:off x="0" y="0"/>
+          <a:ext cx="0" cy="0"/>
+          <a:chOff x="0" y="0"/>
+          <a:chExt cx="0" cy="0"/>
+        </a:xfrm>
+      </p:grpSpPr>
+      <p:sp>
+        <p:nvSpPr>
+          <p:cNvPr id="2" name="Title 1">
+            <a:extLst>
+              <a:ext uri="{FF2B5EF4-FFF2-40B4-BE49-F238E27FC236}">
+                <a16:creationId xmlns:a16="http://schemas.microsoft.com/office/drawing/2014/main" id="{40762207-31AE-4ED9-B110-486865070B2F}"/>
+              </a:ext>
+            </a:extLst>
+          </p:cNvPr>
+          <p:cNvSpPr>
+            <a:spLocks noGrp="1"/>
+          </p:cNvSpPr>
+          <p:nvPr>
+            <p:ph type="title"/>
+          </p:nvPr>
+        </p:nvSpPr>
+        <p:spPr/>
+        <p:txBody>
+          <a:bodyPr/>
+          <a:lstStyle/>
+          <a:p>
+            <a:r>
+              <a:rPr lang="en-US" dirty="0"/>
+              <a:t>Creating git remote configurations</a:t>
+            </a:r>
+          </a:p>
+        </p:txBody>
+      </p:sp>
+      <p:sp>
+        <p:nvSpPr>
+          <p:cNvPr id="3" name="Content Placeholder 2">
+            <a:extLst>
+              <a:ext uri="{FF2B5EF4-FFF2-40B4-BE49-F238E27FC236}">
+                <a16:creationId xmlns:a16="http://schemas.microsoft.com/office/drawing/2014/main" id="{22B9094F-39C8-492F-AF66-CC118989FC51}"/>
+              </a:ext>
+            </a:extLst>
+          </p:cNvPr>
+          <p:cNvSpPr>
+            <a:spLocks noGrp="1"/>
+          </p:cNvSpPr>
+          <p:nvPr>
+            <p:ph idx="1"/>
+          </p:nvPr>
+        </p:nvSpPr>
+        <p:spPr/>
+        <p:txBody>
+          <a:bodyPr/>
+          <a:lstStyle/>
+          <a:p>
+            <a:r>
+              <a:rPr lang="en-US" dirty="0"/>
+              <a:t>We use the following command to configure remote repository:</a:t>
+            </a:r>
+          </a:p>
+          <a:p>
+            <a:r>
+              <a:rPr lang="en-US" dirty="0">
+                <a:latin typeface="Consolas" panose="020B0609020204030204" pitchFamily="49" charset="0"/>
+              </a:rPr>
+              <a:t>git remote add &lt;name&gt; &lt;</a:t>
+            </a:r>
+            <a:r>
+              <a:rPr lang="en-US" dirty="0" err="1">
+                <a:latin typeface="Consolas" panose="020B0609020204030204" pitchFamily="49" charset="0"/>
+              </a:rPr>
+              <a:t>url</a:t>
+            </a:r>
+            <a:r>
+              <a:rPr lang="en-US" dirty="0">
+                <a:latin typeface="Consolas" panose="020B0609020204030204" pitchFamily="49" charset="0"/>
+              </a:rPr>
+              <a:t>&gt;</a:t>
+            </a:r>
+          </a:p>
+          <a:p>
+            <a:endParaRPr lang="en-US" dirty="0"/>
+          </a:p>
+          <a:p>
+            <a:r>
+              <a:rPr lang="en-US" dirty="0"/>
+              <a:t>In our case, it becomes as:</a:t>
+            </a:r>
+          </a:p>
+          <a:p>
+            <a:r>
+              <a:rPr lang="en-US" dirty="0">
+                <a:latin typeface="Consolas" panose="020B0609020204030204" pitchFamily="49" charset="0"/>
+              </a:rPr>
+              <a:t>git remote add &lt;any-name-for-remote&gt; &lt;recently-copied-.git-link&gt;</a:t>
+            </a:r>
+          </a:p>
+          <a:p>
+            <a:endParaRPr lang="en-US" dirty="0">
+              <a:latin typeface="Consolas" panose="020B0609020204030204" pitchFamily="49" charset="0"/>
+            </a:endParaRPr>
+          </a:p>
+          <a:p>
+            <a:r>
+              <a:rPr lang="en-US" dirty="0"/>
+              <a:t>After this, run </a:t>
+            </a:r>
+            <a:r>
+              <a:rPr lang="en-US" dirty="0">
+                <a:latin typeface="Consolas" panose="020B0609020204030204" pitchFamily="49" charset="0"/>
+              </a:rPr>
+              <a:t>‘git remote’</a:t>
+            </a:r>
+            <a:r>
+              <a:rPr lang="en-US" dirty="0"/>
+              <a:t> and </a:t>
+            </a:r>
+            <a:r>
+              <a:rPr lang="en-US" dirty="0">
+                <a:latin typeface="Consolas" panose="020B0609020204030204" pitchFamily="49" charset="0"/>
+              </a:rPr>
+              <a:t>‘git remote –v’.</a:t>
+            </a:r>
+          </a:p>
+          <a:p>
+            <a:r>
+              <a:rPr lang="en-US" dirty="0"/>
+              <a:t>There is now some output, since we have now configured a remote repository</a:t>
+            </a:r>
+          </a:p>
+        </p:txBody>
+      </p:sp>
+      <p:sp>
+        <p:nvSpPr>
+          <p:cNvPr id="4" name="Flowchart: Alternate Process 3">
+            <a:extLst>
+              <a:ext uri="{FF2B5EF4-FFF2-40B4-BE49-F238E27FC236}">
+                <a16:creationId xmlns:a16="http://schemas.microsoft.com/office/drawing/2014/main" id="{0EB02EA8-45BA-4DB0-9B6E-5E32D73E2788}"/>
+              </a:ext>
+            </a:extLst>
+          </p:cNvPr>
+          <p:cNvSpPr/>
+          <p:nvPr/>
+        </p:nvSpPr>
+        <p:spPr>
+          <a:xfrm>
+            <a:off x="858416" y="2216173"/>
+            <a:ext cx="4945225" cy="555019"/>
+          </a:xfrm>
+          <a:prstGeom prst="flowChartAlternateProcess">
+            <a:avLst/>
+          </a:prstGeom>
+          <a:noFill/>
+          <a:ln w="28575">
+            <a:solidFill>
+              <a:srgbClr val="BD582C"/>
+            </a:solidFill>
+          </a:ln>
+        </p:spPr>
+        <p:style>
+          <a:lnRef idx="2">
+            <a:schemeClr val="accent1">
+              <a:shade val="50000"/>
+            </a:schemeClr>
+          </a:lnRef>
+          <a:fillRef idx="1">
+            <a:schemeClr val="accent1"/>
+          </a:fillRef>
+          <a:effectRef idx="0">
+            <a:schemeClr val="accent1"/>
+          </a:effectRef>
+          <a:fontRef idx="minor">
+            <a:schemeClr val="lt1"/>
+          </a:fontRef>
+        </p:style>
+        <p:txBody>
+          <a:bodyPr rtlCol="0" anchor="ctr"/>
+          <a:lstStyle/>
+          <a:p>
+            <a:pPr algn="ctr"/>
+            <a:endParaRPr lang="en-US"/>
+          </a:p>
+        </p:txBody>
+      </p:sp>
+      <p:sp>
+        <p:nvSpPr>
+          <p:cNvPr id="6" name="Flowchart: Alternate Process 5">
+            <a:extLst>
+              <a:ext uri="{FF2B5EF4-FFF2-40B4-BE49-F238E27FC236}">
+                <a16:creationId xmlns:a16="http://schemas.microsoft.com/office/drawing/2014/main" id="{1C1AA072-F58B-40BE-8D26-16DAE9DBF603}"/>
+              </a:ext>
+            </a:extLst>
+          </p:cNvPr>
+          <p:cNvSpPr/>
+          <p:nvPr/>
+        </p:nvSpPr>
+        <p:spPr>
+          <a:xfrm>
+            <a:off x="693575" y="3570573"/>
+            <a:ext cx="9887339" cy="555019"/>
+          </a:xfrm>
+          <a:prstGeom prst="flowChartAlternateProcess">
+            <a:avLst/>
+          </a:prstGeom>
+          <a:noFill/>
+          <a:ln w="28575">
+            <a:solidFill>
+              <a:srgbClr val="BD582C"/>
+            </a:solidFill>
+          </a:ln>
+        </p:spPr>
+        <p:style>
+          <a:lnRef idx="2">
+            <a:schemeClr val="accent1">
+              <a:shade val="50000"/>
+            </a:schemeClr>
+          </a:lnRef>
+          <a:fillRef idx="1">
+            <a:schemeClr val="accent1"/>
+          </a:fillRef>
+          <a:effectRef idx="0">
+            <a:schemeClr val="accent1"/>
+          </a:effectRef>
+          <a:fontRef idx="minor">
+            <a:schemeClr val="lt1"/>
+          </a:fontRef>
+        </p:style>
+        <p:txBody>
+          <a:bodyPr rtlCol="0" anchor="ctr"/>
+          <a:lstStyle/>
+          <a:p>
+            <a:pPr algn="ctr"/>
+            <a:endParaRPr lang="en-US"/>
+          </a:p>
+        </p:txBody>
+      </p:sp>
+    </p:spTree>
+    <p:extLst>
+      <p:ext uri="{BB962C8B-B14F-4D97-AF65-F5344CB8AC3E}">
+        <p14:creationId xmlns:p14="http://schemas.microsoft.com/office/powerpoint/2010/main" val="3145774204"/>
+      </p:ext>
+    </p:extLst>
+  </p:cSld>
+  <p:clrMapOvr>
+    <a:masterClrMapping/>
+  </p:clrMapOvr>
+</p:sld>
+</file>
+
+<file path=ppt/slides/slide39.xml><?xml version="1.0" encoding="utf-8"?>
+<p:sld xmlns:a="http://schemas.openxmlformats.org/drawingml/2006/main" xmlns:r="http://schemas.openxmlformats.org/officeDocument/2006/relationships" xmlns:p="http://schemas.openxmlformats.org/presentationml/2006/main">
+  <p:cSld>
+    <p:spTree>
+      <p:nvGrpSpPr>
+        <p:cNvPr id="1" name=""/>
+        <p:cNvGrpSpPr/>
+        <p:nvPr/>
+      </p:nvGrpSpPr>
+      <p:grpSpPr>
+        <a:xfrm>
+          <a:off x="0" y="0"/>
+          <a:ext cx="0" cy="0"/>
+          <a:chOff x="0" y="0"/>
+          <a:chExt cx="0" cy="0"/>
+        </a:xfrm>
+      </p:grpSpPr>
+      <p:sp>
+        <p:nvSpPr>
+          <p:cNvPr id="2" name="Title 1">
+            <a:extLst>
+              <a:ext uri="{FF2B5EF4-FFF2-40B4-BE49-F238E27FC236}">
+                <a16:creationId xmlns:a16="http://schemas.microsoft.com/office/drawing/2014/main" id="{35FEECDF-7459-4468-867D-B230C3E93649}"/>
+              </a:ext>
+            </a:extLst>
+          </p:cNvPr>
+          <p:cNvSpPr>
+            <a:spLocks noGrp="1"/>
+          </p:cNvSpPr>
+          <p:nvPr>
+            <p:ph type="title"/>
+          </p:nvPr>
+        </p:nvSpPr>
+        <p:spPr/>
+        <p:txBody>
+          <a:bodyPr/>
+          <a:lstStyle/>
+          <a:p>
+            <a:r>
+              <a:rPr lang="en-US" dirty="0"/>
+              <a:t>Pushing your commits to remote repository</a:t>
+            </a:r>
+          </a:p>
+        </p:txBody>
+      </p:sp>
+      <p:sp>
+        <p:nvSpPr>
+          <p:cNvPr id="3" name="Content Placeholder 2">
+            <a:extLst>
+              <a:ext uri="{FF2B5EF4-FFF2-40B4-BE49-F238E27FC236}">
+                <a16:creationId xmlns:a16="http://schemas.microsoft.com/office/drawing/2014/main" id="{409EF702-25C4-4B77-8249-E7CB6EE31425}"/>
+              </a:ext>
+            </a:extLst>
+          </p:cNvPr>
+          <p:cNvSpPr>
+            <a:spLocks noGrp="1"/>
+          </p:cNvSpPr>
+          <p:nvPr>
+            <p:ph idx="1"/>
+          </p:nvPr>
+        </p:nvSpPr>
+        <p:spPr/>
+        <p:txBody>
+          <a:bodyPr>
+            <a:normAutofit fontScale="92500" lnSpcReduction="20000"/>
+          </a:bodyPr>
+          <a:lstStyle/>
+          <a:p>
+            <a:r>
+              <a:rPr lang="en-US" dirty="0"/>
+              <a:t>Now, lets push(upload) the local commits to remote repository.</a:t>
+            </a:r>
+          </a:p>
+          <a:p>
+            <a:r>
+              <a:rPr lang="en-US" dirty="0"/>
+              <a:t>We use </a:t>
+            </a:r>
+          </a:p>
+          <a:p>
+            <a:r>
+              <a:rPr lang="en-US" dirty="0">
+                <a:latin typeface="Consolas" panose="020B0609020204030204" pitchFamily="49" charset="0"/>
+              </a:rPr>
+              <a:t>git push &lt;remote-name&gt; master</a:t>
+            </a:r>
+          </a:p>
+          <a:p>
+            <a:endParaRPr lang="en-US" dirty="0">
+              <a:latin typeface="Consolas" panose="020B0609020204030204" pitchFamily="49" charset="0"/>
+            </a:endParaRPr>
+          </a:p>
+          <a:p>
+            <a:r>
+              <a:rPr lang="en-US" dirty="0"/>
+              <a:t>While pushing, a dialogue may prompt</a:t>
+            </a:r>
+          </a:p>
+          <a:p>
+            <a:r>
+              <a:rPr lang="en-US" dirty="0"/>
+              <a:t>asking for GitHub credentials</a:t>
+            </a:r>
+          </a:p>
+          <a:p>
+            <a:endParaRPr lang="en-US" dirty="0"/>
+          </a:p>
+          <a:p>
+            <a:r>
+              <a:rPr lang="en-US" dirty="0"/>
+              <a:t>Now if the push was successful, your local repository is now on remote </a:t>
+            </a:r>
+          </a:p>
+          <a:p>
+            <a:r>
+              <a:rPr lang="en-US" dirty="0"/>
+              <a:t>server as well.</a:t>
+            </a:r>
+          </a:p>
+          <a:p>
+            <a:r>
+              <a:rPr lang="en-US" dirty="0"/>
+              <a:t>It is an exact replica of your local repository persevering all the things.</a:t>
+            </a:r>
+          </a:p>
+          <a:p>
+            <a:endParaRPr lang="en-US" dirty="0"/>
+          </a:p>
+        </p:txBody>
+      </p:sp>
+      <p:sp>
+        <p:nvSpPr>
+          <p:cNvPr id="4" name="Flowchart: Alternate Process 3">
+            <a:extLst>
+              <a:ext uri="{FF2B5EF4-FFF2-40B4-BE49-F238E27FC236}">
+                <a16:creationId xmlns:a16="http://schemas.microsoft.com/office/drawing/2014/main" id="{58E129CB-B4AA-4EB8-BF6C-86945BA839BF}"/>
+              </a:ext>
+            </a:extLst>
+          </p:cNvPr>
+          <p:cNvSpPr/>
+          <p:nvPr/>
+        </p:nvSpPr>
+        <p:spPr>
+          <a:xfrm>
+            <a:off x="1036320" y="2555669"/>
+            <a:ext cx="4496734" cy="385884"/>
+          </a:xfrm>
+          <a:prstGeom prst="flowChartAlternateProcess">
+            <a:avLst/>
+          </a:prstGeom>
+          <a:noFill/>
+          <a:ln w="28575">
+            <a:solidFill>
+              <a:srgbClr val="BD582C"/>
+            </a:solidFill>
+          </a:ln>
+        </p:spPr>
+        <p:style>
+          <a:lnRef idx="2">
+            <a:schemeClr val="accent1">
+              <a:shade val="50000"/>
+            </a:schemeClr>
+          </a:lnRef>
+          <a:fillRef idx="1">
+            <a:schemeClr val="accent1"/>
+          </a:fillRef>
+          <a:effectRef idx="0">
+            <a:schemeClr val="accent1"/>
+          </a:effectRef>
+          <a:fontRef idx="minor">
+            <a:schemeClr val="lt1"/>
+          </a:fontRef>
+        </p:style>
+        <p:txBody>
+          <a:bodyPr rtlCol="0" anchor="ctr"/>
+          <a:lstStyle/>
+          <a:p>
+            <a:pPr algn="ctr"/>
+            <a:endParaRPr lang="en-US"/>
+          </a:p>
+        </p:txBody>
+      </p:sp>
+      <p:cxnSp>
+        <p:nvCxnSpPr>
+          <p:cNvPr id="6" name="Connector: Curved 5">
+            <a:extLst>
+              <a:ext uri="{FF2B5EF4-FFF2-40B4-BE49-F238E27FC236}">
+                <a16:creationId xmlns:a16="http://schemas.microsoft.com/office/drawing/2014/main" id="{1904D7B5-4A4E-4C21-8EF2-FC8C1FC2957F}"/>
+              </a:ext>
+            </a:extLst>
+          </p:cNvPr>
+          <p:cNvCxnSpPr>
+            <a:cxnSpLocks/>
+          </p:cNvCxnSpPr>
+          <p:nvPr/>
+        </p:nvCxnSpPr>
+        <p:spPr>
+          <a:xfrm>
+            <a:off x="5234473" y="2748611"/>
+            <a:ext cx="3797560" cy="1478156"/>
+          </a:xfrm>
+          <a:prstGeom prst="curvedConnector3">
+            <a:avLst/>
+          </a:prstGeom>
+          <a:ln w="19050">
+            <a:headEnd type="triangle"/>
+            <a:tailEnd type="triangle"/>
+          </a:ln>
+        </p:spPr>
+        <p:style>
+          <a:lnRef idx="1">
+            <a:schemeClr val="accent1"/>
+          </a:lnRef>
+          <a:fillRef idx="0">
+            <a:schemeClr val="accent1"/>
+          </a:fillRef>
+          <a:effectRef idx="0">
+            <a:schemeClr val="accent1"/>
+          </a:effectRef>
+          <a:fontRef idx="minor">
+            <a:schemeClr val="tx1"/>
+          </a:fontRef>
+        </p:style>
+      </p:cxnSp>
+      <p:sp>
+        <p:nvSpPr>
+          <p:cNvPr id="7" name="Rectangle: Top Corners Snipped 6">
+            <a:extLst>
+              <a:ext uri="{FF2B5EF4-FFF2-40B4-BE49-F238E27FC236}">
+                <a16:creationId xmlns:a16="http://schemas.microsoft.com/office/drawing/2014/main" id="{47B4649F-968E-4020-9127-3980D9ACE959}"/>
+              </a:ext>
+            </a:extLst>
+          </p:cNvPr>
+          <p:cNvSpPr/>
+          <p:nvPr/>
+        </p:nvSpPr>
+        <p:spPr>
+          <a:xfrm>
+            <a:off x="9209314" y="3219062"/>
+            <a:ext cx="2855168" cy="2265474"/>
+          </a:xfrm>
+          <a:prstGeom prst="snip2SameRect">
+            <a:avLst/>
+          </a:prstGeom>
+        </p:spPr>
+        <p:style>
+          <a:lnRef idx="2">
+            <a:schemeClr val="accent1"/>
+          </a:lnRef>
+          <a:fillRef idx="1">
+            <a:schemeClr val="lt1"/>
+          </a:fillRef>
+          <a:effectRef idx="0">
+            <a:schemeClr val="accent1"/>
+          </a:effectRef>
+          <a:fontRef idx="minor">
+            <a:schemeClr val="dk1"/>
+          </a:fontRef>
+        </p:style>
+        <p:txBody>
+          <a:bodyPr rtlCol="0" anchor="ctr"/>
+          <a:lstStyle/>
+          <a:p>
+            <a:pPr algn="ctr"/>
+            <a:r>
+              <a:rPr lang="en-US" dirty="0"/>
+              <a:t>Here master is the branch we wish to upload.</a:t>
+            </a:r>
+          </a:p>
+          <a:p>
+            <a:pPr algn="ctr"/>
+            <a:r>
+              <a:rPr lang="en-US" dirty="0"/>
+              <a:t>We will discuss about branches in next topic.</a:t>
+            </a:r>
+          </a:p>
+        </p:txBody>
+      </p:sp>
+    </p:spTree>
+    <p:extLst>
+      <p:ext uri="{BB962C8B-B14F-4D97-AF65-F5344CB8AC3E}">
+        <p14:creationId xmlns:p14="http://schemas.microsoft.com/office/powerpoint/2010/main" val="1769768775"/>
       </p:ext>
     </p:extLst>
   </p:cSld>
@@ -8605,6 +10710,1630 @@
     <p:extLst>
       <p:ext uri="{BB962C8B-B14F-4D97-AF65-F5344CB8AC3E}">
         <p14:creationId xmlns:p14="http://schemas.microsoft.com/office/powerpoint/2010/main" val="1864245104"/>
+      </p:ext>
+    </p:extLst>
+  </p:cSld>
+  <p:clrMapOvr>
+    <a:masterClrMapping/>
+  </p:clrMapOvr>
+</p:sld>
+</file>
+
+<file path=ppt/slides/slide40.xml><?xml version="1.0" encoding="utf-8"?>
+<p:sld xmlns:a="http://schemas.openxmlformats.org/drawingml/2006/main" xmlns:r="http://schemas.openxmlformats.org/officeDocument/2006/relationships" xmlns:p="http://schemas.openxmlformats.org/presentationml/2006/main">
+  <p:cSld>
+    <p:spTree>
+      <p:nvGrpSpPr>
+        <p:cNvPr id="1" name=""/>
+        <p:cNvGrpSpPr/>
+        <p:nvPr/>
+      </p:nvGrpSpPr>
+      <p:grpSpPr>
+        <a:xfrm>
+          <a:off x="0" y="0"/>
+          <a:ext cx="0" cy="0"/>
+          <a:chOff x="0" y="0"/>
+          <a:chExt cx="0" cy="0"/>
+        </a:xfrm>
+      </p:grpSpPr>
+      <p:sp>
+        <p:nvSpPr>
+          <p:cNvPr id="2" name="Title 1">
+            <a:extLst>
+              <a:ext uri="{FF2B5EF4-FFF2-40B4-BE49-F238E27FC236}">
+                <a16:creationId xmlns:a16="http://schemas.microsoft.com/office/drawing/2014/main" id="{98DE69AC-787C-445B-9D95-50BDC3A5912D}"/>
+              </a:ext>
+            </a:extLst>
+          </p:cNvPr>
+          <p:cNvSpPr>
+            <a:spLocks noGrp="1"/>
+          </p:cNvSpPr>
+          <p:nvPr>
+            <p:ph type="title"/>
+          </p:nvPr>
+        </p:nvSpPr>
+        <p:spPr/>
+        <p:txBody>
+          <a:bodyPr/>
+          <a:lstStyle/>
+          <a:p>
+            <a:r>
+              <a:rPr lang="en-US" b="1" dirty="0"/>
+              <a:t>Inspecting a Remote</a:t>
+            </a:r>
+            <a:r>
+              <a:rPr lang="en-US" dirty="0"/>
+              <a:t> </a:t>
+            </a:r>
+          </a:p>
+        </p:txBody>
+      </p:sp>
+      <p:sp>
+        <p:nvSpPr>
+          <p:cNvPr id="3" name="Content Placeholder 2">
+            <a:extLst>
+              <a:ext uri="{FF2B5EF4-FFF2-40B4-BE49-F238E27FC236}">
+                <a16:creationId xmlns:a16="http://schemas.microsoft.com/office/drawing/2014/main" id="{BD0BFD37-26C7-40CF-A9AA-802885792DFC}"/>
+              </a:ext>
+            </a:extLst>
+          </p:cNvPr>
+          <p:cNvSpPr>
+            <a:spLocks noGrp="1"/>
+          </p:cNvSpPr>
+          <p:nvPr>
+            <p:ph idx="1"/>
+          </p:nvPr>
+        </p:nvSpPr>
+        <p:spPr/>
+        <p:txBody>
+          <a:bodyPr/>
+          <a:lstStyle/>
+          <a:p>
+            <a:r>
+              <a:rPr lang="en-US" dirty="0"/>
+              <a:t>To see in-depth details about a remote, we use </a:t>
+            </a:r>
+            <a:r>
+              <a:rPr lang="en-US" dirty="0">
+                <a:latin typeface="Consolas" panose="020B0609020204030204" pitchFamily="49" charset="0"/>
+              </a:rPr>
+              <a:t>‘git remote show &lt;remote-name&gt;’ </a:t>
+            </a:r>
+            <a:r>
+              <a:rPr lang="en-US" dirty="0"/>
+              <a:t>command.</a:t>
+            </a:r>
+          </a:p>
+          <a:p>
+            <a:endParaRPr lang="en-US" dirty="0"/>
+          </a:p>
+          <a:p>
+            <a:r>
+              <a:rPr lang="en-US" dirty="0"/>
+              <a:t>Example: live-demo, and do for </a:t>
+            </a:r>
+            <a:r>
+              <a:rPr lang="en-US" dirty="0" err="1"/>
+              <a:t>youself</a:t>
+            </a:r>
+            <a:endParaRPr lang="en-US" dirty="0"/>
+          </a:p>
+        </p:txBody>
+      </p:sp>
+    </p:spTree>
+    <p:extLst>
+      <p:ext uri="{BB962C8B-B14F-4D97-AF65-F5344CB8AC3E}">
+        <p14:creationId xmlns:p14="http://schemas.microsoft.com/office/powerpoint/2010/main" val="2007693458"/>
+      </p:ext>
+    </p:extLst>
+  </p:cSld>
+  <p:clrMapOvr>
+    <a:masterClrMapping/>
+  </p:clrMapOvr>
+</p:sld>
+</file>
+
+<file path=ppt/slides/slide41.xml><?xml version="1.0" encoding="utf-8"?>
+<p:sld xmlns:a="http://schemas.openxmlformats.org/drawingml/2006/main" xmlns:r="http://schemas.openxmlformats.org/officeDocument/2006/relationships" xmlns:p="http://schemas.openxmlformats.org/presentationml/2006/main">
+  <p:cSld>
+    <p:spTree>
+      <p:nvGrpSpPr>
+        <p:cNvPr id="1" name=""/>
+        <p:cNvGrpSpPr/>
+        <p:nvPr/>
+      </p:nvGrpSpPr>
+      <p:grpSpPr>
+        <a:xfrm>
+          <a:off x="0" y="0"/>
+          <a:ext cx="0" cy="0"/>
+          <a:chOff x="0" y="0"/>
+          <a:chExt cx="0" cy="0"/>
+        </a:xfrm>
+      </p:grpSpPr>
+      <p:sp>
+        <p:nvSpPr>
+          <p:cNvPr id="2" name="Title 1">
+            <a:extLst>
+              <a:ext uri="{FF2B5EF4-FFF2-40B4-BE49-F238E27FC236}">
+                <a16:creationId xmlns:a16="http://schemas.microsoft.com/office/drawing/2014/main" id="{40C19095-C849-472E-89E7-41825097EA7B}"/>
+              </a:ext>
+            </a:extLst>
+          </p:cNvPr>
+          <p:cNvSpPr>
+            <a:spLocks noGrp="1"/>
+          </p:cNvSpPr>
+          <p:nvPr>
+            <p:ph type="title"/>
+          </p:nvPr>
+        </p:nvSpPr>
+        <p:spPr/>
+        <p:txBody>
+          <a:bodyPr/>
+          <a:lstStyle/>
+          <a:p>
+            <a:r>
+              <a:rPr lang="en-US" dirty="0"/>
+              <a:t>Making changes in remote repository</a:t>
+            </a:r>
+          </a:p>
+        </p:txBody>
+      </p:sp>
+      <p:sp>
+        <p:nvSpPr>
+          <p:cNvPr id="3" name="Content Placeholder 2">
+            <a:extLst>
+              <a:ext uri="{FF2B5EF4-FFF2-40B4-BE49-F238E27FC236}">
+                <a16:creationId xmlns:a16="http://schemas.microsoft.com/office/drawing/2014/main" id="{6965703E-4545-4E8F-89FC-A48C209B5783}"/>
+              </a:ext>
+            </a:extLst>
+          </p:cNvPr>
+          <p:cNvSpPr>
+            <a:spLocks noGrp="1"/>
+          </p:cNvSpPr>
+          <p:nvPr>
+            <p:ph idx="1"/>
+          </p:nvPr>
+        </p:nvSpPr>
+        <p:spPr>
+          <a:xfrm>
+            <a:off x="1097280" y="1845733"/>
+            <a:ext cx="10058400" cy="4480421"/>
+          </a:xfrm>
+        </p:spPr>
+        <p:txBody>
+          <a:bodyPr>
+            <a:normAutofit lnSpcReduction="10000"/>
+          </a:bodyPr>
+          <a:lstStyle/>
+          <a:p>
+            <a:r>
+              <a:rPr lang="en-US" dirty="0"/>
+              <a:t>Instead of making changes in local repository and then uploading them to remote repository,</a:t>
+            </a:r>
+          </a:p>
+          <a:p>
+            <a:r>
+              <a:rPr lang="en-US" dirty="0"/>
+              <a:t>Lets make a change in remote repository and pull(download) it to our local repository.</a:t>
+            </a:r>
+          </a:p>
+          <a:p>
+            <a:r>
+              <a:rPr lang="en-US" dirty="0"/>
+              <a:t>Steps:</a:t>
+            </a:r>
+          </a:p>
+          <a:p>
+            <a:pPr marL="457200" indent="-457200">
+              <a:buFont typeface="+mj-lt"/>
+              <a:buAutoNum type="arabicPeriod"/>
+            </a:pPr>
+            <a:r>
+              <a:rPr lang="en-US" dirty="0"/>
+              <a:t>Make a change in remote repository, </a:t>
+            </a:r>
+            <a:r>
+              <a:rPr lang="en-US" dirty="0" err="1"/>
+              <a:t>i.e</a:t>
+            </a:r>
+            <a:r>
+              <a:rPr lang="en-US" dirty="0"/>
+              <a:t> </a:t>
+            </a:r>
+            <a:r>
+              <a:rPr lang="en-US" dirty="0" err="1"/>
+              <a:t>github</a:t>
+            </a:r>
+            <a:r>
+              <a:rPr lang="en-US" dirty="0"/>
+              <a:t> repository.</a:t>
+            </a:r>
+          </a:p>
+          <a:p>
+            <a:pPr marL="457200" indent="-457200">
+              <a:buFont typeface="+mj-lt"/>
+              <a:buAutoNum type="arabicPeriod"/>
+            </a:pPr>
+            <a:r>
+              <a:rPr lang="en-US" dirty="0"/>
+              <a:t>Commit the change.</a:t>
+            </a:r>
+          </a:p>
+          <a:p>
+            <a:r>
+              <a:rPr lang="en-US" dirty="0"/>
+              <a:t>Example: Live demo</a:t>
+            </a:r>
+          </a:p>
+          <a:p>
+            <a:endParaRPr lang="en-US" dirty="0"/>
+          </a:p>
+          <a:p>
+            <a:r>
+              <a:rPr lang="en-US" dirty="0"/>
+              <a:t>After this point, there will be 3 commits on remote repository while there are still 2 commits on our local repository.</a:t>
+            </a:r>
+          </a:p>
+          <a:p>
+            <a:r>
+              <a:rPr lang="en-US" dirty="0"/>
+              <a:t>On such cases, one should make the local repository synchronized with remote repository, before doing any other commits.</a:t>
+            </a:r>
+          </a:p>
+          <a:p>
+            <a:endParaRPr lang="en-US" dirty="0"/>
+          </a:p>
+        </p:txBody>
+      </p:sp>
+    </p:spTree>
+    <p:extLst>
+      <p:ext uri="{BB962C8B-B14F-4D97-AF65-F5344CB8AC3E}">
+        <p14:creationId xmlns:p14="http://schemas.microsoft.com/office/powerpoint/2010/main" val="2822161931"/>
+      </p:ext>
+    </p:extLst>
+  </p:cSld>
+  <p:clrMapOvr>
+    <a:masterClrMapping/>
+  </p:clrMapOvr>
+</p:sld>
+</file>
+
+<file path=ppt/slides/slide42.xml><?xml version="1.0" encoding="utf-8"?>
+<p:sld xmlns:a="http://schemas.openxmlformats.org/drawingml/2006/main" xmlns:r="http://schemas.openxmlformats.org/officeDocument/2006/relationships" xmlns:p="http://schemas.openxmlformats.org/presentationml/2006/main">
+  <p:cSld>
+    <p:spTree>
+      <p:nvGrpSpPr>
+        <p:cNvPr id="1" name=""/>
+        <p:cNvGrpSpPr/>
+        <p:nvPr/>
+      </p:nvGrpSpPr>
+      <p:grpSpPr>
+        <a:xfrm>
+          <a:off x="0" y="0"/>
+          <a:ext cx="0" cy="0"/>
+          <a:chOff x="0" y="0"/>
+          <a:chExt cx="0" cy="0"/>
+        </a:xfrm>
+      </p:grpSpPr>
+      <p:sp>
+        <p:nvSpPr>
+          <p:cNvPr id="2" name="Title 1">
+            <a:extLst>
+              <a:ext uri="{FF2B5EF4-FFF2-40B4-BE49-F238E27FC236}">
+                <a16:creationId xmlns:a16="http://schemas.microsoft.com/office/drawing/2014/main" id="{28DADDF8-E528-4FE7-B40B-5AC3FB6D027C}"/>
+              </a:ext>
+            </a:extLst>
+          </p:cNvPr>
+          <p:cNvSpPr>
+            <a:spLocks noGrp="1"/>
+          </p:cNvSpPr>
+          <p:nvPr>
+            <p:ph type="title"/>
+          </p:nvPr>
+        </p:nvSpPr>
+        <p:spPr/>
+        <p:txBody>
+          <a:bodyPr/>
+          <a:lstStyle/>
+          <a:p>
+            <a:r>
+              <a:rPr lang="en-US" dirty="0"/>
+              <a:t>Pulling changes from remote repository</a:t>
+            </a:r>
+          </a:p>
+        </p:txBody>
+      </p:sp>
+      <p:sp>
+        <p:nvSpPr>
+          <p:cNvPr id="3" name="Content Placeholder 2">
+            <a:extLst>
+              <a:ext uri="{FF2B5EF4-FFF2-40B4-BE49-F238E27FC236}">
+                <a16:creationId xmlns:a16="http://schemas.microsoft.com/office/drawing/2014/main" id="{30296281-A42B-4415-82FC-8C8356A605F6}"/>
+              </a:ext>
+            </a:extLst>
+          </p:cNvPr>
+          <p:cNvSpPr>
+            <a:spLocks noGrp="1"/>
+          </p:cNvSpPr>
+          <p:nvPr>
+            <p:ph idx="1"/>
+          </p:nvPr>
+        </p:nvSpPr>
+        <p:spPr/>
+        <p:txBody>
+          <a:bodyPr/>
+          <a:lstStyle/>
+          <a:p>
+            <a:r>
+              <a:rPr lang="en-US" dirty="0"/>
+              <a:t>Lets run </a:t>
+            </a:r>
+            <a:r>
+              <a:rPr lang="en-US" dirty="0">
+                <a:latin typeface="Consolas" panose="020B0609020204030204" pitchFamily="49" charset="0"/>
+              </a:rPr>
+              <a:t>‘git remote show &lt;remote-name&gt;’ </a:t>
+            </a:r>
+            <a:r>
+              <a:rPr lang="en-US" dirty="0"/>
+              <a:t>to see changes about  remote repository.</a:t>
+            </a:r>
+          </a:p>
+          <a:p>
+            <a:r>
+              <a:rPr lang="en-US" dirty="0"/>
+              <a:t>It shall say that local is out of date, which means local repository is behind remote repository.</a:t>
+            </a:r>
+          </a:p>
+          <a:p>
+            <a:r>
+              <a:rPr lang="en-US" dirty="0"/>
+              <a:t>Now to pull changes to local repository, run</a:t>
+            </a:r>
+          </a:p>
+          <a:p>
+            <a:r>
+              <a:rPr lang="en-US" dirty="0">
+                <a:latin typeface="Consolas" panose="020B0609020204030204" pitchFamily="49" charset="0"/>
+              </a:rPr>
+              <a:t>git pull &lt;remote-name&gt; master</a:t>
+            </a:r>
+          </a:p>
+          <a:p>
+            <a:endParaRPr lang="en-US" dirty="0">
+              <a:latin typeface="Consolas" panose="020B0609020204030204" pitchFamily="49" charset="0"/>
+            </a:endParaRPr>
+          </a:p>
+          <a:p>
+            <a:r>
+              <a:rPr lang="en-US" dirty="0"/>
+              <a:t>After this run </a:t>
+            </a:r>
+            <a:r>
+              <a:rPr lang="en-US" dirty="0">
+                <a:latin typeface="Consolas" panose="020B0609020204030204" pitchFamily="49" charset="0"/>
+              </a:rPr>
+              <a:t>‘git log’ </a:t>
+            </a:r>
+            <a:r>
+              <a:rPr lang="en-US" dirty="0"/>
+              <a:t>and there shall be three commits shown,</a:t>
+            </a:r>
+          </a:p>
+          <a:p>
+            <a:r>
+              <a:rPr lang="en-US" dirty="0"/>
+              <a:t> which means successful pull was performed.</a:t>
+            </a:r>
+          </a:p>
+          <a:p>
+            <a:endParaRPr lang="en-US" dirty="0"/>
+          </a:p>
+        </p:txBody>
+      </p:sp>
+      <p:sp>
+        <p:nvSpPr>
+          <p:cNvPr id="4" name="Flowchart: Alternate Process 3">
+            <a:extLst>
+              <a:ext uri="{FF2B5EF4-FFF2-40B4-BE49-F238E27FC236}">
+                <a16:creationId xmlns:a16="http://schemas.microsoft.com/office/drawing/2014/main" id="{3FFC8894-909F-44B9-8E87-8167130E21B8}"/>
+              </a:ext>
+            </a:extLst>
+          </p:cNvPr>
+          <p:cNvSpPr/>
+          <p:nvPr/>
+        </p:nvSpPr>
+        <p:spPr>
+          <a:xfrm>
+            <a:off x="915021" y="3162158"/>
+            <a:ext cx="4683345" cy="430128"/>
+          </a:xfrm>
+          <a:prstGeom prst="flowChartAlternateProcess">
+            <a:avLst/>
+          </a:prstGeom>
+          <a:noFill/>
+          <a:ln w="28575">
+            <a:solidFill>
+              <a:srgbClr val="BD582C"/>
+            </a:solidFill>
+          </a:ln>
+        </p:spPr>
+        <p:style>
+          <a:lnRef idx="2">
+            <a:schemeClr val="accent1">
+              <a:shade val="50000"/>
+            </a:schemeClr>
+          </a:lnRef>
+          <a:fillRef idx="1">
+            <a:schemeClr val="accent1"/>
+          </a:fillRef>
+          <a:effectRef idx="0">
+            <a:schemeClr val="accent1"/>
+          </a:effectRef>
+          <a:fontRef idx="minor">
+            <a:schemeClr val="lt1"/>
+          </a:fontRef>
+        </p:style>
+        <p:txBody>
+          <a:bodyPr rtlCol="0" anchor="ctr"/>
+          <a:lstStyle/>
+          <a:p>
+            <a:pPr algn="ctr"/>
+            <a:endParaRPr lang="en-US"/>
+          </a:p>
+        </p:txBody>
+      </p:sp>
+      <p:sp>
+        <p:nvSpPr>
+          <p:cNvPr id="5" name="Rectangle: Top Corners Snipped 4">
+            <a:extLst>
+              <a:ext uri="{FF2B5EF4-FFF2-40B4-BE49-F238E27FC236}">
+                <a16:creationId xmlns:a16="http://schemas.microsoft.com/office/drawing/2014/main" id="{7A76E13F-04D2-4796-B79C-82188A51B5CC}"/>
+              </a:ext>
+            </a:extLst>
+          </p:cNvPr>
+          <p:cNvSpPr/>
+          <p:nvPr/>
+        </p:nvSpPr>
+        <p:spPr>
+          <a:xfrm>
+            <a:off x="8556171" y="2703621"/>
+            <a:ext cx="3635829" cy="1691097"/>
+          </a:xfrm>
+          <a:prstGeom prst="snip2SameRect">
+            <a:avLst/>
+          </a:prstGeom>
+        </p:spPr>
+        <p:style>
+          <a:lnRef idx="2">
+            <a:schemeClr val="accent1"/>
+          </a:lnRef>
+          <a:fillRef idx="1">
+            <a:schemeClr val="lt1"/>
+          </a:fillRef>
+          <a:effectRef idx="0">
+            <a:schemeClr val="accent1"/>
+          </a:effectRef>
+          <a:fontRef idx="minor">
+            <a:schemeClr val="dk1"/>
+          </a:fontRef>
+        </p:style>
+        <p:txBody>
+          <a:bodyPr rtlCol="0" anchor="ctr"/>
+          <a:lstStyle/>
+          <a:p>
+            <a:pPr algn="ctr"/>
+            <a:r>
+              <a:rPr lang="en-US" dirty="0"/>
+              <a:t>Here, master is the main branch, to which all changes will be </a:t>
+            </a:r>
+            <a:r>
+              <a:rPr lang="en-US" dirty="0" err="1"/>
+              <a:t>synchornised</a:t>
+            </a:r>
+            <a:r>
+              <a:rPr lang="en-US" dirty="0"/>
+              <a:t>.</a:t>
+            </a:r>
+          </a:p>
+          <a:p>
+            <a:pPr algn="ctr"/>
+            <a:r>
+              <a:rPr lang="en-US" dirty="0"/>
+              <a:t>We will discuss about branches in next topic.</a:t>
+            </a:r>
+          </a:p>
+        </p:txBody>
+      </p:sp>
+      <p:cxnSp>
+        <p:nvCxnSpPr>
+          <p:cNvPr id="6" name="Connector: Curved 5">
+            <a:extLst>
+              <a:ext uri="{FF2B5EF4-FFF2-40B4-BE49-F238E27FC236}">
+                <a16:creationId xmlns:a16="http://schemas.microsoft.com/office/drawing/2014/main" id="{E1371BDA-0A4A-441C-82F5-7B21DF203385}"/>
+              </a:ext>
+            </a:extLst>
+          </p:cNvPr>
+          <p:cNvCxnSpPr>
+            <a:cxnSpLocks/>
+          </p:cNvCxnSpPr>
+          <p:nvPr/>
+        </p:nvCxnSpPr>
+        <p:spPr>
+          <a:xfrm flipV="1">
+            <a:off x="5458408" y="3256384"/>
+            <a:ext cx="3284376" cy="172616"/>
+          </a:xfrm>
+          <a:prstGeom prst="curvedConnector3">
+            <a:avLst/>
+          </a:prstGeom>
+          <a:ln w="28575">
+            <a:headEnd type="triangle"/>
+            <a:tailEnd type="triangle"/>
+          </a:ln>
+        </p:spPr>
+        <p:style>
+          <a:lnRef idx="1">
+            <a:schemeClr val="accent1"/>
+          </a:lnRef>
+          <a:fillRef idx="0">
+            <a:schemeClr val="accent1"/>
+          </a:fillRef>
+          <a:effectRef idx="0">
+            <a:schemeClr val="accent1"/>
+          </a:effectRef>
+          <a:fontRef idx="minor">
+            <a:schemeClr val="tx1"/>
+          </a:fontRef>
+        </p:style>
+      </p:cxnSp>
+    </p:spTree>
+    <p:extLst>
+      <p:ext uri="{BB962C8B-B14F-4D97-AF65-F5344CB8AC3E}">
+        <p14:creationId xmlns:p14="http://schemas.microsoft.com/office/powerpoint/2010/main" val="347685739"/>
+      </p:ext>
+    </p:extLst>
+  </p:cSld>
+  <p:clrMapOvr>
+    <a:masterClrMapping/>
+  </p:clrMapOvr>
+</p:sld>
+</file>
+
+<file path=ppt/slides/slide43.xml><?xml version="1.0" encoding="utf-8"?>
+<p:sld xmlns:a="http://schemas.openxmlformats.org/drawingml/2006/main" xmlns:r="http://schemas.openxmlformats.org/officeDocument/2006/relationships" xmlns:p="http://schemas.openxmlformats.org/presentationml/2006/main">
+  <p:cSld>
+    <p:spTree>
+      <p:nvGrpSpPr>
+        <p:cNvPr id="1" name=""/>
+        <p:cNvGrpSpPr/>
+        <p:nvPr/>
+      </p:nvGrpSpPr>
+      <p:grpSpPr>
+        <a:xfrm>
+          <a:off x="0" y="0"/>
+          <a:ext cx="0" cy="0"/>
+          <a:chOff x="0" y="0"/>
+          <a:chExt cx="0" cy="0"/>
+        </a:xfrm>
+      </p:grpSpPr>
+      <p:sp>
+        <p:nvSpPr>
+          <p:cNvPr id="2" name="Title 1">
+            <a:extLst>
+              <a:ext uri="{FF2B5EF4-FFF2-40B4-BE49-F238E27FC236}">
+                <a16:creationId xmlns:a16="http://schemas.microsoft.com/office/drawing/2014/main" id="{D41C723D-A6A0-4B43-9E95-ACD79DBAA006}"/>
+              </a:ext>
+            </a:extLst>
+          </p:cNvPr>
+          <p:cNvSpPr>
+            <a:spLocks noGrp="1"/>
+          </p:cNvSpPr>
+          <p:nvPr>
+            <p:ph type="title"/>
+          </p:nvPr>
+        </p:nvSpPr>
+        <p:spPr/>
+        <p:txBody>
+          <a:bodyPr/>
+          <a:lstStyle/>
+          <a:p>
+            <a:r>
+              <a:rPr lang="en-US" dirty="0"/>
+              <a:t>Branching &amp; Merging</a:t>
+            </a:r>
+          </a:p>
+        </p:txBody>
+      </p:sp>
+      <p:sp>
+        <p:nvSpPr>
+          <p:cNvPr id="3" name="Content Placeholder 2">
+            <a:extLst>
+              <a:ext uri="{FF2B5EF4-FFF2-40B4-BE49-F238E27FC236}">
+                <a16:creationId xmlns:a16="http://schemas.microsoft.com/office/drawing/2014/main" id="{07174370-50DF-415F-985C-ACCAAECDC175}"/>
+              </a:ext>
+            </a:extLst>
+          </p:cNvPr>
+          <p:cNvSpPr>
+            <a:spLocks noGrp="1"/>
+          </p:cNvSpPr>
+          <p:nvPr>
+            <p:ph idx="1"/>
+          </p:nvPr>
+        </p:nvSpPr>
+        <p:spPr/>
+        <p:txBody>
+          <a:bodyPr/>
+          <a:lstStyle/>
+          <a:p>
+            <a:r>
+              <a:rPr lang="en-US" dirty="0"/>
+              <a:t>The necessity of branches :</a:t>
+            </a:r>
+          </a:p>
+          <a:p>
+            <a:r>
+              <a:rPr lang="en-US" dirty="0"/>
+              <a:t> And how is merging </a:t>
+            </a:r>
+            <a:r>
+              <a:rPr lang="en-US" dirty="0" err="1"/>
+              <a:t>perfomed</a:t>
+            </a:r>
+            <a:r>
+              <a:rPr lang="en-US" dirty="0"/>
+              <a:t>:</a:t>
+            </a:r>
+          </a:p>
+          <a:p>
+            <a:r>
+              <a:rPr lang="en-US" dirty="0"/>
+              <a:t>Merge types: FAST-FORWARD MERGE, TWO-WAY MERGE</a:t>
+            </a:r>
+          </a:p>
+          <a:p>
+            <a:endParaRPr lang="en-US" dirty="0"/>
+          </a:p>
+          <a:p>
+            <a:r>
+              <a:rPr lang="en-US" dirty="0"/>
+              <a:t>Explanation on whiteboard!</a:t>
+            </a:r>
+          </a:p>
+          <a:p>
+            <a:endParaRPr lang="en-US" dirty="0"/>
+          </a:p>
+          <a:p>
+            <a:r>
+              <a:rPr lang="en-US" dirty="0"/>
+              <a:t>How </a:t>
+            </a:r>
+            <a:r>
+              <a:rPr lang="en-US" dirty="0">
+                <a:latin typeface="Consolas" panose="020B0609020204030204" pitchFamily="49" charset="0"/>
+              </a:rPr>
+              <a:t>‘git status’ </a:t>
+            </a:r>
+            <a:r>
+              <a:rPr lang="en-US" dirty="0"/>
+              <a:t>and </a:t>
+            </a:r>
+            <a:r>
+              <a:rPr lang="en-US" dirty="0">
+                <a:latin typeface="Consolas" panose="020B0609020204030204" pitchFamily="49" charset="0"/>
+              </a:rPr>
+              <a:t>‘git log’ </a:t>
+            </a:r>
+            <a:r>
+              <a:rPr lang="en-US" dirty="0"/>
+              <a:t>work for branch :</a:t>
+            </a:r>
+          </a:p>
+          <a:p>
+            <a:endParaRPr lang="en-US" dirty="0"/>
+          </a:p>
+        </p:txBody>
+      </p:sp>
+    </p:spTree>
+    <p:extLst>
+      <p:ext uri="{BB962C8B-B14F-4D97-AF65-F5344CB8AC3E}">
+        <p14:creationId xmlns:p14="http://schemas.microsoft.com/office/powerpoint/2010/main" val="2574233268"/>
+      </p:ext>
+    </p:extLst>
+  </p:cSld>
+  <p:clrMapOvr>
+    <a:masterClrMapping/>
+  </p:clrMapOvr>
+</p:sld>
+</file>
+
+<file path=ppt/slides/slide44.xml><?xml version="1.0" encoding="utf-8"?>
+<p:sld xmlns:a="http://schemas.openxmlformats.org/drawingml/2006/main" xmlns:r="http://schemas.openxmlformats.org/officeDocument/2006/relationships" xmlns:p="http://schemas.openxmlformats.org/presentationml/2006/main">
+  <p:cSld>
+    <p:spTree>
+      <p:nvGrpSpPr>
+        <p:cNvPr id="1" name=""/>
+        <p:cNvGrpSpPr/>
+        <p:nvPr/>
+      </p:nvGrpSpPr>
+      <p:grpSpPr>
+        <a:xfrm>
+          <a:off x="0" y="0"/>
+          <a:ext cx="0" cy="0"/>
+          <a:chOff x="0" y="0"/>
+          <a:chExt cx="0" cy="0"/>
+        </a:xfrm>
+      </p:grpSpPr>
+      <p:sp>
+        <p:nvSpPr>
+          <p:cNvPr id="2" name="Title 1">
+            <a:extLst>
+              <a:ext uri="{FF2B5EF4-FFF2-40B4-BE49-F238E27FC236}">
+                <a16:creationId xmlns:a16="http://schemas.microsoft.com/office/drawing/2014/main" id="{AE4D65C6-7F63-4DF0-908D-33639FF39CEA}"/>
+              </a:ext>
+            </a:extLst>
+          </p:cNvPr>
+          <p:cNvSpPr>
+            <a:spLocks noGrp="1"/>
+          </p:cNvSpPr>
+          <p:nvPr>
+            <p:ph type="title"/>
+          </p:nvPr>
+        </p:nvSpPr>
+        <p:spPr/>
+        <p:txBody>
+          <a:bodyPr/>
+          <a:lstStyle/>
+          <a:p>
+            <a:r>
+              <a:rPr lang="en-US" dirty="0"/>
+              <a:t>Creating a branch</a:t>
+            </a:r>
+          </a:p>
+        </p:txBody>
+      </p:sp>
+      <p:sp>
+        <p:nvSpPr>
+          <p:cNvPr id="3" name="Content Placeholder 2">
+            <a:extLst>
+              <a:ext uri="{FF2B5EF4-FFF2-40B4-BE49-F238E27FC236}">
+                <a16:creationId xmlns:a16="http://schemas.microsoft.com/office/drawing/2014/main" id="{D9EF82B3-F79C-44C2-A0A1-7886D86F991C}"/>
+              </a:ext>
+            </a:extLst>
+          </p:cNvPr>
+          <p:cNvSpPr>
+            <a:spLocks noGrp="1"/>
+          </p:cNvSpPr>
+          <p:nvPr>
+            <p:ph idx="1"/>
+          </p:nvPr>
+        </p:nvSpPr>
+        <p:spPr/>
+        <p:txBody>
+          <a:bodyPr/>
+          <a:lstStyle/>
+          <a:p>
+            <a:r>
+              <a:rPr lang="en-US" dirty="0"/>
+              <a:t>A branch can be created using command:</a:t>
+            </a:r>
+          </a:p>
+          <a:p>
+            <a:r>
+              <a:rPr lang="en-US" dirty="0">
+                <a:latin typeface="Consolas" panose="020B0609020204030204" pitchFamily="49" charset="0"/>
+              </a:rPr>
+              <a:t> git branch &lt;branch-name&gt;</a:t>
+            </a:r>
+          </a:p>
+          <a:p>
+            <a:endParaRPr lang="en-US" dirty="0"/>
+          </a:p>
+          <a:p>
+            <a:r>
+              <a:rPr lang="en-US" dirty="0"/>
+              <a:t>To see the list of all branches, we can run :</a:t>
+            </a:r>
+          </a:p>
+          <a:p>
+            <a:r>
+              <a:rPr lang="en-US" dirty="0">
+                <a:latin typeface="Consolas" panose="020B0609020204030204" pitchFamily="49" charset="0"/>
+              </a:rPr>
+              <a:t>git branch              </a:t>
+            </a:r>
+            <a:r>
+              <a:rPr lang="en-US" dirty="0"/>
+              <a:t>or 	</a:t>
+            </a:r>
+            <a:r>
+              <a:rPr lang="en-US" dirty="0">
+                <a:latin typeface="Consolas" panose="020B0609020204030204" pitchFamily="49" charset="0"/>
+              </a:rPr>
+              <a:t>git branch --list    </a:t>
+            </a:r>
+          </a:p>
+          <a:p>
+            <a:r>
+              <a:rPr lang="en-US" dirty="0"/>
+              <a:t>These commands show only the local branches</a:t>
+            </a:r>
+          </a:p>
+          <a:p>
+            <a:r>
+              <a:rPr lang="en-US" dirty="0"/>
+              <a:t>To see both local and remote branches, run        </a:t>
+            </a:r>
+            <a:r>
+              <a:rPr lang="en-US" dirty="0">
+                <a:latin typeface="Consolas" panose="020B0609020204030204" pitchFamily="49" charset="0"/>
+              </a:rPr>
+              <a:t>git branch --all </a:t>
+            </a:r>
+          </a:p>
+          <a:p>
+            <a:endParaRPr lang="en-US" dirty="0"/>
+          </a:p>
+        </p:txBody>
+      </p:sp>
+      <p:sp>
+        <p:nvSpPr>
+          <p:cNvPr id="4" name="Flowchart: Alternate Process 3">
+            <a:extLst>
+              <a:ext uri="{FF2B5EF4-FFF2-40B4-BE49-F238E27FC236}">
+                <a16:creationId xmlns:a16="http://schemas.microsoft.com/office/drawing/2014/main" id="{3F37A78A-41A6-4245-BBA8-28627B629DAD}"/>
+              </a:ext>
+            </a:extLst>
+          </p:cNvPr>
+          <p:cNvSpPr/>
+          <p:nvPr/>
+        </p:nvSpPr>
+        <p:spPr>
+          <a:xfrm>
+            <a:off x="859038" y="2257089"/>
+            <a:ext cx="4683345" cy="430128"/>
+          </a:xfrm>
+          <a:prstGeom prst="flowChartAlternateProcess">
+            <a:avLst/>
+          </a:prstGeom>
+          <a:noFill/>
+          <a:ln w="28575">
+            <a:solidFill>
+              <a:srgbClr val="BD582C"/>
+            </a:solidFill>
+          </a:ln>
+        </p:spPr>
+        <p:style>
+          <a:lnRef idx="2">
+            <a:schemeClr val="accent1">
+              <a:shade val="50000"/>
+            </a:schemeClr>
+          </a:lnRef>
+          <a:fillRef idx="1">
+            <a:schemeClr val="accent1"/>
+          </a:fillRef>
+          <a:effectRef idx="0">
+            <a:schemeClr val="accent1"/>
+          </a:effectRef>
+          <a:fontRef idx="minor">
+            <a:schemeClr val="lt1"/>
+          </a:fontRef>
+        </p:style>
+        <p:txBody>
+          <a:bodyPr rtlCol="0" anchor="ctr"/>
+          <a:lstStyle/>
+          <a:p>
+            <a:pPr algn="ctr"/>
+            <a:endParaRPr lang="en-US"/>
+          </a:p>
+        </p:txBody>
+      </p:sp>
+      <p:sp>
+        <p:nvSpPr>
+          <p:cNvPr id="5" name="Flowchart: Alternate Process 4">
+            <a:extLst>
+              <a:ext uri="{FF2B5EF4-FFF2-40B4-BE49-F238E27FC236}">
+                <a16:creationId xmlns:a16="http://schemas.microsoft.com/office/drawing/2014/main" id="{6E702E2F-AEC4-4264-AF67-41FDC7B5B59E}"/>
+              </a:ext>
+            </a:extLst>
+          </p:cNvPr>
+          <p:cNvSpPr/>
+          <p:nvPr/>
+        </p:nvSpPr>
+        <p:spPr>
+          <a:xfrm>
+            <a:off x="859038" y="3629179"/>
+            <a:ext cx="2086325" cy="430128"/>
+          </a:xfrm>
+          <a:prstGeom prst="flowChartAlternateProcess">
+            <a:avLst/>
+          </a:prstGeom>
+          <a:noFill/>
+          <a:ln w="28575">
+            <a:solidFill>
+              <a:srgbClr val="BD582C"/>
+            </a:solidFill>
+          </a:ln>
+        </p:spPr>
+        <p:style>
+          <a:lnRef idx="2">
+            <a:schemeClr val="accent1">
+              <a:shade val="50000"/>
+            </a:schemeClr>
+          </a:lnRef>
+          <a:fillRef idx="1">
+            <a:schemeClr val="accent1"/>
+          </a:fillRef>
+          <a:effectRef idx="0">
+            <a:schemeClr val="accent1"/>
+          </a:effectRef>
+          <a:fontRef idx="minor">
+            <a:schemeClr val="lt1"/>
+          </a:fontRef>
+        </p:style>
+        <p:txBody>
+          <a:bodyPr rtlCol="0" anchor="ctr"/>
+          <a:lstStyle/>
+          <a:p>
+            <a:pPr algn="ctr"/>
+            <a:endParaRPr lang="en-US"/>
+          </a:p>
+        </p:txBody>
+      </p:sp>
+      <p:sp>
+        <p:nvSpPr>
+          <p:cNvPr id="6" name="Flowchart: Alternate Process 5">
+            <a:extLst>
+              <a:ext uri="{FF2B5EF4-FFF2-40B4-BE49-F238E27FC236}">
+                <a16:creationId xmlns:a16="http://schemas.microsoft.com/office/drawing/2014/main" id="{8D756D62-9BE9-4011-9037-2EDACB99FCFB}"/>
+              </a:ext>
+            </a:extLst>
+          </p:cNvPr>
+          <p:cNvSpPr/>
+          <p:nvPr/>
+        </p:nvSpPr>
+        <p:spPr>
+          <a:xfrm>
+            <a:off x="5439748" y="3626988"/>
+            <a:ext cx="2967134" cy="432319"/>
+          </a:xfrm>
+          <a:prstGeom prst="flowChartAlternateProcess">
+            <a:avLst/>
+          </a:prstGeom>
+          <a:noFill/>
+          <a:ln w="28575">
+            <a:solidFill>
+              <a:srgbClr val="BD582C"/>
+            </a:solidFill>
+          </a:ln>
+        </p:spPr>
+        <p:style>
+          <a:lnRef idx="2">
+            <a:schemeClr val="accent1">
+              <a:shade val="50000"/>
+            </a:schemeClr>
+          </a:lnRef>
+          <a:fillRef idx="1">
+            <a:schemeClr val="accent1"/>
+          </a:fillRef>
+          <a:effectRef idx="0">
+            <a:schemeClr val="accent1"/>
+          </a:effectRef>
+          <a:fontRef idx="minor">
+            <a:schemeClr val="lt1"/>
+          </a:fontRef>
+        </p:style>
+        <p:txBody>
+          <a:bodyPr rtlCol="0" anchor="ctr"/>
+          <a:lstStyle/>
+          <a:p>
+            <a:pPr algn="ctr"/>
+            <a:endParaRPr lang="en-US"/>
+          </a:p>
+        </p:txBody>
+      </p:sp>
+      <p:sp>
+        <p:nvSpPr>
+          <p:cNvPr id="7" name="Flowchart: Alternate Process 6">
+            <a:extLst>
+              <a:ext uri="{FF2B5EF4-FFF2-40B4-BE49-F238E27FC236}">
+                <a16:creationId xmlns:a16="http://schemas.microsoft.com/office/drawing/2014/main" id="{DE4BEC24-4DB9-470A-B3CA-8DE4671E6F38}"/>
+              </a:ext>
+            </a:extLst>
+          </p:cNvPr>
+          <p:cNvSpPr/>
+          <p:nvPr/>
+        </p:nvSpPr>
+        <p:spPr>
+          <a:xfrm>
+            <a:off x="5918719" y="4531881"/>
+            <a:ext cx="2572138" cy="432319"/>
+          </a:xfrm>
+          <a:prstGeom prst="flowChartAlternateProcess">
+            <a:avLst/>
+          </a:prstGeom>
+          <a:noFill/>
+          <a:ln w="28575">
+            <a:solidFill>
+              <a:srgbClr val="BD582C"/>
+            </a:solidFill>
+          </a:ln>
+        </p:spPr>
+        <p:style>
+          <a:lnRef idx="2">
+            <a:schemeClr val="accent1">
+              <a:shade val="50000"/>
+            </a:schemeClr>
+          </a:lnRef>
+          <a:fillRef idx="1">
+            <a:schemeClr val="accent1"/>
+          </a:fillRef>
+          <a:effectRef idx="0">
+            <a:schemeClr val="accent1"/>
+          </a:effectRef>
+          <a:fontRef idx="minor">
+            <a:schemeClr val="lt1"/>
+          </a:fontRef>
+        </p:style>
+        <p:txBody>
+          <a:bodyPr rtlCol="0" anchor="ctr"/>
+          <a:lstStyle/>
+          <a:p>
+            <a:pPr algn="ctr"/>
+            <a:endParaRPr lang="en-US"/>
+          </a:p>
+        </p:txBody>
+      </p:sp>
+    </p:spTree>
+    <p:extLst>
+      <p:ext uri="{BB962C8B-B14F-4D97-AF65-F5344CB8AC3E}">
+        <p14:creationId xmlns:p14="http://schemas.microsoft.com/office/powerpoint/2010/main" val="1435295398"/>
+      </p:ext>
+    </p:extLst>
+  </p:cSld>
+  <p:clrMapOvr>
+    <a:masterClrMapping/>
+  </p:clrMapOvr>
+</p:sld>
+</file>
+
+<file path=ppt/slides/slide45.xml><?xml version="1.0" encoding="utf-8"?>
+<p:sld xmlns:a="http://schemas.openxmlformats.org/drawingml/2006/main" xmlns:r="http://schemas.openxmlformats.org/officeDocument/2006/relationships" xmlns:p="http://schemas.openxmlformats.org/presentationml/2006/main">
+  <p:cSld>
+    <p:spTree>
+      <p:nvGrpSpPr>
+        <p:cNvPr id="1" name=""/>
+        <p:cNvGrpSpPr/>
+        <p:nvPr/>
+      </p:nvGrpSpPr>
+      <p:grpSpPr>
+        <a:xfrm>
+          <a:off x="0" y="0"/>
+          <a:ext cx="0" cy="0"/>
+          <a:chOff x="0" y="0"/>
+          <a:chExt cx="0" cy="0"/>
+        </a:xfrm>
+      </p:grpSpPr>
+      <p:sp>
+        <p:nvSpPr>
+          <p:cNvPr id="2" name="Title 1">
+            <a:extLst>
+              <a:ext uri="{FF2B5EF4-FFF2-40B4-BE49-F238E27FC236}">
+                <a16:creationId xmlns:a16="http://schemas.microsoft.com/office/drawing/2014/main" id="{4650F2D1-25C0-474E-9CFE-4BC774A81C7E}"/>
+              </a:ext>
+            </a:extLst>
+          </p:cNvPr>
+          <p:cNvSpPr>
+            <a:spLocks noGrp="1"/>
+          </p:cNvSpPr>
+          <p:nvPr>
+            <p:ph type="title"/>
+          </p:nvPr>
+        </p:nvSpPr>
+        <p:spPr/>
+        <p:txBody>
+          <a:bodyPr/>
+          <a:lstStyle/>
+          <a:p>
+            <a:r>
+              <a:rPr lang="en-US" dirty="0"/>
+              <a:t>Switching to a branch</a:t>
+            </a:r>
+          </a:p>
+        </p:txBody>
+      </p:sp>
+      <p:sp>
+        <p:nvSpPr>
+          <p:cNvPr id="3" name="Content Placeholder 2">
+            <a:extLst>
+              <a:ext uri="{FF2B5EF4-FFF2-40B4-BE49-F238E27FC236}">
+                <a16:creationId xmlns:a16="http://schemas.microsoft.com/office/drawing/2014/main" id="{7E25DB4D-A61D-46B8-99B2-1F7F008EBD81}"/>
+              </a:ext>
+            </a:extLst>
+          </p:cNvPr>
+          <p:cNvSpPr>
+            <a:spLocks noGrp="1"/>
+          </p:cNvSpPr>
+          <p:nvPr>
+            <p:ph idx="1"/>
+          </p:nvPr>
+        </p:nvSpPr>
+        <p:spPr/>
+        <p:txBody>
+          <a:bodyPr/>
+          <a:lstStyle/>
+          <a:p>
+            <a:r>
+              <a:rPr lang="en-US" dirty="0"/>
+              <a:t>To make changes to a branch, it should be checked out or switched to.</a:t>
+            </a:r>
+          </a:p>
+          <a:p>
+            <a:r>
+              <a:rPr lang="en-US" dirty="0"/>
+              <a:t>To checkout a branch, we can run:</a:t>
+            </a:r>
+          </a:p>
+          <a:p>
+            <a:r>
+              <a:rPr lang="en-US" dirty="0">
+                <a:latin typeface="Consolas" panose="020B0609020204030204" pitchFamily="49" charset="0"/>
+              </a:rPr>
+              <a:t>git checkout &lt;branch-name&gt;</a:t>
+            </a:r>
+          </a:p>
+          <a:p>
+            <a:endParaRPr lang="en-US" dirty="0"/>
+          </a:p>
+          <a:p>
+            <a:r>
+              <a:rPr lang="en-US" dirty="0"/>
+              <a:t>Or,</a:t>
+            </a:r>
+          </a:p>
+          <a:p>
+            <a:endParaRPr lang="en-US" dirty="0"/>
+          </a:p>
+          <a:p>
+            <a:r>
+              <a:rPr lang="en-US" dirty="0">
+                <a:latin typeface="Consolas" panose="020B0609020204030204" pitchFamily="49" charset="0"/>
+              </a:rPr>
+              <a:t>git switch &lt;branch-name&gt;</a:t>
+            </a:r>
+          </a:p>
+          <a:p>
+            <a:endParaRPr lang="en-US" dirty="0"/>
+          </a:p>
+          <a:p>
+            <a:r>
+              <a:rPr lang="en-US" dirty="0"/>
+              <a:t>Both are equivalent!</a:t>
+            </a:r>
+          </a:p>
+        </p:txBody>
+      </p:sp>
+      <p:sp>
+        <p:nvSpPr>
+          <p:cNvPr id="5" name="Flowchart: Alternate Process 4">
+            <a:extLst>
+              <a:ext uri="{FF2B5EF4-FFF2-40B4-BE49-F238E27FC236}">
+                <a16:creationId xmlns:a16="http://schemas.microsoft.com/office/drawing/2014/main" id="{3DCE1E11-8D68-404C-9DCF-79239DCC5CD8}"/>
+              </a:ext>
+            </a:extLst>
+          </p:cNvPr>
+          <p:cNvSpPr/>
+          <p:nvPr/>
+        </p:nvSpPr>
+        <p:spPr>
+          <a:xfrm>
+            <a:off x="1097280" y="4525347"/>
+            <a:ext cx="3596018" cy="457691"/>
+          </a:xfrm>
+          <a:prstGeom prst="flowChartAlternateProcess">
+            <a:avLst/>
+          </a:prstGeom>
+          <a:noFill/>
+          <a:ln w="28575">
+            <a:solidFill>
+              <a:srgbClr val="BD582C"/>
+            </a:solidFill>
+          </a:ln>
+        </p:spPr>
+        <p:style>
+          <a:lnRef idx="2">
+            <a:schemeClr val="accent1">
+              <a:shade val="50000"/>
+            </a:schemeClr>
+          </a:lnRef>
+          <a:fillRef idx="1">
+            <a:schemeClr val="accent1"/>
+          </a:fillRef>
+          <a:effectRef idx="0">
+            <a:schemeClr val="accent1"/>
+          </a:effectRef>
+          <a:fontRef idx="minor">
+            <a:schemeClr val="lt1"/>
+          </a:fontRef>
+        </p:style>
+        <p:txBody>
+          <a:bodyPr rtlCol="0" anchor="ctr"/>
+          <a:lstStyle/>
+          <a:p>
+            <a:pPr algn="ctr"/>
+            <a:endParaRPr lang="en-US"/>
+          </a:p>
+        </p:txBody>
+      </p:sp>
+      <p:sp>
+        <p:nvSpPr>
+          <p:cNvPr id="6" name="Flowchart: Alternate Process 5">
+            <a:extLst>
+              <a:ext uri="{FF2B5EF4-FFF2-40B4-BE49-F238E27FC236}">
+                <a16:creationId xmlns:a16="http://schemas.microsoft.com/office/drawing/2014/main" id="{D48C8743-6B75-4FFA-8D1D-5FA29C170802}"/>
+              </a:ext>
+            </a:extLst>
+          </p:cNvPr>
+          <p:cNvSpPr/>
+          <p:nvPr/>
+        </p:nvSpPr>
+        <p:spPr>
+          <a:xfrm>
+            <a:off x="1097280" y="2727851"/>
+            <a:ext cx="3908904" cy="457690"/>
+          </a:xfrm>
+          <a:prstGeom prst="flowChartAlternateProcess">
+            <a:avLst/>
+          </a:prstGeom>
+          <a:noFill/>
+          <a:ln w="28575">
+            <a:solidFill>
+              <a:srgbClr val="BD582C"/>
+            </a:solidFill>
+          </a:ln>
+        </p:spPr>
+        <p:style>
+          <a:lnRef idx="2">
+            <a:schemeClr val="accent1">
+              <a:shade val="50000"/>
+            </a:schemeClr>
+          </a:lnRef>
+          <a:fillRef idx="1">
+            <a:schemeClr val="accent1"/>
+          </a:fillRef>
+          <a:effectRef idx="0">
+            <a:schemeClr val="accent1"/>
+          </a:effectRef>
+          <a:fontRef idx="minor">
+            <a:schemeClr val="lt1"/>
+          </a:fontRef>
+        </p:style>
+        <p:txBody>
+          <a:bodyPr rtlCol="0" anchor="ctr"/>
+          <a:lstStyle/>
+          <a:p>
+            <a:pPr algn="ctr"/>
+            <a:endParaRPr lang="en-US"/>
+          </a:p>
+        </p:txBody>
+      </p:sp>
+    </p:spTree>
+    <p:extLst>
+      <p:ext uri="{BB962C8B-B14F-4D97-AF65-F5344CB8AC3E}">
+        <p14:creationId xmlns:p14="http://schemas.microsoft.com/office/powerpoint/2010/main" val="1338461564"/>
+      </p:ext>
+    </p:extLst>
+  </p:cSld>
+  <p:clrMapOvr>
+    <a:masterClrMapping/>
+  </p:clrMapOvr>
+</p:sld>
+</file>
+
+<file path=ppt/slides/slide46.xml><?xml version="1.0" encoding="utf-8"?>
+<p:sld xmlns:a="http://schemas.openxmlformats.org/drawingml/2006/main" xmlns:r="http://schemas.openxmlformats.org/officeDocument/2006/relationships" xmlns:p="http://schemas.openxmlformats.org/presentationml/2006/main">
+  <p:cSld>
+    <p:spTree>
+      <p:nvGrpSpPr>
+        <p:cNvPr id="1" name=""/>
+        <p:cNvGrpSpPr/>
+        <p:nvPr/>
+      </p:nvGrpSpPr>
+      <p:grpSpPr>
+        <a:xfrm>
+          <a:off x="0" y="0"/>
+          <a:ext cx="0" cy="0"/>
+          <a:chOff x="0" y="0"/>
+          <a:chExt cx="0" cy="0"/>
+        </a:xfrm>
+      </p:grpSpPr>
+      <p:sp>
+        <p:nvSpPr>
+          <p:cNvPr id="2" name="Title 1">
+            <a:extLst>
+              <a:ext uri="{FF2B5EF4-FFF2-40B4-BE49-F238E27FC236}">
+                <a16:creationId xmlns:a16="http://schemas.microsoft.com/office/drawing/2014/main" id="{32871F3D-D512-47FC-9B30-18AA3D45F3F1}"/>
+              </a:ext>
+            </a:extLst>
+          </p:cNvPr>
+          <p:cNvSpPr>
+            <a:spLocks noGrp="1"/>
+          </p:cNvSpPr>
+          <p:nvPr>
+            <p:ph type="title"/>
+          </p:nvPr>
+        </p:nvSpPr>
+        <p:spPr/>
+        <p:txBody>
+          <a:bodyPr/>
+          <a:lstStyle/>
+          <a:p>
+            <a:r>
+              <a:rPr lang="en-US" dirty="0"/>
+              <a:t>Deleting a branch</a:t>
+            </a:r>
+          </a:p>
+        </p:txBody>
+      </p:sp>
+      <p:sp>
+        <p:nvSpPr>
+          <p:cNvPr id="3" name="Content Placeholder 2">
+            <a:extLst>
+              <a:ext uri="{FF2B5EF4-FFF2-40B4-BE49-F238E27FC236}">
+                <a16:creationId xmlns:a16="http://schemas.microsoft.com/office/drawing/2014/main" id="{53B3A333-73EE-476B-A470-B7D041447C58}"/>
+              </a:ext>
+            </a:extLst>
+          </p:cNvPr>
+          <p:cNvSpPr>
+            <a:spLocks noGrp="1"/>
+          </p:cNvSpPr>
+          <p:nvPr>
+            <p:ph idx="1"/>
+          </p:nvPr>
+        </p:nvSpPr>
+        <p:spPr/>
+        <p:txBody>
+          <a:bodyPr/>
+          <a:lstStyle/>
+          <a:p>
+            <a:r>
+              <a:rPr lang="en-US" dirty="0"/>
+              <a:t>To delete a branch, you must be on ‘master’ branch.</a:t>
+            </a:r>
+          </a:p>
+          <a:p>
+            <a:endParaRPr lang="en-US" dirty="0"/>
+          </a:p>
+          <a:p>
+            <a:r>
+              <a:rPr lang="en-US" dirty="0"/>
+              <a:t>Now, you can delete a branch as :</a:t>
+            </a:r>
+          </a:p>
+          <a:p>
+            <a:r>
+              <a:rPr lang="en-US" dirty="0">
+                <a:latin typeface="Consolas" panose="020B0609020204030204" pitchFamily="49" charset="0"/>
+              </a:rPr>
+              <a:t>git branch –d &lt;branch-name&gt;</a:t>
+            </a:r>
+          </a:p>
+          <a:p>
+            <a:r>
+              <a:rPr lang="en-US" dirty="0"/>
+              <a:t>It is safe method as it only allows a merged branch to be deleted.</a:t>
+            </a:r>
+          </a:p>
+          <a:p>
+            <a:endParaRPr lang="en-US" dirty="0"/>
+          </a:p>
+          <a:p>
+            <a:r>
+              <a:rPr lang="en-US" dirty="0"/>
+              <a:t>To delete a branch forcefully, say an unmerged branch then, we use:</a:t>
+            </a:r>
+          </a:p>
+          <a:p>
+            <a:r>
+              <a:rPr lang="en-US" dirty="0">
+                <a:latin typeface="Consolas" panose="020B0609020204030204" pitchFamily="49" charset="0"/>
+              </a:rPr>
+              <a:t>git branch –D &lt;branch-name&gt;</a:t>
+            </a:r>
+          </a:p>
+        </p:txBody>
+      </p:sp>
+      <p:sp>
+        <p:nvSpPr>
+          <p:cNvPr id="4" name="Flowchart: Alternate Process 3">
+            <a:extLst>
+              <a:ext uri="{FF2B5EF4-FFF2-40B4-BE49-F238E27FC236}">
+                <a16:creationId xmlns:a16="http://schemas.microsoft.com/office/drawing/2014/main" id="{4C4F3F5B-F913-4D51-B469-EE347C27E147}"/>
+              </a:ext>
+            </a:extLst>
+          </p:cNvPr>
+          <p:cNvSpPr/>
+          <p:nvPr/>
+        </p:nvSpPr>
+        <p:spPr>
+          <a:xfrm>
+            <a:off x="1097278" y="3184847"/>
+            <a:ext cx="4071879" cy="432319"/>
+          </a:xfrm>
+          <a:prstGeom prst="flowChartAlternateProcess">
+            <a:avLst/>
+          </a:prstGeom>
+          <a:noFill/>
+          <a:ln w="28575">
+            <a:solidFill>
+              <a:srgbClr val="BD582C"/>
+            </a:solidFill>
+          </a:ln>
+        </p:spPr>
+        <p:style>
+          <a:lnRef idx="2">
+            <a:schemeClr val="accent1">
+              <a:shade val="50000"/>
+            </a:schemeClr>
+          </a:lnRef>
+          <a:fillRef idx="1">
+            <a:schemeClr val="accent1"/>
+          </a:fillRef>
+          <a:effectRef idx="0">
+            <a:schemeClr val="accent1"/>
+          </a:effectRef>
+          <a:fontRef idx="minor">
+            <a:schemeClr val="lt1"/>
+          </a:fontRef>
+        </p:style>
+        <p:txBody>
+          <a:bodyPr rtlCol="0" anchor="ctr"/>
+          <a:lstStyle/>
+          <a:p>
+            <a:pPr algn="ctr"/>
+            <a:endParaRPr lang="en-US"/>
+          </a:p>
+        </p:txBody>
+      </p:sp>
+      <p:sp>
+        <p:nvSpPr>
+          <p:cNvPr id="5" name="Flowchart: Alternate Process 4">
+            <a:extLst>
+              <a:ext uri="{FF2B5EF4-FFF2-40B4-BE49-F238E27FC236}">
+                <a16:creationId xmlns:a16="http://schemas.microsoft.com/office/drawing/2014/main" id="{FD43A404-5762-47F1-82E2-30A5CD73D91A}"/>
+              </a:ext>
+            </a:extLst>
+          </p:cNvPr>
+          <p:cNvSpPr/>
+          <p:nvPr/>
+        </p:nvSpPr>
+        <p:spPr>
+          <a:xfrm>
+            <a:off x="1097278" y="4937619"/>
+            <a:ext cx="4071879" cy="476352"/>
+          </a:xfrm>
+          <a:prstGeom prst="flowChartAlternateProcess">
+            <a:avLst/>
+          </a:prstGeom>
+          <a:noFill/>
+          <a:ln w="28575">
+            <a:solidFill>
+              <a:srgbClr val="BD582C"/>
+            </a:solidFill>
+          </a:ln>
+        </p:spPr>
+        <p:style>
+          <a:lnRef idx="2">
+            <a:schemeClr val="accent1">
+              <a:shade val="50000"/>
+            </a:schemeClr>
+          </a:lnRef>
+          <a:fillRef idx="1">
+            <a:schemeClr val="accent1"/>
+          </a:fillRef>
+          <a:effectRef idx="0">
+            <a:schemeClr val="accent1"/>
+          </a:effectRef>
+          <a:fontRef idx="minor">
+            <a:schemeClr val="lt1"/>
+          </a:fontRef>
+        </p:style>
+        <p:txBody>
+          <a:bodyPr rtlCol="0" anchor="ctr"/>
+          <a:lstStyle/>
+          <a:p>
+            <a:pPr algn="ctr"/>
+            <a:endParaRPr lang="en-US"/>
+          </a:p>
+        </p:txBody>
+      </p:sp>
+    </p:spTree>
+    <p:extLst>
+      <p:ext uri="{BB962C8B-B14F-4D97-AF65-F5344CB8AC3E}">
+        <p14:creationId xmlns:p14="http://schemas.microsoft.com/office/powerpoint/2010/main" val="742344274"/>
+      </p:ext>
+    </p:extLst>
+  </p:cSld>
+  <p:clrMapOvr>
+    <a:masterClrMapping/>
+  </p:clrMapOvr>
+</p:sld>
+</file>
+
+<file path=ppt/slides/slide47.xml><?xml version="1.0" encoding="utf-8"?>
+<p:sld xmlns:a="http://schemas.openxmlformats.org/drawingml/2006/main" xmlns:r="http://schemas.openxmlformats.org/officeDocument/2006/relationships" xmlns:p="http://schemas.openxmlformats.org/presentationml/2006/main">
+  <p:cSld>
+    <p:spTree>
+      <p:nvGrpSpPr>
+        <p:cNvPr id="1" name=""/>
+        <p:cNvGrpSpPr/>
+        <p:nvPr/>
+      </p:nvGrpSpPr>
+      <p:grpSpPr>
+        <a:xfrm>
+          <a:off x="0" y="0"/>
+          <a:ext cx="0" cy="0"/>
+          <a:chOff x="0" y="0"/>
+          <a:chExt cx="0" cy="0"/>
+        </a:xfrm>
+      </p:grpSpPr>
+      <p:sp>
+        <p:nvSpPr>
+          <p:cNvPr id="2" name="Title 1">
+            <a:extLst>
+              <a:ext uri="{FF2B5EF4-FFF2-40B4-BE49-F238E27FC236}">
+                <a16:creationId xmlns:a16="http://schemas.microsoft.com/office/drawing/2014/main" id="{A426F428-8B07-419F-8256-AC4715A5ED15}"/>
+              </a:ext>
+            </a:extLst>
+          </p:cNvPr>
+          <p:cNvSpPr>
+            <a:spLocks noGrp="1"/>
+          </p:cNvSpPr>
+          <p:nvPr>
+            <p:ph type="title"/>
+          </p:nvPr>
+        </p:nvSpPr>
+        <p:spPr/>
+        <p:txBody>
+          <a:bodyPr/>
+          <a:lstStyle/>
+          <a:p>
+            <a:r>
+              <a:rPr lang="en-US" dirty="0"/>
+              <a:t>Make some changes in a branch</a:t>
+            </a:r>
+          </a:p>
+        </p:txBody>
+      </p:sp>
+      <p:sp>
+        <p:nvSpPr>
+          <p:cNvPr id="3" name="Content Placeholder 2">
+            <a:extLst>
+              <a:ext uri="{FF2B5EF4-FFF2-40B4-BE49-F238E27FC236}">
+                <a16:creationId xmlns:a16="http://schemas.microsoft.com/office/drawing/2014/main" id="{BCDD8A0E-1E36-4C9F-A69D-42C18880E4BF}"/>
+              </a:ext>
+            </a:extLst>
+          </p:cNvPr>
+          <p:cNvSpPr>
+            <a:spLocks noGrp="1"/>
+          </p:cNvSpPr>
+          <p:nvPr>
+            <p:ph idx="1"/>
+          </p:nvPr>
+        </p:nvSpPr>
+        <p:spPr/>
+        <p:txBody>
+          <a:bodyPr/>
+          <a:lstStyle/>
+          <a:p>
+            <a:endParaRPr lang="en-US"/>
+          </a:p>
+        </p:txBody>
+      </p:sp>
+    </p:spTree>
+    <p:extLst>
+      <p:ext uri="{BB962C8B-B14F-4D97-AF65-F5344CB8AC3E}">
+        <p14:creationId xmlns:p14="http://schemas.microsoft.com/office/powerpoint/2010/main" val="587255422"/>
       </p:ext>
     </p:extLst>
   </p:cSld>

</xml_diff>

<commit_message>
Ppt to be uploaded on github
</commit_message>
<xml_diff>
--- a/Crash course on git and github.pptx
+++ b/Crash course on git and github.pptx
@@ -29,45 +29,46 @@
     <p:sldId id="289" r:id="rId23"/>
     <p:sldId id="278" r:id="rId24"/>
     <p:sldId id="279" r:id="rId25"/>
-    <p:sldId id="281" r:id="rId26"/>
-    <p:sldId id="282" r:id="rId27"/>
-    <p:sldId id="283" r:id="rId28"/>
-    <p:sldId id="284" r:id="rId29"/>
-    <p:sldId id="285" r:id="rId30"/>
-    <p:sldId id="286" r:id="rId31"/>
-    <p:sldId id="287" r:id="rId32"/>
-    <p:sldId id="288" r:id="rId33"/>
-    <p:sldId id="290" r:id="rId34"/>
-    <p:sldId id="306" r:id="rId35"/>
-    <p:sldId id="317" r:id="rId36"/>
-    <p:sldId id="292" r:id="rId37"/>
-    <p:sldId id="293" r:id="rId38"/>
-    <p:sldId id="294" r:id="rId39"/>
-    <p:sldId id="295" r:id="rId40"/>
-    <p:sldId id="296" r:id="rId41"/>
-    <p:sldId id="297" r:id="rId42"/>
-    <p:sldId id="298" r:id="rId43"/>
-    <p:sldId id="299" r:id="rId44"/>
-    <p:sldId id="300" r:id="rId45"/>
-    <p:sldId id="301" r:id="rId46"/>
-    <p:sldId id="302" r:id="rId47"/>
-    <p:sldId id="303" r:id="rId48"/>
-    <p:sldId id="304" r:id="rId49"/>
-    <p:sldId id="305" r:id="rId50"/>
-    <p:sldId id="307" r:id="rId51"/>
-    <p:sldId id="308" r:id="rId52"/>
-    <p:sldId id="309" r:id="rId53"/>
-    <p:sldId id="310" r:id="rId54"/>
-    <p:sldId id="311" r:id="rId55"/>
-    <p:sldId id="318" r:id="rId56"/>
-    <p:sldId id="319" r:id="rId57"/>
-    <p:sldId id="312" r:id="rId58"/>
-    <p:sldId id="313" r:id="rId59"/>
-    <p:sldId id="314" r:id="rId60"/>
-    <p:sldId id="316" r:id="rId61"/>
-    <p:sldId id="320" r:id="rId62"/>
-    <p:sldId id="321" r:id="rId63"/>
-    <p:sldId id="322" r:id="rId64"/>
+    <p:sldId id="323" r:id="rId26"/>
+    <p:sldId id="281" r:id="rId27"/>
+    <p:sldId id="282" r:id="rId28"/>
+    <p:sldId id="283" r:id="rId29"/>
+    <p:sldId id="284" r:id="rId30"/>
+    <p:sldId id="285" r:id="rId31"/>
+    <p:sldId id="286" r:id="rId32"/>
+    <p:sldId id="287" r:id="rId33"/>
+    <p:sldId id="288" r:id="rId34"/>
+    <p:sldId id="290" r:id="rId35"/>
+    <p:sldId id="306" r:id="rId36"/>
+    <p:sldId id="317" r:id="rId37"/>
+    <p:sldId id="292" r:id="rId38"/>
+    <p:sldId id="293" r:id="rId39"/>
+    <p:sldId id="294" r:id="rId40"/>
+    <p:sldId id="295" r:id="rId41"/>
+    <p:sldId id="296" r:id="rId42"/>
+    <p:sldId id="297" r:id="rId43"/>
+    <p:sldId id="298" r:id="rId44"/>
+    <p:sldId id="299" r:id="rId45"/>
+    <p:sldId id="300" r:id="rId46"/>
+    <p:sldId id="301" r:id="rId47"/>
+    <p:sldId id="302" r:id="rId48"/>
+    <p:sldId id="303" r:id="rId49"/>
+    <p:sldId id="304" r:id="rId50"/>
+    <p:sldId id="305" r:id="rId51"/>
+    <p:sldId id="307" r:id="rId52"/>
+    <p:sldId id="308" r:id="rId53"/>
+    <p:sldId id="309" r:id="rId54"/>
+    <p:sldId id="310" r:id="rId55"/>
+    <p:sldId id="311" r:id="rId56"/>
+    <p:sldId id="318" r:id="rId57"/>
+    <p:sldId id="319" r:id="rId58"/>
+    <p:sldId id="312" r:id="rId59"/>
+    <p:sldId id="313" r:id="rId60"/>
+    <p:sldId id="314" r:id="rId61"/>
+    <p:sldId id="316" r:id="rId62"/>
+    <p:sldId id="320" r:id="rId63"/>
+    <p:sldId id="321" r:id="rId64"/>
+    <p:sldId id="322" r:id="rId65"/>
   </p:sldIdLst>
   <p:sldSz cx="12192000" cy="6858000"/>
   <p:notesSz cx="6858000" cy="9144000"/>
@@ -195,6 +196,7 @@
             <p14:sldId id="289"/>
             <p14:sldId id="278"/>
             <p14:sldId id="279"/>
+            <p14:sldId id="323"/>
             <p14:sldId id="281"/>
             <p14:sldId id="282"/>
             <p14:sldId id="283"/>
@@ -471,7 +473,7 @@
           <a:p>
             <a:fld id="{5AA8B0B3-855D-4491-B631-C6E068ADA4B8}" type="datetimeFigureOut">
               <a:rPr lang="en-US" smtClean="0"/>
-              <a:t>1/9/2020</a:t>
+              <a:t>1/10/2020</a:t>
             </a:fld>
             <a:endParaRPr lang="en-US"/>
           </a:p>
@@ -679,7 +681,7 @@
           <a:p>
             <a:fld id="{5AA8B0B3-855D-4491-B631-C6E068ADA4B8}" type="datetimeFigureOut">
               <a:rPr lang="en-US" smtClean="0"/>
-              <a:t>1/9/2020</a:t>
+              <a:t>1/10/2020</a:t>
             </a:fld>
             <a:endParaRPr lang="en-US"/>
           </a:p>
@@ -935,7 +937,7 @@
           <a:p>
             <a:fld id="{5AA8B0B3-855D-4491-B631-C6E068ADA4B8}" type="datetimeFigureOut">
               <a:rPr lang="en-US" smtClean="0"/>
-              <a:t>1/9/2020</a:t>
+              <a:t>1/10/2020</a:t>
             </a:fld>
             <a:endParaRPr lang="en-US"/>
           </a:p>
@@ -1109,7 +1111,7 @@
           <a:p>
             <a:fld id="{5AA8B0B3-855D-4491-B631-C6E068ADA4B8}" type="datetimeFigureOut">
               <a:rPr lang="en-US" smtClean="0"/>
-              <a:t>1/9/2020</a:t>
+              <a:t>1/10/2020</a:t>
             </a:fld>
             <a:endParaRPr lang="en-US"/>
           </a:p>
@@ -1452,7 +1454,7 @@
           <a:p>
             <a:fld id="{5AA8B0B3-855D-4491-B631-C6E068ADA4B8}" type="datetimeFigureOut">
               <a:rPr lang="en-US" smtClean="0"/>
-              <a:t>1/9/2020</a:t>
+              <a:t>1/10/2020</a:t>
             </a:fld>
             <a:endParaRPr lang="en-US"/>
           </a:p>
@@ -1727,7 +1729,7 @@
           <a:p>
             <a:fld id="{5AA8B0B3-855D-4491-B631-C6E068ADA4B8}" type="datetimeFigureOut">
               <a:rPr lang="en-US" smtClean="0"/>
-              <a:t>1/9/2020</a:t>
+              <a:t>1/10/2020</a:t>
             </a:fld>
             <a:endParaRPr lang="en-US"/>
           </a:p>
@@ -2106,7 +2108,7 @@
           <a:p>
             <a:fld id="{5AA8B0B3-855D-4491-B631-C6E068ADA4B8}" type="datetimeFigureOut">
               <a:rPr lang="en-US" smtClean="0"/>
-              <a:t>1/9/2020</a:t>
+              <a:t>1/10/2020</a:t>
             </a:fld>
             <a:endParaRPr lang="en-US"/>
           </a:p>
@@ -2224,7 +2226,7 @@
           <a:p>
             <a:fld id="{5AA8B0B3-855D-4491-B631-C6E068ADA4B8}" type="datetimeFigureOut">
               <a:rPr lang="en-US" smtClean="0"/>
-              <a:t>1/9/2020</a:t>
+              <a:t>1/10/2020</a:t>
             </a:fld>
             <a:endParaRPr lang="en-US"/>
           </a:p>
@@ -2395,7 +2397,7 @@
           <a:p>
             <a:fld id="{5AA8B0B3-855D-4491-B631-C6E068ADA4B8}" type="datetimeFigureOut">
               <a:rPr lang="en-US" smtClean="0"/>
-              <a:t>1/9/2020</a:t>
+              <a:t>1/10/2020</a:t>
             </a:fld>
             <a:endParaRPr lang="en-US"/>
           </a:p>
@@ -2749,7 +2751,7 @@
           <a:p>
             <a:fld id="{5AA8B0B3-855D-4491-B631-C6E068ADA4B8}" type="datetimeFigureOut">
               <a:rPr lang="en-US" smtClean="0"/>
-              <a:t>1/9/2020</a:t>
+              <a:t>1/10/2020</a:t>
             </a:fld>
             <a:endParaRPr lang="en-US"/>
           </a:p>
@@ -3131,7 +3133,7 @@
           <a:p>
             <a:fld id="{5AA8B0B3-855D-4491-B631-C6E068ADA4B8}" type="datetimeFigureOut">
               <a:rPr lang="en-US" smtClean="0"/>
-              <a:t>1/9/2020</a:t>
+              <a:t>1/10/2020</a:t>
             </a:fld>
             <a:endParaRPr lang="en-US"/>
           </a:p>
@@ -3418,7 +3420,7 @@
           <a:p>
             <a:fld id="{5AA8B0B3-855D-4491-B631-C6E068ADA4B8}" type="datetimeFigureOut">
               <a:rPr lang="en-US" smtClean="0"/>
-              <a:t>1/9/2020</a:t>
+              <a:t>1/10/2020</a:t>
             </a:fld>
             <a:endParaRPr lang="en-US"/>
           </a:p>
@@ -4244,8 +4246,8 @@
         </p:blipFill>
         <p:spPr>
           <a:xfrm>
-            <a:off x="1744603" y="989056"/>
-            <a:ext cx="8702794" cy="5085174"/>
+            <a:off x="748146" y="305616"/>
+            <a:ext cx="10432472" cy="6032833"/>
           </a:xfrm>
           <a:prstGeom prst="rect">
             <a:avLst/>
@@ -4370,8 +4372,8 @@
         </p:blipFill>
         <p:spPr>
           <a:xfrm>
-            <a:off x="606491" y="2211355"/>
-            <a:ext cx="10935476" cy="2799184"/>
+            <a:off x="249382" y="477982"/>
+            <a:ext cx="11762509" cy="5486400"/>
           </a:xfrm>
           <a:prstGeom prst="rect">
             <a:avLst/>
@@ -4507,8 +4509,8 @@
         </p:blipFill>
         <p:spPr>
           <a:xfrm>
-            <a:off x="1570982" y="1049336"/>
-            <a:ext cx="9196544" cy="4759328"/>
+            <a:off x="789709" y="374077"/>
+            <a:ext cx="9977817" cy="5798204"/>
           </a:xfrm>
           <a:prstGeom prst="rect">
             <a:avLst/>
@@ -4938,8 +4940,8 @@
         </p:blipFill>
         <p:spPr>
           <a:xfrm>
-            <a:off x="1348941" y="1237210"/>
-            <a:ext cx="9903777" cy="3138847"/>
+            <a:off x="290945" y="581891"/>
+            <a:ext cx="10961773" cy="5714999"/>
           </a:xfrm>
           <a:prstGeom prst="rect">
             <a:avLst/>
@@ -5038,7 +5040,7 @@
         <p:spPr/>
         <p:txBody>
           <a:bodyPr>
-            <a:normAutofit fontScale="92500" lnSpcReduction="10000"/>
+            <a:noAutofit/>
           </a:bodyPr>
           <a:lstStyle/>
           <a:p>
@@ -5163,7 +5165,7 @@
         </p:nvSpPr>
         <p:spPr>
           <a:xfrm>
-            <a:off x="1045651" y="2989921"/>
+            <a:off x="1097280" y="3188467"/>
             <a:ext cx="1561944" cy="481065"/>
           </a:xfrm>
           <a:prstGeom prst="round2DiagRect">
@@ -6879,6 +6881,86 @@
           <p:cNvPr id="2" name="Title 1">
             <a:extLst>
               <a:ext uri="{FF2B5EF4-FFF2-40B4-BE49-F238E27FC236}">
+                <a16:creationId xmlns:a16="http://schemas.microsoft.com/office/drawing/2014/main" id="{F9AA9171-E5DA-499B-B133-221EA73A5447}"/>
+              </a:ext>
+            </a:extLst>
+          </p:cNvPr>
+          <p:cNvSpPr>
+            <a:spLocks noGrp="1"/>
+          </p:cNvSpPr>
+          <p:nvPr>
+            <p:ph type="title"/>
+          </p:nvPr>
+        </p:nvSpPr>
+        <p:spPr/>
+        <p:txBody>
+          <a:bodyPr/>
+          <a:lstStyle/>
+          <a:p>
+            <a:endParaRPr lang="en-US"/>
+          </a:p>
+        </p:txBody>
+      </p:sp>
+      <p:sp>
+        <p:nvSpPr>
+          <p:cNvPr id="3" name="Content Placeholder 2">
+            <a:extLst>
+              <a:ext uri="{FF2B5EF4-FFF2-40B4-BE49-F238E27FC236}">
+                <a16:creationId xmlns:a16="http://schemas.microsoft.com/office/drawing/2014/main" id="{3C9933ED-EA0F-459F-A49B-97613CF406CE}"/>
+              </a:ext>
+            </a:extLst>
+          </p:cNvPr>
+          <p:cNvSpPr>
+            <a:spLocks noGrp="1"/>
+          </p:cNvSpPr>
+          <p:nvPr>
+            <p:ph idx="1"/>
+          </p:nvPr>
+        </p:nvSpPr>
+        <p:spPr/>
+        <p:txBody>
+          <a:bodyPr/>
+          <a:lstStyle/>
+          <a:p>
+            <a:endParaRPr lang="en-US"/>
+          </a:p>
+        </p:txBody>
+      </p:sp>
+    </p:spTree>
+    <p:extLst>
+      <p:ext uri="{BB962C8B-B14F-4D97-AF65-F5344CB8AC3E}">
+        <p14:creationId xmlns:p14="http://schemas.microsoft.com/office/powerpoint/2010/main" val="923042930"/>
+      </p:ext>
+    </p:extLst>
+  </p:cSld>
+  <p:clrMapOvr>
+    <a:masterClrMapping/>
+  </p:clrMapOvr>
+</p:sld>
+</file>
+
+<file path=ppt/slides/slide26.xml><?xml version="1.0" encoding="utf-8"?>
+<p:sld xmlns:a="http://schemas.openxmlformats.org/drawingml/2006/main" xmlns:r="http://schemas.openxmlformats.org/officeDocument/2006/relationships" xmlns:p="http://schemas.openxmlformats.org/presentationml/2006/main">
+  <p:cSld>
+    <p:spTree>
+      <p:nvGrpSpPr>
+        <p:cNvPr id="1" name=""/>
+        <p:cNvGrpSpPr/>
+        <p:nvPr/>
+      </p:nvGrpSpPr>
+      <p:grpSpPr>
+        <a:xfrm>
+          <a:off x="0" y="0"/>
+          <a:ext cx="0" cy="0"/>
+          <a:chOff x="0" y="0"/>
+          <a:chExt cx="0" cy="0"/>
+        </a:xfrm>
+      </p:grpSpPr>
+      <p:sp>
+        <p:nvSpPr>
+          <p:cNvPr id="2" name="Title 1">
+            <a:extLst>
+              <a:ext uri="{FF2B5EF4-FFF2-40B4-BE49-F238E27FC236}">
                 <a16:creationId xmlns:a16="http://schemas.microsoft.com/office/drawing/2014/main" id="{C21D26BD-DBAB-4526-8A27-DD55BD2E2AF9}"/>
               </a:ext>
             </a:extLst>
@@ -7067,7 +7149,7 @@
 </p:sld>
 </file>
 
-<file path=ppt/slides/slide26.xml><?xml version="1.0" encoding="utf-8"?>
+<file path=ppt/slides/slide27.xml><?xml version="1.0" encoding="utf-8"?>
 <p:sld xmlns:a="http://schemas.openxmlformats.org/drawingml/2006/main" xmlns:r="http://schemas.openxmlformats.org/officeDocument/2006/relationships" xmlns:p="http://schemas.openxmlformats.org/presentationml/2006/main">
   <p:cSld>
     <p:spTree>
@@ -7154,6 +7236,12 @@
             <a:endParaRPr lang="en-US" dirty="0"/>
           </a:p>
           <a:p>
+            <a:r>
+              <a:rPr lang="en-US" dirty="0"/>
+              <a:t>Run ‘git status’ to see what the output is like.</a:t>
+            </a:r>
+          </a:p>
+          <a:p>
             <a:endParaRPr lang="en-US" dirty="0"/>
           </a:p>
         </p:txBody>
@@ -7171,7 +7259,7 @@
 </p:sld>
 </file>
 
-<file path=ppt/slides/slide27.xml><?xml version="1.0" encoding="utf-8"?>
+<file path=ppt/slides/slide28.xml><?xml version="1.0" encoding="utf-8"?>
 <p:sld xmlns:a="http://schemas.openxmlformats.org/drawingml/2006/main" xmlns:r="http://schemas.openxmlformats.org/officeDocument/2006/relationships" xmlns:p="http://schemas.openxmlformats.org/presentationml/2006/main">
   <p:cSld>
     <p:spTree>
@@ -7371,108 +7459,6 @@
 </p:sld>
 </file>
 
-<file path=ppt/slides/slide28.xml><?xml version="1.0" encoding="utf-8"?>
-<p:sld xmlns:a="http://schemas.openxmlformats.org/drawingml/2006/main" xmlns:r="http://schemas.openxmlformats.org/officeDocument/2006/relationships" xmlns:p="http://schemas.openxmlformats.org/presentationml/2006/main">
-  <p:cSld>
-    <p:spTree>
-      <p:nvGrpSpPr>
-        <p:cNvPr id="1" name=""/>
-        <p:cNvGrpSpPr/>
-        <p:nvPr/>
-      </p:nvGrpSpPr>
-      <p:grpSpPr>
-        <a:xfrm>
-          <a:off x="0" y="0"/>
-          <a:ext cx="0" cy="0"/>
-          <a:chOff x="0" y="0"/>
-          <a:chExt cx="0" cy="0"/>
-        </a:xfrm>
-      </p:grpSpPr>
-      <p:sp>
-        <p:nvSpPr>
-          <p:cNvPr id="2" name="Title 1">
-            <a:extLst>
-              <a:ext uri="{FF2B5EF4-FFF2-40B4-BE49-F238E27FC236}">
-                <a16:creationId xmlns:a16="http://schemas.microsoft.com/office/drawing/2014/main" id="{17C7739B-3A96-4037-90B4-89CD21E46664}"/>
-              </a:ext>
-            </a:extLst>
-          </p:cNvPr>
-          <p:cNvSpPr>
-            <a:spLocks noGrp="1"/>
-          </p:cNvSpPr>
-          <p:nvPr>
-            <p:ph type="title"/>
-          </p:nvPr>
-        </p:nvSpPr>
-        <p:spPr/>
-        <p:txBody>
-          <a:bodyPr/>
-          <a:lstStyle/>
-          <a:p>
-            <a:endParaRPr lang="en-US"/>
-          </a:p>
-        </p:txBody>
-      </p:sp>
-      <p:sp>
-        <p:nvSpPr>
-          <p:cNvPr id="3" name="Content Placeholder 2">
-            <a:extLst>
-              <a:ext uri="{FF2B5EF4-FFF2-40B4-BE49-F238E27FC236}">
-                <a16:creationId xmlns:a16="http://schemas.microsoft.com/office/drawing/2014/main" id="{AC7A982D-1634-49B4-BAEA-0F2F8B9676CC}"/>
-              </a:ext>
-            </a:extLst>
-          </p:cNvPr>
-          <p:cNvSpPr>
-            <a:spLocks noGrp="1"/>
-          </p:cNvSpPr>
-          <p:nvPr>
-            <p:ph idx="1"/>
-          </p:nvPr>
-        </p:nvSpPr>
-        <p:spPr/>
-        <p:txBody>
-          <a:bodyPr/>
-          <a:lstStyle/>
-          <a:p>
-            <a:r>
-              <a:rPr lang="en-US" dirty="0"/>
-              <a:t>It is healthy to run </a:t>
-            </a:r>
-            <a:r>
-              <a:rPr lang="en-US" dirty="0">
-                <a:latin typeface="Consolas" panose="020B0609020204030204" pitchFamily="49" charset="0"/>
-              </a:rPr>
-              <a:t>‘git status’ </a:t>
-            </a:r>
-            <a:r>
-              <a:rPr lang="en-US" dirty="0"/>
-              <a:t>command all the time to view the states of files.</a:t>
-            </a:r>
-          </a:p>
-          <a:p>
-            <a:endParaRPr lang="en-US" dirty="0"/>
-          </a:p>
-          <a:p>
-            <a:r>
-              <a:rPr lang="en-US" dirty="0"/>
-              <a:t>Even if not mentioned in the slides, please see for yourself.</a:t>
-            </a:r>
-          </a:p>
-        </p:txBody>
-      </p:sp>
-    </p:spTree>
-    <p:extLst>
-      <p:ext uri="{BB962C8B-B14F-4D97-AF65-F5344CB8AC3E}">
-        <p14:creationId xmlns:p14="http://schemas.microsoft.com/office/powerpoint/2010/main" val="2338088177"/>
-      </p:ext>
-    </p:extLst>
-  </p:cSld>
-  <p:clrMapOvr>
-    <a:masterClrMapping/>
-  </p:clrMapOvr>
-</p:sld>
-</file>
-
 <file path=ppt/slides/slide29.xml><?xml version="1.0" encoding="utf-8"?>
 <p:sld xmlns:a="http://schemas.openxmlformats.org/drawingml/2006/main" xmlns:r="http://schemas.openxmlformats.org/officeDocument/2006/relationships" xmlns:p="http://schemas.openxmlformats.org/presentationml/2006/main">
   <p:cSld>
@@ -7495,7 +7481,7 @@
           <p:cNvPr id="2" name="Title 1">
             <a:extLst>
               <a:ext uri="{FF2B5EF4-FFF2-40B4-BE49-F238E27FC236}">
-                <a16:creationId xmlns:a16="http://schemas.microsoft.com/office/drawing/2014/main" id="{D67E18C3-2001-4EC1-9FE3-B3F99927F103}"/>
+                <a16:creationId xmlns:a16="http://schemas.microsoft.com/office/drawing/2014/main" id="{17C7739B-3A96-4037-90B4-89CD21E46664}"/>
               </a:ext>
             </a:extLst>
           </p:cNvPr>
@@ -7511,7 +7497,7 @@
           <a:bodyPr/>
           <a:lstStyle/>
           <a:p>
-            <a:endParaRPr lang="en-US" dirty="0"/>
+            <a:endParaRPr lang="en-US"/>
           </a:p>
         </p:txBody>
       </p:sp>
@@ -7520,7 +7506,7 @@
           <p:cNvPr id="3" name="Content Placeholder 2">
             <a:extLst>
               <a:ext uri="{FF2B5EF4-FFF2-40B4-BE49-F238E27FC236}">
-                <a16:creationId xmlns:a16="http://schemas.microsoft.com/office/drawing/2014/main" id="{18FE5BE3-6F7D-4584-BA03-3FC0F7668651}"/>
+                <a16:creationId xmlns:a16="http://schemas.microsoft.com/office/drawing/2014/main" id="{AC7A982D-1634-49B4-BAEA-0F2F8B9676CC}"/>
               </a:ext>
             </a:extLst>
           </p:cNvPr>
@@ -7538,75 +7524,26 @@
           <a:p>
             <a:r>
               <a:rPr lang="en-US" dirty="0"/>
-              <a:t>After the unnecessary files are mentioned in .</a:t>
-            </a:r>
-            <a:r>
-              <a:rPr lang="en-US" dirty="0" err="1"/>
-              <a:t>gitignore</a:t>
-            </a:r>
-            <a:r>
-              <a:rPr lang="en-US" dirty="0"/>
-              <a:t>, they are not showed in the </a:t>
-            </a:r>
-            <a:r>
-              <a:rPr lang="en-US" sz="1600" dirty="0">
+              <a:t>It is healthy to run </a:t>
+            </a:r>
+            <a:r>
+              <a:rPr lang="en-US" dirty="0">
                 <a:latin typeface="Consolas" panose="020B0609020204030204" pitchFamily="49" charset="0"/>
               </a:rPr>
               <a:t>‘git status’ </a:t>
             </a:r>
             <a:r>
               <a:rPr lang="en-US" dirty="0"/>
-              <a:t>output.</a:t>
-            </a:r>
-          </a:p>
-          <a:p>
-            <a:r>
-              <a:rPr lang="en-US" dirty="0"/>
-              <a:t>The only files which are not tracked are .</a:t>
-            </a:r>
-            <a:r>
-              <a:rPr lang="en-US" dirty="0" err="1"/>
-              <a:t>gitignore</a:t>
-            </a:r>
-            <a:r>
-              <a:rPr lang="en-US" dirty="0"/>
-              <a:t> and </a:t>
-            </a:r>
-            <a:r>
-              <a:rPr lang="en-US" dirty="0" err="1"/>
-              <a:t>xyz.c</a:t>
-            </a:r>
-            <a:r>
-              <a:rPr lang="en-US" dirty="0"/>
-              <a:t> </a:t>
-            </a:r>
-          </a:p>
-          <a:p>
-            <a:r>
-              <a:rPr lang="en-US" dirty="0"/>
-              <a:t>If the ‘</a:t>
-            </a:r>
-            <a:r>
-              <a:rPr lang="en-US" dirty="0" err="1"/>
-              <a:t>main.c</a:t>
-            </a:r>
-            <a:r>
-              <a:rPr lang="en-US" dirty="0"/>
-              <a:t>’ was modified then it will be shown as modified.</a:t>
-            </a:r>
-          </a:p>
-          <a:p>
-            <a:r>
-              <a:rPr lang="en-US" dirty="0"/>
-              <a:t>Yeah, you have to track .</a:t>
-            </a:r>
-            <a:r>
-              <a:rPr lang="en-US" dirty="0" err="1"/>
-              <a:t>gitignore</a:t>
-            </a:r>
-            <a:r>
-              <a:rPr lang="en-US" dirty="0"/>
-              <a:t> file.</a:t>
+              <a:t>command all the time to view the states of files.</a:t>
+            </a:r>
+          </a:p>
+          <a:p>
+            <a:endParaRPr lang="en-US" dirty="0"/>
+          </a:p>
+          <a:p>
+            <a:r>
+              <a:rPr lang="en-US" dirty="0"/>
+              <a:t>Even if not mentioned in the slides, please see for yourself.</a:t>
             </a:r>
           </a:p>
         </p:txBody>
@@ -7614,7 +7551,7 @@
     </p:spTree>
     <p:extLst>
       <p:ext uri="{BB962C8B-B14F-4D97-AF65-F5344CB8AC3E}">
-        <p14:creationId xmlns:p14="http://schemas.microsoft.com/office/powerpoint/2010/main" val="2447467730"/>
+        <p14:creationId xmlns:p14="http://schemas.microsoft.com/office/powerpoint/2010/main" val="2338088177"/>
       </p:ext>
     </p:extLst>
   </p:cSld>
@@ -7738,6 +7675,157 @@
           <p:cNvPr id="2" name="Title 1">
             <a:extLst>
               <a:ext uri="{FF2B5EF4-FFF2-40B4-BE49-F238E27FC236}">
+                <a16:creationId xmlns:a16="http://schemas.microsoft.com/office/drawing/2014/main" id="{D67E18C3-2001-4EC1-9FE3-B3F99927F103}"/>
+              </a:ext>
+            </a:extLst>
+          </p:cNvPr>
+          <p:cNvSpPr>
+            <a:spLocks noGrp="1"/>
+          </p:cNvSpPr>
+          <p:nvPr>
+            <p:ph type="title"/>
+          </p:nvPr>
+        </p:nvSpPr>
+        <p:spPr/>
+        <p:txBody>
+          <a:bodyPr/>
+          <a:lstStyle/>
+          <a:p>
+            <a:endParaRPr lang="en-US" dirty="0"/>
+          </a:p>
+        </p:txBody>
+      </p:sp>
+      <p:sp>
+        <p:nvSpPr>
+          <p:cNvPr id="3" name="Content Placeholder 2">
+            <a:extLst>
+              <a:ext uri="{FF2B5EF4-FFF2-40B4-BE49-F238E27FC236}">
+                <a16:creationId xmlns:a16="http://schemas.microsoft.com/office/drawing/2014/main" id="{18FE5BE3-6F7D-4584-BA03-3FC0F7668651}"/>
+              </a:ext>
+            </a:extLst>
+          </p:cNvPr>
+          <p:cNvSpPr>
+            <a:spLocks noGrp="1"/>
+          </p:cNvSpPr>
+          <p:nvPr>
+            <p:ph idx="1"/>
+          </p:nvPr>
+        </p:nvSpPr>
+        <p:spPr/>
+        <p:txBody>
+          <a:bodyPr/>
+          <a:lstStyle/>
+          <a:p>
+            <a:r>
+              <a:rPr lang="en-US" dirty="0"/>
+              <a:t>After the unnecessary files are mentioned in .</a:t>
+            </a:r>
+            <a:r>
+              <a:rPr lang="en-US" dirty="0" err="1"/>
+              <a:t>gitignore</a:t>
+            </a:r>
+            <a:r>
+              <a:rPr lang="en-US" dirty="0"/>
+              <a:t>, they are not showed in the </a:t>
+            </a:r>
+            <a:r>
+              <a:rPr lang="en-US" sz="1600" dirty="0">
+                <a:latin typeface="Consolas" panose="020B0609020204030204" pitchFamily="49" charset="0"/>
+              </a:rPr>
+              <a:t>‘git status’ </a:t>
+            </a:r>
+            <a:r>
+              <a:rPr lang="en-US" dirty="0"/>
+              <a:t>output.</a:t>
+            </a:r>
+          </a:p>
+          <a:p>
+            <a:r>
+              <a:rPr lang="en-US" dirty="0"/>
+              <a:t>The only files which are not tracked are .</a:t>
+            </a:r>
+            <a:r>
+              <a:rPr lang="en-US" dirty="0" err="1"/>
+              <a:t>gitignore</a:t>
+            </a:r>
+            <a:r>
+              <a:rPr lang="en-US" dirty="0"/>
+              <a:t> and </a:t>
+            </a:r>
+            <a:r>
+              <a:rPr lang="en-US" dirty="0" err="1"/>
+              <a:t>xyz.c</a:t>
+            </a:r>
+            <a:r>
+              <a:rPr lang="en-US" dirty="0"/>
+              <a:t> </a:t>
+            </a:r>
+          </a:p>
+          <a:p>
+            <a:r>
+              <a:rPr lang="en-US" dirty="0"/>
+              <a:t>If the ‘</a:t>
+            </a:r>
+            <a:r>
+              <a:rPr lang="en-US" dirty="0" err="1"/>
+              <a:t>main.c</a:t>
+            </a:r>
+            <a:r>
+              <a:rPr lang="en-US" dirty="0"/>
+              <a:t>’ was modified then it will be shown as modified.</a:t>
+            </a:r>
+          </a:p>
+          <a:p>
+            <a:r>
+              <a:rPr lang="en-US" dirty="0"/>
+              <a:t>Yeah, you have to track .</a:t>
+            </a:r>
+            <a:r>
+              <a:rPr lang="en-US" dirty="0" err="1"/>
+              <a:t>gitignore</a:t>
+            </a:r>
+            <a:r>
+              <a:rPr lang="en-US" dirty="0"/>
+              <a:t> file.</a:t>
+            </a:r>
+          </a:p>
+        </p:txBody>
+      </p:sp>
+    </p:spTree>
+    <p:extLst>
+      <p:ext uri="{BB962C8B-B14F-4D97-AF65-F5344CB8AC3E}">
+        <p14:creationId xmlns:p14="http://schemas.microsoft.com/office/powerpoint/2010/main" val="2447467730"/>
+      </p:ext>
+    </p:extLst>
+  </p:cSld>
+  <p:clrMapOvr>
+    <a:masterClrMapping/>
+  </p:clrMapOvr>
+</p:sld>
+</file>
+
+<file path=ppt/slides/slide31.xml><?xml version="1.0" encoding="utf-8"?>
+<p:sld xmlns:a="http://schemas.openxmlformats.org/drawingml/2006/main" xmlns:r="http://schemas.openxmlformats.org/officeDocument/2006/relationships" xmlns:p="http://schemas.openxmlformats.org/presentationml/2006/main">
+  <p:cSld>
+    <p:spTree>
+      <p:nvGrpSpPr>
+        <p:cNvPr id="1" name=""/>
+        <p:cNvGrpSpPr/>
+        <p:nvPr/>
+      </p:nvGrpSpPr>
+      <p:grpSpPr>
+        <a:xfrm>
+          <a:off x="0" y="0"/>
+          <a:ext cx="0" cy="0"/>
+          <a:chOff x="0" y="0"/>
+          <a:chExt cx="0" cy="0"/>
+        </a:xfrm>
+      </p:grpSpPr>
+      <p:sp>
+        <p:nvSpPr>
+          <p:cNvPr id="2" name="Title 1">
+            <a:extLst>
+              <a:ext uri="{FF2B5EF4-FFF2-40B4-BE49-F238E27FC236}">
                 <a16:creationId xmlns:a16="http://schemas.microsoft.com/office/drawing/2014/main" id="{C75A13C8-D517-466C-A2E0-BE9465809DCE}"/>
               </a:ext>
             </a:extLst>
@@ -8004,7 +8092,7 @@
 </p:sld>
 </file>
 
-<file path=ppt/slides/slide31.xml><?xml version="1.0" encoding="utf-8"?>
+<file path=ppt/slides/slide32.xml><?xml version="1.0" encoding="utf-8"?>
 <p:sld xmlns:a="http://schemas.openxmlformats.org/drawingml/2006/main" xmlns:r="http://schemas.openxmlformats.org/officeDocument/2006/relationships" xmlns:p="http://schemas.openxmlformats.org/presentationml/2006/main">
   <p:cSld>
     <p:spTree>
@@ -8305,7 +8393,7 @@
 </p:sld>
 </file>
 
-<file path=ppt/slides/slide32.xml><?xml version="1.0" encoding="utf-8"?>
+<file path=ppt/slides/slide33.xml><?xml version="1.0" encoding="utf-8"?>
 <p:sld xmlns:a="http://schemas.openxmlformats.org/drawingml/2006/main" xmlns:r="http://schemas.openxmlformats.org/officeDocument/2006/relationships" xmlns:p="http://schemas.openxmlformats.org/presentationml/2006/main">
   <p:cSld>
     <p:spTree>
@@ -8534,7 +8622,7 @@
 </p:sld>
 </file>
 
-<file path=ppt/slides/slide33.xml><?xml version="1.0" encoding="utf-8"?>
+<file path=ppt/slides/slide34.xml><?xml version="1.0" encoding="utf-8"?>
 <p:sld xmlns:a="http://schemas.openxmlformats.org/drawingml/2006/main" xmlns:r="http://schemas.openxmlformats.org/officeDocument/2006/relationships" xmlns:p="http://schemas.openxmlformats.org/presentationml/2006/main">
   <p:cSld>
     <p:spTree>
@@ -9139,7 +9227,7 @@
 </p:sld>
 </file>
 
-<file path=ppt/slides/slide34.xml><?xml version="1.0" encoding="utf-8"?>
+<file path=ppt/slides/slide35.xml><?xml version="1.0" encoding="utf-8"?>
 <p:sld xmlns:a="http://schemas.openxmlformats.org/drawingml/2006/main" xmlns:r="http://schemas.openxmlformats.org/officeDocument/2006/relationships" xmlns:p="http://schemas.openxmlformats.org/presentationml/2006/main">
   <p:cSld>
     <p:spTree>
@@ -9242,7 +9330,7 @@
 </p:sld>
 </file>
 
-<file path=ppt/slides/slide35.xml><?xml version="1.0" encoding="utf-8"?>
+<file path=ppt/slides/slide36.xml><?xml version="1.0" encoding="utf-8"?>
 <p:sld xmlns:a="http://schemas.openxmlformats.org/drawingml/2006/main" xmlns:r="http://schemas.openxmlformats.org/officeDocument/2006/relationships" xmlns:p="http://schemas.openxmlformats.org/presentationml/2006/main">
   <p:cSld>
     <p:spTree>
@@ -9399,7 +9487,7 @@
 </p:sld>
 </file>
 
-<file path=ppt/slides/slide36.xml><?xml version="1.0" encoding="utf-8"?>
+<file path=ppt/slides/slide37.xml><?xml version="1.0" encoding="utf-8"?>
 <p:sld xmlns:a="http://schemas.openxmlformats.org/drawingml/2006/main" xmlns:r="http://schemas.openxmlformats.org/officeDocument/2006/relationships" xmlns:p="http://schemas.openxmlformats.org/presentationml/2006/main">
   <p:cSld>
     <p:spTree>
@@ -9596,7 +9684,7 @@
 </p:sld>
 </file>
 
-<file path=ppt/slides/slide37.xml><?xml version="1.0" encoding="utf-8"?>
+<file path=ppt/slides/slide38.xml><?xml version="1.0" encoding="utf-8"?>
 <p:sld xmlns:a="http://schemas.openxmlformats.org/drawingml/2006/main" xmlns:r="http://schemas.openxmlformats.org/officeDocument/2006/relationships" xmlns:p="http://schemas.openxmlformats.org/presentationml/2006/main">
   <p:cSld>
     <p:spTree>
@@ -9789,7 +9877,7 @@
 </p:sld>
 </file>
 
-<file path=ppt/slides/slide38.xml><?xml version="1.0" encoding="utf-8"?>
+<file path=ppt/slides/slide39.xml><?xml version="1.0" encoding="utf-8"?>
 <p:sld xmlns:a="http://schemas.openxmlformats.org/drawingml/2006/main" xmlns:r="http://schemas.openxmlformats.org/officeDocument/2006/relationships" xmlns:p="http://schemas.openxmlformats.org/presentationml/2006/main">
   <p:cSld>
     <p:spTree>
@@ -9973,213 +10061,6 @@
     <p:extLst>
       <p:ext uri="{BB962C8B-B14F-4D97-AF65-F5344CB8AC3E}">
         <p14:creationId xmlns:p14="http://schemas.microsoft.com/office/powerpoint/2010/main" val="3414935120"/>
-      </p:ext>
-    </p:extLst>
-  </p:cSld>
-  <p:clrMapOvr>
-    <a:masterClrMapping/>
-  </p:clrMapOvr>
-</p:sld>
-</file>
-
-<file path=ppt/slides/slide39.xml><?xml version="1.0" encoding="utf-8"?>
-<p:sld xmlns:a="http://schemas.openxmlformats.org/drawingml/2006/main" xmlns:r="http://schemas.openxmlformats.org/officeDocument/2006/relationships" xmlns:p="http://schemas.openxmlformats.org/presentationml/2006/main">
-  <p:cSld>
-    <p:spTree>
-      <p:nvGrpSpPr>
-        <p:cNvPr id="1" name=""/>
-        <p:cNvGrpSpPr/>
-        <p:nvPr/>
-      </p:nvGrpSpPr>
-      <p:grpSpPr>
-        <a:xfrm>
-          <a:off x="0" y="0"/>
-          <a:ext cx="0" cy="0"/>
-          <a:chOff x="0" y="0"/>
-          <a:chExt cx="0" cy="0"/>
-        </a:xfrm>
-      </p:grpSpPr>
-      <p:sp>
-        <p:nvSpPr>
-          <p:cNvPr id="2" name="Title 1">
-            <a:extLst>
-              <a:ext uri="{FF2B5EF4-FFF2-40B4-BE49-F238E27FC236}">
-                <a16:creationId xmlns:a16="http://schemas.microsoft.com/office/drawing/2014/main" id="{40C155C1-BCA4-4416-8772-8630A0D88240}"/>
-              </a:ext>
-            </a:extLst>
-          </p:cNvPr>
-          <p:cNvSpPr>
-            <a:spLocks noGrp="1"/>
-          </p:cNvSpPr>
-          <p:nvPr>
-            <p:ph type="title"/>
-          </p:nvPr>
-        </p:nvSpPr>
-        <p:spPr/>
-        <p:txBody>
-          <a:bodyPr/>
-          <a:lstStyle/>
-          <a:p>
-            <a:r>
-              <a:rPr lang="en-US" dirty="0"/>
-              <a:t>Uploading to remote repository</a:t>
-            </a:r>
-          </a:p>
-        </p:txBody>
-      </p:sp>
-      <p:sp>
-        <p:nvSpPr>
-          <p:cNvPr id="3" name="Content Placeholder 2">
-            <a:extLst>
-              <a:ext uri="{FF2B5EF4-FFF2-40B4-BE49-F238E27FC236}">
-                <a16:creationId xmlns:a16="http://schemas.microsoft.com/office/drawing/2014/main" id="{5275E6B4-FBCE-4763-8BA1-CAE168FED0E7}"/>
-              </a:ext>
-            </a:extLst>
-          </p:cNvPr>
-          <p:cNvSpPr>
-            <a:spLocks noGrp="1"/>
-          </p:cNvSpPr>
-          <p:nvPr>
-            <p:ph idx="1"/>
-          </p:nvPr>
-        </p:nvSpPr>
-        <p:spPr/>
-        <p:txBody>
-          <a:bodyPr/>
-          <a:lstStyle/>
-          <a:p>
-            <a:r>
-              <a:rPr lang="en-US" dirty="0"/>
-              <a:t>In such cases, the ‘</a:t>
-            </a:r>
-            <a:r>
-              <a:rPr lang="en-US" dirty="0">
-                <a:latin typeface="Consolas" panose="020B0609020204030204" pitchFamily="49" charset="0"/>
-              </a:rPr>
-              <a:t>git remote’ </a:t>
-            </a:r>
-            <a:r>
-              <a:rPr lang="en-US" dirty="0"/>
-              <a:t>command is used with its several parameters.</a:t>
-            </a:r>
-          </a:p>
-          <a:p>
-            <a:r>
-              <a:rPr lang="en-US" dirty="0"/>
-              <a:t>Run a ‘</a:t>
-            </a:r>
-            <a:r>
-              <a:rPr lang="en-US" dirty="0">
-                <a:latin typeface="Consolas" panose="020B0609020204030204" pitchFamily="49" charset="0"/>
-              </a:rPr>
-              <a:t>git remote’ on git-bash.</a:t>
-            </a:r>
-          </a:p>
-          <a:p>
-            <a:r>
-              <a:rPr lang="en-US" dirty="0"/>
-              <a:t>There will be not output since we have not configured remote repository with this local repository yet.</a:t>
-            </a:r>
-          </a:p>
-          <a:p>
-            <a:endParaRPr lang="en-US" dirty="0"/>
-          </a:p>
-          <a:p>
-            <a:r>
-              <a:rPr lang="en-US" dirty="0"/>
-              <a:t>Note:</a:t>
-            </a:r>
-          </a:p>
-          <a:p>
-            <a:r>
-              <a:rPr lang="en-US" dirty="0"/>
-              <a:t> ‘</a:t>
-            </a:r>
-            <a:r>
-              <a:rPr lang="en-US" dirty="0">
-                <a:latin typeface="Consolas" panose="020B0609020204030204" pitchFamily="49" charset="0"/>
-              </a:rPr>
-              <a:t>git remote’ </a:t>
-            </a:r>
-            <a:r>
-              <a:rPr lang="en-US" dirty="0"/>
-              <a:t>will show the list of remote repositories.</a:t>
-            </a:r>
-          </a:p>
-          <a:p>
-            <a:r>
-              <a:rPr lang="en-US" dirty="0"/>
-              <a:t>‘</a:t>
-            </a:r>
-            <a:r>
-              <a:rPr lang="en-US" dirty="0">
-                <a:latin typeface="Consolas" panose="020B0609020204030204" pitchFamily="49" charset="0"/>
-              </a:rPr>
-              <a:t>git remote -v’ </a:t>
-            </a:r>
-            <a:r>
-              <a:rPr lang="en-US" dirty="0"/>
-              <a:t>will also show list of remote repositories but with their respective links.</a:t>
-            </a:r>
-          </a:p>
-        </p:txBody>
-      </p:sp>
-      <p:sp>
-        <p:nvSpPr>
-          <p:cNvPr id="4" name="Flowchart: Alternate Process 3">
-            <a:extLst>
-              <a:ext uri="{FF2B5EF4-FFF2-40B4-BE49-F238E27FC236}">
-                <a16:creationId xmlns:a16="http://schemas.microsoft.com/office/drawing/2014/main" id="{426D9839-4731-420A-BDE8-EDF82B916579}"/>
-              </a:ext>
-            </a:extLst>
-          </p:cNvPr>
-          <p:cNvSpPr/>
-          <p:nvPr/>
-        </p:nvSpPr>
-        <p:spPr>
-          <a:xfrm>
-            <a:off x="951722" y="3694922"/>
-            <a:ext cx="9946433" cy="1828799"/>
-          </a:xfrm>
-          <a:prstGeom prst="flowChartAlternateProcess">
-            <a:avLst/>
-          </a:prstGeom>
-          <a:noFill/>
-          <a:ln w="38100">
-            <a:solidFill>
-              <a:srgbClr val="BD582C"/>
-            </a:solidFill>
-          </a:ln>
-        </p:spPr>
-        <p:style>
-          <a:lnRef idx="2">
-            <a:schemeClr val="accent1">
-              <a:shade val="50000"/>
-            </a:schemeClr>
-          </a:lnRef>
-          <a:fillRef idx="1">
-            <a:schemeClr val="accent1"/>
-          </a:fillRef>
-          <a:effectRef idx="0">
-            <a:schemeClr val="accent1"/>
-          </a:effectRef>
-          <a:fontRef idx="minor">
-            <a:schemeClr val="lt1"/>
-          </a:fontRef>
-        </p:style>
-        <p:txBody>
-          <a:bodyPr rtlCol="0" anchor="ctr"/>
-          <a:lstStyle/>
-          <a:p>
-            <a:pPr algn="ctr"/>
-            <a:endParaRPr lang="en-US"/>
-          </a:p>
-        </p:txBody>
-      </p:sp>
-    </p:spTree>
-    <p:extLst>
-      <p:ext uri="{BB962C8B-B14F-4D97-AF65-F5344CB8AC3E}">
-        <p14:creationId xmlns:p14="http://schemas.microsoft.com/office/powerpoint/2010/main" val="1730389312"/>
       </p:ext>
     </p:extLst>
   </p:cSld>
@@ -10486,6 +10367,213 @@
           <p:cNvPr id="2" name="Title 1">
             <a:extLst>
               <a:ext uri="{FF2B5EF4-FFF2-40B4-BE49-F238E27FC236}">
+                <a16:creationId xmlns:a16="http://schemas.microsoft.com/office/drawing/2014/main" id="{40C155C1-BCA4-4416-8772-8630A0D88240}"/>
+              </a:ext>
+            </a:extLst>
+          </p:cNvPr>
+          <p:cNvSpPr>
+            <a:spLocks noGrp="1"/>
+          </p:cNvSpPr>
+          <p:nvPr>
+            <p:ph type="title"/>
+          </p:nvPr>
+        </p:nvSpPr>
+        <p:spPr/>
+        <p:txBody>
+          <a:bodyPr/>
+          <a:lstStyle/>
+          <a:p>
+            <a:r>
+              <a:rPr lang="en-US" dirty="0"/>
+              <a:t>Uploading to remote repository</a:t>
+            </a:r>
+          </a:p>
+        </p:txBody>
+      </p:sp>
+      <p:sp>
+        <p:nvSpPr>
+          <p:cNvPr id="3" name="Content Placeholder 2">
+            <a:extLst>
+              <a:ext uri="{FF2B5EF4-FFF2-40B4-BE49-F238E27FC236}">
+                <a16:creationId xmlns:a16="http://schemas.microsoft.com/office/drawing/2014/main" id="{5275E6B4-FBCE-4763-8BA1-CAE168FED0E7}"/>
+              </a:ext>
+            </a:extLst>
+          </p:cNvPr>
+          <p:cNvSpPr>
+            <a:spLocks noGrp="1"/>
+          </p:cNvSpPr>
+          <p:nvPr>
+            <p:ph idx="1"/>
+          </p:nvPr>
+        </p:nvSpPr>
+        <p:spPr/>
+        <p:txBody>
+          <a:bodyPr/>
+          <a:lstStyle/>
+          <a:p>
+            <a:r>
+              <a:rPr lang="en-US" dirty="0"/>
+              <a:t>In such cases, the ‘</a:t>
+            </a:r>
+            <a:r>
+              <a:rPr lang="en-US" dirty="0">
+                <a:latin typeface="Consolas" panose="020B0609020204030204" pitchFamily="49" charset="0"/>
+              </a:rPr>
+              <a:t>git remote’ </a:t>
+            </a:r>
+            <a:r>
+              <a:rPr lang="en-US" dirty="0"/>
+              <a:t>command is used with its several parameters.</a:t>
+            </a:r>
+          </a:p>
+          <a:p>
+            <a:r>
+              <a:rPr lang="en-US" dirty="0"/>
+              <a:t>Run a ‘</a:t>
+            </a:r>
+            <a:r>
+              <a:rPr lang="en-US" dirty="0">
+                <a:latin typeface="Consolas" panose="020B0609020204030204" pitchFamily="49" charset="0"/>
+              </a:rPr>
+              <a:t>git remote’ on git-bash.</a:t>
+            </a:r>
+          </a:p>
+          <a:p>
+            <a:r>
+              <a:rPr lang="en-US" dirty="0"/>
+              <a:t>There will be not output since we have not configured remote repository with this local repository yet.</a:t>
+            </a:r>
+          </a:p>
+          <a:p>
+            <a:endParaRPr lang="en-US" dirty="0"/>
+          </a:p>
+          <a:p>
+            <a:r>
+              <a:rPr lang="en-US" dirty="0"/>
+              <a:t>Note:</a:t>
+            </a:r>
+          </a:p>
+          <a:p>
+            <a:r>
+              <a:rPr lang="en-US" dirty="0"/>
+              <a:t> ‘</a:t>
+            </a:r>
+            <a:r>
+              <a:rPr lang="en-US" dirty="0">
+                <a:latin typeface="Consolas" panose="020B0609020204030204" pitchFamily="49" charset="0"/>
+              </a:rPr>
+              <a:t>git remote’ </a:t>
+            </a:r>
+            <a:r>
+              <a:rPr lang="en-US" dirty="0"/>
+              <a:t>will show the list of remote repositories.</a:t>
+            </a:r>
+          </a:p>
+          <a:p>
+            <a:r>
+              <a:rPr lang="en-US" dirty="0"/>
+              <a:t>‘</a:t>
+            </a:r>
+            <a:r>
+              <a:rPr lang="en-US" dirty="0">
+                <a:latin typeface="Consolas" panose="020B0609020204030204" pitchFamily="49" charset="0"/>
+              </a:rPr>
+              <a:t>git remote -v’ </a:t>
+            </a:r>
+            <a:r>
+              <a:rPr lang="en-US" dirty="0"/>
+              <a:t>will also show list of remote repositories but with their respective links.</a:t>
+            </a:r>
+          </a:p>
+        </p:txBody>
+      </p:sp>
+      <p:sp>
+        <p:nvSpPr>
+          <p:cNvPr id="4" name="Flowchart: Alternate Process 3">
+            <a:extLst>
+              <a:ext uri="{FF2B5EF4-FFF2-40B4-BE49-F238E27FC236}">
+                <a16:creationId xmlns:a16="http://schemas.microsoft.com/office/drawing/2014/main" id="{426D9839-4731-420A-BDE8-EDF82B916579}"/>
+              </a:ext>
+            </a:extLst>
+          </p:cNvPr>
+          <p:cNvSpPr/>
+          <p:nvPr/>
+        </p:nvSpPr>
+        <p:spPr>
+          <a:xfrm>
+            <a:off x="951722" y="3694922"/>
+            <a:ext cx="9946433" cy="1828799"/>
+          </a:xfrm>
+          <a:prstGeom prst="flowChartAlternateProcess">
+            <a:avLst/>
+          </a:prstGeom>
+          <a:noFill/>
+          <a:ln w="38100">
+            <a:solidFill>
+              <a:srgbClr val="BD582C"/>
+            </a:solidFill>
+          </a:ln>
+        </p:spPr>
+        <p:style>
+          <a:lnRef idx="2">
+            <a:schemeClr val="accent1">
+              <a:shade val="50000"/>
+            </a:schemeClr>
+          </a:lnRef>
+          <a:fillRef idx="1">
+            <a:schemeClr val="accent1"/>
+          </a:fillRef>
+          <a:effectRef idx="0">
+            <a:schemeClr val="accent1"/>
+          </a:effectRef>
+          <a:fontRef idx="minor">
+            <a:schemeClr val="lt1"/>
+          </a:fontRef>
+        </p:style>
+        <p:txBody>
+          <a:bodyPr rtlCol="0" anchor="ctr"/>
+          <a:lstStyle/>
+          <a:p>
+            <a:pPr algn="ctr"/>
+            <a:endParaRPr lang="en-US"/>
+          </a:p>
+        </p:txBody>
+      </p:sp>
+    </p:spTree>
+    <p:extLst>
+      <p:ext uri="{BB962C8B-B14F-4D97-AF65-F5344CB8AC3E}">
+        <p14:creationId xmlns:p14="http://schemas.microsoft.com/office/powerpoint/2010/main" val="1730389312"/>
+      </p:ext>
+    </p:extLst>
+  </p:cSld>
+  <p:clrMapOvr>
+    <a:masterClrMapping/>
+  </p:clrMapOvr>
+</p:sld>
+</file>
+
+<file path=ppt/slides/slide41.xml><?xml version="1.0" encoding="utf-8"?>
+<p:sld xmlns:a="http://schemas.openxmlformats.org/drawingml/2006/main" xmlns:r="http://schemas.openxmlformats.org/officeDocument/2006/relationships" xmlns:p="http://schemas.openxmlformats.org/presentationml/2006/main">
+  <p:cSld>
+    <p:spTree>
+      <p:nvGrpSpPr>
+        <p:cNvPr id="1" name=""/>
+        <p:cNvGrpSpPr/>
+        <p:nvPr/>
+      </p:nvGrpSpPr>
+      <p:grpSpPr>
+        <a:xfrm>
+          <a:off x="0" y="0"/>
+          <a:ext cx="0" cy="0"/>
+          <a:chOff x="0" y="0"/>
+          <a:chExt cx="0" cy="0"/>
+        </a:xfrm>
+      </p:grpSpPr>
+      <p:sp>
+        <p:nvSpPr>
+          <p:cNvPr id="2" name="Title 1">
+            <a:extLst>
+              <a:ext uri="{FF2B5EF4-FFF2-40B4-BE49-F238E27FC236}">
                 <a16:creationId xmlns:a16="http://schemas.microsoft.com/office/drawing/2014/main" id="{40762207-31AE-4ED9-B110-486865070B2F}"/>
               </a:ext>
             </a:extLst>
@@ -10724,7 +10812,7 @@
 </p:sld>
 </file>
 
-<file path=ppt/slides/slide41.xml><?xml version="1.0" encoding="utf-8"?>
+<file path=ppt/slides/slide42.xml><?xml version="1.0" encoding="utf-8"?>
 <p:sld xmlns:a="http://schemas.openxmlformats.org/drawingml/2006/main" xmlns:r="http://schemas.openxmlformats.org/officeDocument/2006/relationships" xmlns:p="http://schemas.openxmlformats.org/presentationml/2006/main">
   <p:cSld>
     <p:spTree>
@@ -11015,120 +11103,6 @@
 </p:sld>
 </file>
 
-<file path=ppt/slides/slide42.xml><?xml version="1.0" encoding="utf-8"?>
-<p:sld xmlns:a="http://schemas.openxmlformats.org/drawingml/2006/main" xmlns:r="http://schemas.openxmlformats.org/officeDocument/2006/relationships" xmlns:p="http://schemas.openxmlformats.org/presentationml/2006/main">
-  <p:cSld>
-    <p:spTree>
-      <p:nvGrpSpPr>
-        <p:cNvPr id="1" name=""/>
-        <p:cNvGrpSpPr/>
-        <p:nvPr/>
-      </p:nvGrpSpPr>
-      <p:grpSpPr>
-        <a:xfrm>
-          <a:off x="0" y="0"/>
-          <a:ext cx="0" cy="0"/>
-          <a:chOff x="0" y="0"/>
-          <a:chExt cx="0" cy="0"/>
-        </a:xfrm>
-      </p:grpSpPr>
-      <p:sp>
-        <p:nvSpPr>
-          <p:cNvPr id="2" name="Title 1">
-            <a:extLst>
-              <a:ext uri="{FF2B5EF4-FFF2-40B4-BE49-F238E27FC236}">
-                <a16:creationId xmlns:a16="http://schemas.microsoft.com/office/drawing/2014/main" id="{98DE69AC-787C-445B-9D95-50BDC3A5912D}"/>
-              </a:ext>
-            </a:extLst>
-          </p:cNvPr>
-          <p:cNvSpPr>
-            <a:spLocks noGrp="1"/>
-          </p:cNvSpPr>
-          <p:nvPr>
-            <p:ph type="title"/>
-          </p:nvPr>
-        </p:nvSpPr>
-        <p:spPr/>
-        <p:txBody>
-          <a:bodyPr/>
-          <a:lstStyle/>
-          <a:p>
-            <a:r>
-              <a:rPr lang="en-US" b="1" dirty="0"/>
-              <a:t>Inspecting a Remote</a:t>
-            </a:r>
-            <a:r>
-              <a:rPr lang="en-US" dirty="0"/>
-              <a:t> </a:t>
-            </a:r>
-          </a:p>
-        </p:txBody>
-      </p:sp>
-      <p:sp>
-        <p:nvSpPr>
-          <p:cNvPr id="3" name="Content Placeholder 2">
-            <a:extLst>
-              <a:ext uri="{FF2B5EF4-FFF2-40B4-BE49-F238E27FC236}">
-                <a16:creationId xmlns:a16="http://schemas.microsoft.com/office/drawing/2014/main" id="{BD0BFD37-26C7-40CF-A9AA-802885792DFC}"/>
-              </a:ext>
-            </a:extLst>
-          </p:cNvPr>
-          <p:cNvSpPr>
-            <a:spLocks noGrp="1"/>
-          </p:cNvSpPr>
-          <p:nvPr>
-            <p:ph idx="1"/>
-          </p:nvPr>
-        </p:nvSpPr>
-        <p:spPr/>
-        <p:txBody>
-          <a:bodyPr/>
-          <a:lstStyle/>
-          <a:p>
-            <a:r>
-              <a:rPr lang="en-US" dirty="0"/>
-              <a:t>To see in-depth details about a remote, we use </a:t>
-            </a:r>
-            <a:r>
-              <a:rPr lang="en-US" dirty="0">
-                <a:latin typeface="Consolas" panose="020B0609020204030204" pitchFamily="49" charset="0"/>
-              </a:rPr>
-              <a:t>‘git remote show &lt;remote-name&gt;’ </a:t>
-            </a:r>
-            <a:r>
-              <a:rPr lang="en-US" dirty="0"/>
-              <a:t>command.</a:t>
-            </a:r>
-          </a:p>
-          <a:p>
-            <a:endParaRPr lang="en-US" dirty="0"/>
-          </a:p>
-          <a:p>
-            <a:r>
-              <a:rPr lang="en-US" dirty="0"/>
-              <a:t>Example: live-demo, and do for </a:t>
-            </a:r>
-            <a:r>
-              <a:rPr lang="en-US" dirty="0" err="1"/>
-              <a:t>youself</a:t>
-            </a:r>
-            <a:endParaRPr lang="en-US" dirty="0"/>
-          </a:p>
-        </p:txBody>
-      </p:sp>
-    </p:spTree>
-    <p:extLst>
-      <p:ext uri="{BB962C8B-B14F-4D97-AF65-F5344CB8AC3E}">
-        <p14:creationId xmlns:p14="http://schemas.microsoft.com/office/powerpoint/2010/main" val="2007693458"/>
-      </p:ext>
-    </p:extLst>
-  </p:cSld>
-  <p:clrMapOvr>
-    <a:masterClrMapping/>
-  </p:clrMapOvr>
-</p:sld>
-</file>
-
 <file path=ppt/slides/slide43.xml><?xml version="1.0" encoding="utf-8"?>
 <p:sld xmlns:a="http://schemas.openxmlformats.org/drawingml/2006/main" xmlns:r="http://schemas.openxmlformats.org/officeDocument/2006/relationships" xmlns:p="http://schemas.openxmlformats.org/presentationml/2006/main">
   <p:cSld>
@@ -11151,6 +11125,120 @@
           <p:cNvPr id="2" name="Title 1">
             <a:extLst>
               <a:ext uri="{FF2B5EF4-FFF2-40B4-BE49-F238E27FC236}">
+                <a16:creationId xmlns:a16="http://schemas.microsoft.com/office/drawing/2014/main" id="{98DE69AC-787C-445B-9D95-50BDC3A5912D}"/>
+              </a:ext>
+            </a:extLst>
+          </p:cNvPr>
+          <p:cNvSpPr>
+            <a:spLocks noGrp="1"/>
+          </p:cNvSpPr>
+          <p:nvPr>
+            <p:ph type="title"/>
+          </p:nvPr>
+        </p:nvSpPr>
+        <p:spPr/>
+        <p:txBody>
+          <a:bodyPr/>
+          <a:lstStyle/>
+          <a:p>
+            <a:r>
+              <a:rPr lang="en-US" b="1" dirty="0"/>
+              <a:t>Inspecting a Remote</a:t>
+            </a:r>
+            <a:r>
+              <a:rPr lang="en-US" dirty="0"/>
+              <a:t> </a:t>
+            </a:r>
+          </a:p>
+        </p:txBody>
+      </p:sp>
+      <p:sp>
+        <p:nvSpPr>
+          <p:cNvPr id="3" name="Content Placeholder 2">
+            <a:extLst>
+              <a:ext uri="{FF2B5EF4-FFF2-40B4-BE49-F238E27FC236}">
+                <a16:creationId xmlns:a16="http://schemas.microsoft.com/office/drawing/2014/main" id="{BD0BFD37-26C7-40CF-A9AA-802885792DFC}"/>
+              </a:ext>
+            </a:extLst>
+          </p:cNvPr>
+          <p:cNvSpPr>
+            <a:spLocks noGrp="1"/>
+          </p:cNvSpPr>
+          <p:nvPr>
+            <p:ph idx="1"/>
+          </p:nvPr>
+        </p:nvSpPr>
+        <p:spPr/>
+        <p:txBody>
+          <a:bodyPr/>
+          <a:lstStyle/>
+          <a:p>
+            <a:r>
+              <a:rPr lang="en-US" dirty="0"/>
+              <a:t>To see in-depth details about a remote, we use </a:t>
+            </a:r>
+            <a:r>
+              <a:rPr lang="en-US" dirty="0">
+                <a:latin typeface="Consolas" panose="020B0609020204030204" pitchFamily="49" charset="0"/>
+              </a:rPr>
+              <a:t>‘git remote show &lt;remote-name&gt;’ </a:t>
+            </a:r>
+            <a:r>
+              <a:rPr lang="en-US" dirty="0"/>
+              <a:t>command.</a:t>
+            </a:r>
+          </a:p>
+          <a:p>
+            <a:endParaRPr lang="en-US" dirty="0"/>
+          </a:p>
+          <a:p>
+            <a:r>
+              <a:rPr lang="en-US" dirty="0"/>
+              <a:t>Example: live-demo, and do for </a:t>
+            </a:r>
+            <a:r>
+              <a:rPr lang="en-US" dirty="0" err="1"/>
+              <a:t>youself</a:t>
+            </a:r>
+            <a:endParaRPr lang="en-US" dirty="0"/>
+          </a:p>
+        </p:txBody>
+      </p:sp>
+    </p:spTree>
+    <p:extLst>
+      <p:ext uri="{BB962C8B-B14F-4D97-AF65-F5344CB8AC3E}">
+        <p14:creationId xmlns:p14="http://schemas.microsoft.com/office/powerpoint/2010/main" val="2007693458"/>
+      </p:ext>
+    </p:extLst>
+  </p:cSld>
+  <p:clrMapOvr>
+    <a:masterClrMapping/>
+  </p:clrMapOvr>
+</p:sld>
+</file>
+
+<file path=ppt/slides/slide44.xml><?xml version="1.0" encoding="utf-8"?>
+<p:sld xmlns:a="http://schemas.openxmlformats.org/drawingml/2006/main" xmlns:r="http://schemas.openxmlformats.org/officeDocument/2006/relationships" xmlns:p="http://schemas.openxmlformats.org/presentationml/2006/main">
+  <p:cSld>
+    <p:spTree>
+      <p:nvGrpSpPr>
+        <p:cNvPr id="1" name=""/>
+        <p:cNvGrpSpPr/>
+        <p:nvPr/>
+      </p:nvGrpSpPr>
+      <p:grpSpPr>
+        <a:xfrm>
+          <a:off x="0" y="0"/>
+          <a:ext cx="0" cy="0"/>
+          <a:chOff x="0" y="0"/>
+          <a:chExt cx="0" cy="0"/>
+        </a:xfrm>
+      </p:grpSpPr>
+      <p:sp>
+        <p:nvSpPr>
+          <p:cNvPr id="2" name="Title 1">
+            <a:extLst>
+              <a:ext uri="{FF2B5EF4-FFF2-40B4-BE49-F238E27FC236}">
                 <a16:creationId xmlns:a16="http://schemas.microsoft.com/office/drawing/2014/main" id="{40C19095-C849-472E-89E7-41825097EA7B}"/>
               </a:ext>
             </a:extLst>
@@ -11294,7 +11382,7 @@
 </p:sld>
 </file>
 
-<file path=ppt/slides/slide44.xml><?xml version="1.0" encoding="utf-8"?>
+<file path=ppt/slides/slide45.xml><?xml version="1.0" encoding="utf-8"?>
 <p:sld xmlns:a="http://schemas.openxmlformats.org/drawingml/2006/main" xmlns:r="http://schemas.openxmlformats.org/officeDocument/2006/relationships" xmlns:p="http://schemas.openxmlformats.org/presentationml/2006/main">
   <p:cSld>
     <p:spTree>
@@ -11596,7 +11684,7 @@
 </p:sld>
 </file>
 
-<file path=ppt/slides/slide45.xml><?xml version="1.0" encoding="utf-8"?>
+<file path=ppt/slides/slide46.xml><?xml version="1.0" encoding="utf-8"?>
 <p:sld xmlns:a="http://schemas.openxmlformats.org/drawingml/2006/main" xmlns:r="http://schemas.openxmlformats.org/officeDocument/2006/relationships" xmlns:p="http://schemas.openxmlformats.org/presentationml/2006/main">
   <p:cSld>
     <p:spTree>
@@ -11743,7 +11831,7 @@
 </p:sld>
 </file>
 
-<file path=ppt/slides/slide46.xml><?xml version="1.0" encoding="utf-8"?>
+<file path=ppt/slides/slide47.xml><?xml version="1.0" encoding="utf-8"?>
 <p:sld xmlns:a="http://schemas.openxmlformats.org/drawingml/2006/main" xmlns:r="http://schemas.openxmlformats.org/officeDocument/2006/relationships" xmlns:p="http://schemas.openxmlformats.org/presentationml/2006/main">
   <p:cSld>
     <p:spTree>
@@ -12167,7 +12255,7 @@
 </p:sld>
 </file>
 
-<file path=ppt/slides/slide47.xml><?xml version="1.0" encoding="utf-8"?>
+<file path=ppt/slides/slide48.xml><?xml version="1.0" encoding="utf-8"?>
 <p:sld xmlns:a="http://schemas.openxmlformats.org/drawingml/2006/main" xmlns:r="http://schemas.openxmlformats.org/officeDocument/2006/relationships" xmlns:p="http://schemas.openxmlformats.org/presentationml/2006/main">
   <p:cSld>
     <p:spTree>
@@ -12400,7 +12488,7 @@
 </p:sld>
 </file>
 
-<file path=ppt/slides/slide48.xml><?xml version="1.0" encoding="utf-8"?>
+<file path=ppt/slides/slide49.xml><?xml version="1.0" encoding="utf-8"?>
 <p:sld xmlns:a="http://schemas.openxmlformats.org/drawingml/2006/main" xmlns:r="http://schemas.openxmlformats.org/officeDocument/2006/relationships" xmlns:p="http://schemas.openxmlformats.org/presentationml/2006/main">
   <p:cSld>
     <p:spTree>
@@ -12621,300 +12709,6 @@
     <p:extLst>
       <p:ext uri="{BB962C8B-B14F-4D97-AF65-F5344CB8AC3E}">
         <p14:creationId xmlns:p14="http://schemas.microsoft.com/office/powerpoint/2010/main" val="742344274"/>
-      </p:ext>
-    </p:extLst>
-  </p:cSld>
-  <p:clrMapOvr>
-    <a:masterClrMapping/>
-  </p:clrMapOvr>
-</p:sld>
-</file>
-
-<file path=ppt/slides/slide49.xml><?xml version="1.0" encoding="utf-8"?>
-<p:sld xmlns:a="http://schemas.openxmlformats.org/drawingml/2006/main" xmlns:r="http://schemas.openxmlformats.org/officeDocument/2006/relationships" xmlns:p="http://schemas.openxmlformats.org/presentationml/2006/main">
-  <p:cSld>
-    <p:spTree>
-      <p:nvGrpSpPr>
-        <p:cNvPr id="1" name=""/>
-        <p:cNvGrpSpPr/>
-        <p:nvPr/>
-      </p:nvGrpSpPr>
-      <p:grpSpPr>
-        <a:xfrm>
-          <a:off x="0" y="0"/>
-          <a:ext cx="0" cy="0"/>
-          <a:chOff x="0" y="0"/>
-          <a:chExt cx="0" cy="0"/>
-        </a:xfrm>
-      </p:grpSpPr>
-      <p:sp>
-        <p:nvSpPr>
-          <p:cNvPr id="2" name="Title 1">
-            <a:extLst>
-              <a:ext uri="{FF2B5EF4-FFF2-40B4-BE49-F238E27FC236}">
-                <a16:creationId xmlns:a16="http://schemas.microsoft.com/office/drawing/2014/main" id="{A426F428-8B07-419F-8256-AC4715A5ED15}"/>
-              </a:ext>
-            </a:extLst>
-          </p:cNvPr>
-          <p:cNvSpPr>
-            <a:spLocks noGrp="1"/>
-          </p:cNvSpPr>
-          <p:nvPr>
-            <p:ph type="title"/>
-          </p:nvPr>
-        </p:nvSpPr>
-        <p:spPr/>
-        <p:txBody>
-          <a:bodyPr/>
-          <a:lstStyle/>
-          <a:p>
-            <a:r>
-              <a:rPr lang="en-US" dirty="0"/>
-              <a:t>Make some changes in a branch</a:t>
-            </a:r>
-          </a:p>
-        </p:txBody>
-      </p:sp>
-      <p:sp>
-        <p:nvSpPr>
-          <p:cNvPr id="3" name="Content Placeholder 2">
-            <a:extLst>
-              <a:ext uri="{FF2B5EF4-FFF2-40B4-BE49-F238E27FC236}">
-                <a16:creationId xmlns:a16="http://schemas.microsoft.com/office/drawing/2014/main" id="{BCDD8A0E-1E36-4C9F-A69D-42C18880E4BF}"/>
-              </a:ext>
-            </a:extLst>
-          </p:cNvPr>
-          <p:cNvSpPr>
-            <a:spLocks noGrp="1"/>
-          </p:cNvSpPr>
-          <p:nvPr>
-            <p:ph idx="1"/>
-          </p:nvPr>
-        </p:nvSpPr>
-        <p:spPr/>
-        <p:txBody>
-          <a:bodyPr/>
-          <a:lstStyle/>
-          <a:p>
-            <a:pPr marL="0" indent="0">
-              <a:buNone/>
-            </a:pPr>
-            <a:r>
-              <a:rPr lang="en-US" dirty="0"/>
-              <a:t>Firstly, switch to a branch as </a:t>
-            </a:r>
-            <a:r>
-              <a:rPr lang="en-US" sz="1800" dirty="0">
-                <a:latin typeface="Consolas" panose="020B0609020204030204" pitchFamily="49" charset="0"/>
-              </a:rPr>
-              <a:t>‘git checkout &lt;branch-name’ </a:t>
-            </a:r>
-            <a:r>
-              <a:rPr lang="en-US" dirty="0"/>
-              <a:t>or </a:t>
-            </a:r>
-            <a:r>
-              <a:rPr lang="en-US" sz="1800" dirty="0">
-                <a:latin typeface="Consolas" panose="020B0609020204030204" pitchFamily="49" charset="0"/>
-              </a:rPr>
-              <a:t>‘git switch &lt;branch-name&gt;’</a:t>
-            </a:r>
-            <a:endParaRPr lang="en-US" sz="1600" dirty="0">
-              <a:latin typeface="Consolas" panose="020B0609020204030204" pitchFamily="49" charset="0"/>
-            </a:endParaRPr>
-          </a:p>
-          <a:p>
-            <a:pPr marL="0" indent="0">
-              <a:buNone/>
-            </a:pPr>
-            <a:r>
-              <a:rPr lang="en-US" dirty="0"/>
-              <a:t>With the required branch switched to, make some changes in any file.</a:t>
-            </a:r>
-          </a:p>
-          <a:p>
-            <a:pPr marL="0" indent="0">
-              <a:buNone/>
-            </a:pPr>
-            <a:r>
-              <a:rPr lang="en-US" dirty="0"/>
-              <a:t>For now, I shall be changing ‘</a:t>
-            </a:r>
-            <a:r>
-              <a:rPr lang="en-US" dirty="0" err="1"/>
-              <a:t>main.c</a:t>
-            </a:r>
-            <a:r>
-              <a:rPr lang="en-US" dirty="0"/>
-              <a:t>’ file.</a:t>
-            </a:r>
-          </a:p>
-          <a:p>
-            <a:pPr marL="0" indent="0">
-              <a:buNone/>
-            </a:pPr>
-            <a:endParaRPr lang="en-US" dirty="0"/>
-          </a:p>
-          <a:p>
-            <a:pPr marL="0" indent="0">
-              <a:buNone/>
-            </a:pPr>
-            <a:r>
-              <a:rPr lang="en-US" dirty="0"/>
-              <a:t>Always perform </a:t>
-            </a:r>
-            <a:r>
-              <a:rPr lang="en-US" dirty="0">
-                <a:latin typeface="Consolas" panose="020B0609020204030204" pitchFamily="49" charset="0"/>
-              </a:rPr>
-              <a:t>‘git branch’ </a:t>
-            </a:r>
-            <a:r>
-              <a:rPr lang="en-US" dirty="0"/>
-              <a:t>or </a:t>
-            </a:r>
-            <a:r>
-              <a:rPr lang="en-US" dirty="0">
-                <a:latin typeface="Consolas" panose="020B0609020204030204" pitchFamily="49" charset="0"/>
-              </a:rPr>
-              <a:t>‘git status’ </a:t>
-            </a:r>
-            <a:r>
-              <a:rPr lang="en-US" dirty="0"/>
-              <a:t>to </a:t>
-            </a:r>
-          </a:p>
-          <a:p>
-            <a:pPr marL="0" indent="0">
-              <a:buNone/>
-            </a:pPr>
-            <a:r>
-              <a:rPr lang="en-US" dirty="0"/>
-              <a:t>check if you are really on the required branch.</a:t>
-            </a:r>
-          </a:p>
-          <a:p>
-            <a:pPr marL="0" indent="0">
-              <a:buNone/>
-            </a:pPr>
-            <a:r>
-              <a:rPr lang="en-US" dirty="0"/>
-              <a:t>Note: * Will be placed before the checked out branch</a:t>
-            </a:r>
-          </a:p>
-        </p:txBody>
-      </p:sp>
-      <p:sp>
-        <p:nvSpPr>
-          <p:cNvPr id="4" name="Thought Bubble: Cloud 3">
-            <a:extLst>
-              <a:ext uri="{FF2B5EF4-FFF2-40B4-BE49-F238E27FC236}">
-                <a16:creationId xmlns:a16="http://schemas.microsoft.com/office/drawing/2014/main" id="{73FA1122-907F-407A-AF8C-1B0DAF388807}"/>
-              </a:ext>
-            </a:extLst>
-          </p:cNvPr>
-          <p:cNvSpPr/>
-          <p:nvPr/>
-        </p:nvSpPr>
-        <p:spPr>
-          <a:xfrm>
-            <a:off x="8102082" y="2915817"/>
-            <a:ext cx="3691811" cy="2440094"/>
-          </a:xfrm>
-          <a:prstGeom prst="cloudCallout">
-            <a:avLst/>
-          </a:prstGeom>
-        </p:spPr>
-        <p:style>
-          <a:lnRef idx="2">
-            <a:schemeClr val="accent1"/>
-          </a:lnRef>
-          <a:fillRef idx="1">
-            <a:schemeClr val="lt1"/>
-          </a:fillRef>
-          <a:effectRef idx="0">
-            <a:schemeClr val="accent1"/>
-          </a:effectRef>
-          <a:fontRef idx="minor">
-            <a:schemeClr val="dk1"/>
-          </a:fontRef>
-        </p:style>
-        <p:txBody>
-          <a:bodyPr rtlCol="0" anchor="ctr"/>
-          <a:lstStyle/>
-          <a:p>
-            <a:pPr algn="ctr"/>
-            <a:endParaRPr lang="en-US" sz="2200" b="1" dirty="0">
-              <a:latin typeface="Ink Free" panose="03080402000500000000" pitchFamily="66" charset="0"/>
-            </a:endParaRPr>
-          </a:p>
-          <a:p>
-            <a:pPr algn="ctr"/>
-            <a:r>
-              <a:rPr lang="en-US" sz="2200" b="1" dirty="0">
-                <a:latin typeface="Ink Free" panose="03080402000500000000" pitchFamily="66" charset="0"/>
-              </a:rPr>
-              <a:t>Just liked said before, keep using ‘git status’ command all the time.</a:t>
-            </a:r>
-          </a:p>
-        </p:txBody>
-      </p:sp>
-      <p:sp>
-        <p:nvSpPr>
-          <p:cNvPr id="5" name="Flowchart: Alternate Process 4">
-            <a:extLst>
-              <a:ext uri="{FF2B5EF4-FFF2-40B4-BE49-F238E27FC236}">
-                <a16:creationId xmlns:a16="http://schemas.microsoft.com/office/drawing/2014/main" id="{A804FB66-60C9-4D54-B7CC-0A22413AEB88}"/>
-              </a:ext>
-            </a:extLst>
-          </p:cNvPr>
-          <p:cNvSpPr/>
-          <p:nvPr/>
-        </p:nvSpPr>
-        <p:spPr>
-          <a:xfrm>
-            <a:off x="966647" y="4519125"/>
-            <a:ext cx="6077963" cy="432319"/>
-          </a:xfrm>
-          <a:prstGeom prst="flowChartAlternateProcess">
-            <a:avLst/>
-          </a:prstGeom>
-          <a:noFill/>
-          <a:ln w="28575">
-            <a:solidFill>
-              <a:srgbClr val="BD582C"/>
-            </a:solidFill>
-          </a:ln>
-        </p:spPr>
-        <p:style>
-          <a:lnRef idx="2">
-            <a:schemeClr val="accent1">
-              <a:shade val="50000"/>
-            </a:schemeClr>
-          </a:lnRef>
-          <a:fillRef idx="1">
-            <a:schemeClr val="accent1"/>
-          </a:fillRef>
-          <a:effectRef idx="0">
-            <a:schemeClr val="accent1"/>
-          </a:effectRef>
-          <a:fontRef idx="minor">
-            <a:schemeClr val="lt1"/>
-          </a:fontRef>
-        </p:style>
-        <p:txBody>
-          <a:bodyPr rtlCol="0" anchor="ctr"/>
-          <a:lstStyle/>
-          <a:p>
-            <a:pPr algn="ctr"/>
-            <a:endParaRPr lang="en-US"/>
-          </a:p>
-        </p:txBody>
-      </p:sp>
-    </p:spTree>
-    <p:extLst>
-      <p:ext uri="{BB962C8B-B14F-4D97-AF65-F5344CB8AC3E}">
-        <p14:creationId xmlns:p14="http://schemas.microsoft.com/office/powerpoint/2010/main" val="587255422"/>
       </p:ext>
     </p:extLst>
   </p:cSld>
@@ -13006,6 +12800,300 @@
           <p:cNvPr id="2" name="Title 1">
             <a:extLst>
               <a:ext uri="{FF2B5EF4-FFF2-40B4-BE49-F238E27FC236}">
+                <a16:creationId xmlns:a16="http://schemas.microsoft.com/office/drawing/2014/main" id="{A426F428-8B07-419F-8256-AC4715A5ED15}"/>
+              </a:ext>
+            </a:extLst>
+          </p:cNvPr>
+          <p:cNvSpPr>
+            <a:spLocks noGrp="1"/>
+          </p:cNvSpPr>
+          <p:nvPr>
+            <p:ph type="title"/>
+          </p:nvPr>
+        </p:nvSpPr>
+        <p:spPr/>
+        <p:txBody>
+          <a:bodyPr/>
+          <a:lstStyle/>
+          <a:p>
+            <a:r>
+              <a:rPr lang="en-US" dirty="0"/>
+              <a:t>Make some changes in a branch</a:t>
+            </a:r>
+          </a:p>
+        </p:txBody>
+      </p:sp>
+      <p:sp>
+        <p:nvSpPr>
+          <p:cNvPr id="3" name="Content Placeholder 2">
+            <a:extLst>
+              <a:ext uri="{FF2B5EF4-FFF2-40B4-BE49-F238E27FC236}">
+                <a16:creationId xmlns:a16="http://schemas.microsoft.com/office/drawing/2014/main" id="{BCDD8A0E-1E36-4C9F-A69D-42C18880E4BF}"/>
+              </a:ext>
+            </a:extLst>
+          </p:cNvPr>
+          <p:cNvSpPr>
+            <a:spLocks noGrp="1"/>
+          </p:cNvSpPr>
+          <p:nvPr>
+            <p:ph idx="1"/>
+          </p:nvPr>
+        </p:nvSpPr>
+        <p:spPr/>
+        <p:txBody>
+          <a:bodyPr/>
+          <a:lstStyle/>
+          <a:p>
+            <a:pPr marL="0" indent="0">
+              <a:buNone/>
+            </a:pPr>
+            <a:r>
+              <a:rPr lang="en-US" dirty="0"/>
+              <a:t>Firstly, switch to a branch as </a:t>
+            </a:r>
+            <a:r>
+              <a:rPr lang="en-US" sz="1800" dirty="0">
+                <a:latin typeface="Consolas" panose="020B0609020204030204" pitchFamily="49" charset="0"/>
+              </a:rPr>
+              <a:t>‘git checkout &lt;branch-name’ </a:t>
+            </a:r>
+            <a:r>
+              <a:rPr lang="en-US" dirty="0"/>
+              <a:t>or </a:t>
+            </a:r>
+            <a:r>
+              <a:rPr lang="en-US" sz="1800" dirty="0">
+                <a:latin typeface="Consolas" panose="020B0609020204030204" pitchFamily="49" charset="0"/>
+              </a:rPr>
+              <a:t>‘git switch &lt;branch-name&gt;’</a:t>
+            </a:r>
+            <a:endParaRPr lang="en-US" sz="1600" dirty="0">
+              <a:latin typeface="Consolas" panose="020B0609020204030204" pitchFamily="49" charset="0"/>
+            </a:endParaRPr>
+          </a:p>
+          <a:p>
+            <a:pPr marL="0" indent="0">
+              <a:buNone/>
+            </a:pPr>
+            <a:r>
+              <a:rPr lang="en-US" dirty="0"/>
+              <a:t>With the required branch switched to, make some changes in any file.</a:t>
+            </a:r>
+          </a:p>
+          <a:p>
+            <a:pPr marL="0" indent="0">
+              <a:buNone/>
+            </a:pPr>
+            <a:r>
+              <a:rPr lang="en-US" dirty="0"/>
+              <a:t>For now, I shall be changing ‘</a:t>
+            </a:r>
+            <a:r>
+              <a:rPr lang="en-US" dirty="0" err="1"/>
+              <a:t>main.c</a:t>
+            </a:r>
+            <a:r>
+              <a:rPr lang="en-US" dirty="0"/>
+              <a:t>’ file.</a:t>
+            </a:r>
+          </a:p>
+          <a:p>
+            <a:pPr marL="0" indent="0">
+              <a:buNone/>
+            </a:pPr>
+            <a:endParaRPr lang="en-US" dirty="0"/>
+          </a:p>
+          <a:p>
+            <a:pPr marL="0" indent="0">
+              <a:buNone/>
+            </a:pPr>
+            <a:r>
+              <a:rPr lang="en-US" dirty="0"/>
+              <a:t>Always perform </a:t>
+            </a:r>
+            <a:r>
+              <a:rPr lang="en-US" dirty="0">
+                <a:latin typeface="Consolas" panose="020B0609020204030204" pitchFamily="49" charset="0"/>
+              </a:rPr>
+              <a:t>‘git branch’ </a:t>
+            </a:r>
+            <a:r>
+              <a:rPr lang="en-US" dirty="0"/>
+              <a:t>or </a:t>
+            </a:r>
+            <a:r>
+              <a:rPr lang="en-US" dirty="0">
+                <a:latin typeface="Consolas" panose="020B0609020204030204" pitchFamily="49" charset="0"/>
+              </a:rPr>
+              <a:t>‘git status’ </a:t>
+            </a:r>
+            <a:r>
+              <a:rPr lang="en-US" dirty="0"/>
+              <a:t>to </a:t>
+            </a:r>
+          </a:p>
+          <a:p>
+            <a:pPr marL="0" indent="0">
+              <a:buNone/>
+            </a:pPr>
+            <a:r>
+              <a:rPr lang="en-US" dirty="0"/>
+              <a:t>check if you are really on the required branch.</a:t>
+            </a:r>
+          </a:p>
+          <a:p>
+            <a:pPr marL="0" indent="0">
+              <a:buNone/>
+            </a:pPr>
+            <a:r>
+              <a:rPr lang="en-US" dirty="0"/>
+              <a:t>Note: * Will be placed before the checked out branch</a:t>
+            </a:r>
+          </a:p>
+        </p:txBody>
+      </p:sp>
+      <p:sp>
+        <p:nvSpPr>
+          <p:cNvPr id="4" name="Thought Bubble: Cloud 3">
+            <a:extLst>
+              <a:ext uri="{FF2B5EF4-FFF2-40B4-BE49-F238E27FC236}">
+                <a16:creationId xmlns:a16="http://schemas.microsoft.com/office/drawing/2014/main" id="{73FA1122-907F-407A-AF8C-1B0DAF388807}"/>
+              </a:ext>
+            </a:extLst>
+          </p:cNvPr>
+          <p:cNvSpPr/>
+          <p:nvPr/>
+        </p:nvSpPr>
+        <p:spPr>
+          <a:xfrm>
+            <a:off x="8102082" y="2915817"/>
+            <a:ext cx="3691811" cy="2440094"/>
+          </a:xfrm>
+          <a:prstGeom prst="cloudCallout">
+            <a:avLst/>
+          </a:prstGeom>
+        </p:spPr>
+        <p:style>
+          <a:lnRef idx="2">
+            <a:schemeClr val="accent1"/>
+          </a:lnRef>
+          <a:fillRef idx="1">
+            <a:schemeClr val="lt1"/>
+          </a:fillRef>
+          <a:effectRef idx="0">
+            <a:schemeClr val="accent1"/>
+          </a:effectRef>
+          <a:fontRef idx="minor">
+            <a:schemeClr val="dk1"/>
+          </a:fontRef>
+        </p:style>
+        <p:txBody>
+          <a:bodyPr rtlCol="0" anchor="ctr"/>
+          <a:lstStyle/>
+          <a:p>
+            <a:pPr algn="ctr"/>
+            <a:endParaRPr lang="en-US" sz="2200" b="1" dirty="0">
+              <a:latin typeface="Ink Free" panose="03080402000500000000" pitchFamily="66" charset="0"/>
+            </a:endParaRPr>
+          </a:p>
+          <a:p>
+            <a:pPr algn="ctr"/>
+            <a:r>
+              <a:rPr lang="en-US" sz="2200" b="1" dirty="0">
+                <a:latin typeface="Ink Free" panose="03080402000500000000" pitchFamily="66" charset="0"/>
+              </a:rPr>
+              <a:t>Just liked said before, keep using ‘git status’ command all the time.</a:t>
+            </a:r>
+          </a:p>
+        </p:txBody>
+      </p:sp>
+      <p:sp>
+        <p:nvSpPr>
+          <p:cNvPr id="5" name="Flowchart: Alternate Process 4">
+            <a:extLst>
+              <a:ext uri="{FF2B5EF4-FFF2-40B4-BE49-F238E27FC236}">
+                <a16:creationId xmlns:a16="http://schemas.microsoft.com/office/drawing/2014/main" id="{A804FB66-60C9-4D54-B7CC-0A22413AEB88}"/>
+              </a:ext>
+            </a:extLst>
+          </p:cNvPr>
+          <p:cNvSpPr/>
+          <p:nvPr/>
+        </p:nvSpPr>
+        <p:spPr>
+          <a:xfrm>
+            <a:off x="966647" y="4519125"/>
+            <a:ext cx="6077963" cy="432319"/>
+          </a:xfrm>
+          <a:prstGeom prst="flowChartAlternateProcess">
+            <a:avLst/>
+          </a:prstGeom>
+          <a:noFill/>
+          <a:ln w="28575">
+            <a:solidFill>
+              <a:srgbClr val="BD582C"/>
+            </a:solidFill>
+          </a:ln>
+        </p:spPr>
+        <p:style>
+          <a:lnRef idx="2">
+            <a:schemeClr val="accent1">
+              <a:shade val="50000"/>
+            </a:schemeClr>
+          </a:lnRef>
+          <a:fillRef idx="1">
+            <a:schemeClr val="accent1"/>
+          </a:fillRef>
+          <a:effectRef idx="0">
+            <a:schemeClr val="accent1"/>
+          </a:effectRef>
+          <a:fontRef idx="minor">
+            <a:schemeClr val="lt1"/>
+          </a:fontRef>
+        </p:style>
+        <p:txBody>
+          <a:bodyPr rtlCol="0" anchor="ctr"/>
+          <a:lstStyle/>
+          <a:p>
+            <a:pPr algn="ctr"/>
+            <a:endParaRPr lang="en-US"/>
+          </a:p>
+        </p:txBody>
+      </p:sp>
+    </p:spTree>
+    <p:extLst>
+      <p:ext uri="{BB962C8B-B14F-4D97-AF65-F5344CB8AC3E}">
+        <p14:creationId xmlns:p14="http://schemas.microsoft.com/office/powerpoint/2010/main" val="587255422"/>
+      </p:ext>
+    </p:extLst>
+  </p:cSld>
+  <p:clrMapOvr>
+    <a:masterClrMapping/>
+  </p:clrMapOvr>
+</p:sld>
+</file>
+
+<file path=ppt/slides/slide51.xml><?xml version="1.0" encoding="utf-8"?>
+<p:sld xmlns:a="http://schemas.openxmlformats.org/drawingml/2006/main" xmlns:r="http://schemas.openxmlformats.org/officeDocument/2006/relationships" xmlns:p="http://schemas.openxmlformats.org/presentationml/2006/main">
+  <p:cSld>
+    <p:spTree>
+      <p:nvGrpSpPr>
+        <p:cNvPr id="1" name=""/>
+        <p:cNvGrpSpPr/>
+        <p:nvPr/>
+      </p:nvGrpSpPr>
+      <p:grpSpPr>
+        <a:xfrm>
+          <a:off x="0" y="0"/>
+          <a:ext cx="0" cy="0"/>
+          <a:chOff x="0" y="0"/>
+          <a:chExt cx="0" cy="0"/>
+        </a:xfrm>
+      </p:grpSpPr>
+      <p:sp>
+        <p:nvSpPr>
+          <p:cNvPr id="2" name="Title 1">
+            <a:extLst>
+              <a:ext uri="{FF2B5EF4-FFF2-40B4-BE49-F238E27FC236}">
                 <a16:creationId xmlns:a16="http://schemas.microsoft.com/office/drawing/2014/main" id="{A2EAE3E7-476A-4C04-9CDF-ECBABF7257D5}"/>
               </a:ext>
             </a:extLst>
@@ -13234,7 +13322,7 @@
 </p:sld>
 </file>
 
-<file path=ppt/slides/slide51.xml><?xml version="1.0" encoding="utf-8"?>
+<file path=ppt/slides/slide52.xml><?xml version="1.0" encoding="utf-8"?>
 <p:sld xmlns:a="http://schemas.openxmlformats.org/drawingml/2006/main" xmlns:r="http://schemas.openxmlformats.org/officeDocument/2006/relationships" xmlns:p="http://schemas.openxmlformats.org/presentationml/2006/main">
   <p:cSld>
     <p:spTree>
@@ -13482,7 +13570,7 @@
 </p:sld>
 </file>
 
-<file path=ppt/slides/slide52.xml><?xml version="1.0" encoding="utf-8"?>
+<file path=ppt/slides/slide53.xml><?xml version="1.0" encoding="utf-8"?>
 <p:sld xmlns:a="http://schemas.openxmlformats.org/drawingml/2006/main" xmlns:r="http://schemas.openxmlformats.org/officeDocument/2006/relationships" xmlns:p="http://schemas.openxmlformats.org/presentationml/2006/main">
   <p:cSld>
     <p:spTree>
@@ -13726,7 +13814,7 @@
 </p:sld>
 </file>
 
-<file path=ppt/slides/slide53.xml><?xml version="1.0" encoding="utf-8"?>
+<file path=ppt/slides/slide54.xml><?xml version="1.0" encoding="utf-8"?>
 <p:sld xmlns:a="http://schemas.openxmlformats.org/drawingml/2006/main" xmlns:r="http://schemas.openxmlformats.org/officeDocument/2006/relationships" xmlns:p="http://schemas.openxmlformats.org/presentationml/2006/main">
   <p:cSld>
     <p:spTree>
@@ -13969,7 +14057,7 @@
 </p:sld>
 </file>
 
-<file path=ppt/slides/slide54.xml><?xml version="1.0" encoding="utf-8"?>
+<file path=ppt/slides/slide55.xml><?xml version="1.0" encoding="utf-8"?>
 <p:sld xmlns:a="http://schemas.openxmlformats.org/drawingml/2006/main" xmlns:r="http://schemas.openxmlformats.org/officeDocument/2006/relationships" xmlns:p="http://schemas.openxmlformats.org/presentationml/2006/main">
   <p:cSld>
     <p:spTree>
@@ -14193,7 +14281,7 @@
 </p:sld>
 </file>
 
-<file path=ppt/slides/slide55.xml><?xml version="1.0" encoding="utf-8"?>
+<file path=ppt/slides/slide56.xml><?xml version="1.0" encoding="utf-8"?>
 <p:sld xmlns:a="http://schemas.openxmlformats.org/drawingml/2006/main" xmlns:r="http://schemas.openxmlformats.org/officeDocument/2006/relationships" xmlns:p="http://schemas.openxmlformats.org/presentationml/2006/main">
   <p:cSld>
     <p:spTree>
@@ -14349,7 +14437,7 @@
 </p:sld>
 </file>
 
-<file path=ppt/slides/slide56.xml><?xml version="1.0" encoding="utf-8"?>
+<file path=ppt/slides/slide57.xml><?xml version="1.0" encoding="utf-8"?>
 <p:sld xmlns:a="http://schemas.openxmlformats.org/drawingml/2006/main" xmlns:r="http://schemas.openxmlformats.org/officeDocument/2006/relationships" xmlns:p="http://schemas.openxmlformats.org/presentationml/2006/main">
   <p:cSld>
     <p:spTree>
@@ -14501,7 +14589,7 @@
 </p:sld>
 </file>
 
-<file path=ppt/slides/slide57.xml><?xml version="1.0" encoding="utf-8"?>
+<file path=ppt/slides/slide58.xml><?xml version="1.0" encoding="utf-8"?>
 <p:sld xmlns:a="http://schemas.openxmlformats.org/drawingml/2006/main" xmlns:r="http://schemas.openxmlformats.org/officeDocument/2006/relationships" xmlns:p="http://schemas.openxmlformats.org/presentationml/2006/main">
   <p:cSld>
     <p:spTree>
@@ -14704,178 +14792,6 @@
     <p:extLst>
       <p:ext uri="{BB962C8B-B14F-4D97-AF65-F5344CB8AC3E}">
         <p14:creationId xmlns:p14="http://schemas.microsoft.com/office/powerpoint/2010/main" val="3367027651"/>
-      </p:ext>
-    </p:extLst>
-  </p:cSld>
-  <p:clrMapOvr>
-    <a:masterClrMapping/>
-  </p:clrMapOvr>
-</p:sld>
-</file>
-
-<file path=ppt/slides/slide58.xml><?xml version="1.0" encoding="utf-8"?>
-<p:sld xmlns:a="http://schemas.openxmlformats.org/drawingml/2006/main" xmlns:r="http://schemas.openxmlformats.org/officeDocument/2006/relationships" xmlns:p="http://schemas.openxmlformats.org/presentationml/2006/main">
-  <p:cSld>
-    <p:spTree>
-      <p:nvGrpSpPr>
-        <p:cNvPr id="1" name=""/>
-        <p:cNvGrpSpPr/>
-        <p:nvPr/>
-      </p:nvGrpSpPr>
-      <p:grpSpPr>
-        <a:xfrm>
-          <a:off x="0" y="0"/>
-          <a:ext cx="0" cy="0"/>
-          <a:chOff x="0" y="0"/>
-          <a:chExt cx="0" cy="0"/>
-        </a:xfrm>
-      </p:grpSpPr>
-      <p:sp>
-        <p:nvSpPr>
-          <p:cNvPr id="2" name="Title 1">
-            <a:extLst>
-              <a:ext uri="{FF2B5EF4-FFF2-40B4-BE49-F238E27FC236}">
-                <a16:creationId xmlns:a16="http://schemas.microsoft.com/office/drawing/2014/main" id="{68C479DE-E84B-4E99-8D99-C25AE3129C96}"/>
-              </a:ext>
-            </a:extLst>
-          </p:cNvPr>
-          <p:cNvSpPr>
-            <a:spLocks noGrp="1"/>
-          </p:cNvSpPr>
-          <p:nvPr>
-            <p:ph type="title"/>
-          </p:nvPr>
-        </p:nvSpPr>
-        <p:spPr/>
-        <p:txBody>
-          <a:bodyPr/>
-          <a:lstStyle/>
-          <a:p>
-            <a:r>
-              <a:rPr lang="en-US" dirty="0"/>
-              <a:t>Merge conflict(s) and resolving it</a:t>
-            </a:r>
-          </a:p>
-        </p:txBody>
-      </p:sp>
-      <p:sp>
-        <p:nvSpPr>
-          <p:cNvPr id="3" name="Content Placeholder 2">
-            <a:extLst>
-              <a:ext uri="{FF2B5EF4-FFF2-40B4-BE49-F238E27FC236}">
-                <a16:creationId xmlns:a16="http://schemas.microsoft.com/office/drawing/2014/main" id="{ED1BA391-4A6B-474F-94AA-76D8587076C0}"/>
-              </a:ext>
-            </a:extLst>
-          </p:cNvPr>
-          <p:cNvSpPr>
-            <a:spLocks noGrp="1"/>
-          </p:cNvSpPr>
-          <p:nvPr>
-            <p:ph idx="1"/>
-          </p:nvPr>
-        </p:nvSpPr>
-        <p:spPr/>
-        <p:txBody>
-          <a:bodyPr/>
-          <a:lstStyle/>
-          <a:p>
-            <a:r>
-              <a:rPr lang="en-US" dirty="0"/>
-              <a:t>Now that we edited same file on both branches and committed changes.</a:t>
-            </a:r>
-          </a:p>
-          <a:p>
-            <a:r>
-              <a:rPr lang="en-US" dirty="0"/>
-              <a:t>Lets run </a:t>
-            </a:r>
-            <a:r>
-              <a:rPr lang="en-US" dirty="0">
-                <a:latin typeface="Consolas" panose="020B0609020204030204" pitchFamily="49" charset="0"/>
-              </a:rPr>
-              <a:t>‘git log --color --graph --all --</a:t>
-            </a:r>
-            <a:r>
-              <a:rPr lang="en-US" dirty="0" err="1">
-                <a:latin typeface="Consolas" panose="020B0609020204030204" pitchFamily="49" charset="0"/>
-              </a:rPr>
-              <a:t>oneline</a:t>
-            </a:r>
-            <a:r>
-              <a:rPr lang="en-US" dirty="0">
-                <a:latin typeface="Consolas" panose="020B0609020204030204" pitchFamily="49" charset="0"/>
-              </a:rPr>
-              <a:t>” </a:t>
-            </a:r>
-            <a:r>
-              <a:rPr lang="en-US" dirty="0"/>
-              <a:t>on master branch</a:t>
-            </a:r>
-          </a:p>
-          <a:p>
-            <a:r>
-              <a:rPr lang="en-US" dirty="0">
-                <a:latin typeface="Consolas" panose="020B0609020204030204" pitchFamily="49" charset="0"/>
-              </a:rPr>
-              <a:t>We can see the deviated branches.</a:t>
-            </a:r>
-          </a:p>
-          <a:p>
-            <a:endParaRPr lang="en-US" dirty="0">
-              <a:latin typeface="Consolas" panose="020B0609020204030204" pitchFamily="49" charset="0"/>
-            </a:endParaRPr>
-          </a:p>
-          <a:p>
-            <a:r>
-              <a:rPr lang="en-US" dirty="0"/>
-              <a:t>To merge, lets run </a:t>
-            </a:r>
-            <a:r>
-              <a:rPr lang="en-US" dirty="0">
-                <a:latin typeface="Consolas" panose="020B0609020204030204" pitchFamily="49" charset="0"/>
-              </a:rPr>
-              <a:t>‘git merge &lt;branch-name&gt;’ </a:t>
-            </a:r>
-            <a:r>
-              <a:rPr lang="en-US" dirty="0"/>
-              <a:t>and see what happens.</a:t>
-            </a:r>
-          </a:p>
-          <a:p>
-            <a:r>
-              <a:rPr lang="en-US" dirty="0"/>
-              <a:t>It will tell that automatic merge failed. It says to resolve the conflict and then perform a commit.</a:t>
-            </a:r>
-          </a:p>
-          <a:p>
-            <a:endParaRPr lang="en-US" dirty="0"/>
-          </a:p>
-          <a:p>
-            <a:r>
-              <a:rPr lang="en-US" dirty="0"/>
-              <a:t>Now, open the </a:t>
-            </a:r>
-            <a:r>
-              <a:rPr lang="en-US" dirty="0" err="1"/>
-              <a:t>xyz.c</a:t>
-            </a:r>
-            <a:r>
-              <a:rPr lang="en-US" dirty="0"/>
-              <a:t> file and you will see contents from branch mixed up with it.</a:t>
-            </a:r>
-          </a:p>
-          <a:p>
-            <a:r>
-              <a:rPr lang="en-US" dirty="0"/>
-              <a:t>How to resolve such a conflict, live demo!</a:t>
-            </a:r>
-          </a:p>
-        </p:txBody>
-      </p:sp>
-    </p:spTree>
-    <p:extLst>
-      <p:ext uri="{BB962C8B-B14F-4D97-AF65-F5344CB8AC3E}">
-        <p14:creationId xmlns:p14="http://schemas.microsoft.com/office/powerpoint/2010/main" val="1047154823"/>
       </p:ext>
     </p:extLst>
   </p:cSld>
@@ -14907,7 +14823,7 @@
           <p:cNvPr id="2" name="Title 1">
             <a:extLst>
               <a:ext uri="{FF2B5EF4-FFF2-40B4-BE49-F238E27FC236}">
-                <a16:creationId xmlns:a16="http://schemas.microsoft.com/office/drawing/2014/main" id="{E25F1150-F377-495D-AFEA-CBFEE7BCB2F9}"/>
+                <a16:creationId xmlns:a16="http://schemas.microsoft.com/office/drawing/2014/main" id="{68C479DE-E84B-4E99-8D99-C25AE3129C96}"/>
               </a:ext>
             </a:extLst>
           </p:cNvPr>
@@ -14923,7 +14839,10 @@
           <a:bodyPr/>
           <a:lstStyle/>
           <a:p>
-            <a:endParaRPr lang="en-US"/>
+            <a:r>
+              <a:rPr lang="en-US" dirty="0"/>
+              <a:t>Merge conflict(s) and resolving it</a:t>
+            </a:r>
           </a:p>
         </p:txBody>
       </p:sp>
@@ -14932,7 +14851,7 @@
           <p:cNvPr id="3" name="Content Placeholder 2">
             <a:extLst>
               <a:ext uri="{FF2B5EF4-FFF2-40B4-BE49-F238E27FC236}">
-                <a16:creationId xmlns:a16="http://schemas.microsoft.com/office/drawing/2014/main" id="{0A5B1E4B-DA3C-4380-94B6-11031D1985F9}"/>
+                <a16:creationId xmlns:a16="http://schemas.microsoft.com/office/drawing/2014/main" id="{ED1BA391-4A6B-474F-94AA-76D8587076C0}"/>
               </a:ext>
             </a:extLst>
           </p:cNvPr>
@@ -14950,59 +14869,70 @@
           <a:p>
             <a:r>
               <a:rPr lang="en-US" dirty="0"/>
-              <a:t>Now, we edit the </a:t>
-            </a:r>
-            <a:r>
-              <a:rPr lang="en-US" dirty="0" err="1"/>
-              <a:t>xyz.c</a:t>
-            </a:r>
-            <a:r>
-              <a:rPr lang="en-US" dirty="0"/>
-              <a:t> file as necessary, which changes to keep and which not to.</a:t>
-            </a:r>
-          </a:p>
-          <a:p>
-            <a:r>
-              <a:rPr lang="en-US" dirty="0"/>
-              <a:t>And then we stage the file and commit a change in master branch.</a:t>
-            </a:r>
-          </a:p>
-          <a:p>
-            <a:r>
-              <a:rPr lang="en-US" dirty="0"/>
-              <a:t>Now merge conflict is resolved and merge was successful.</a:t>
-            </a:r>
-          </a:p>
-          <a:p>
-            <a:r>
-              <a:rPr lang="en-US" dirty="0"/>
-              <a:t>Run </a:t>
+              <a:t>Now that we edited same file on both branches and committed changes.</a:t>
+            </a:r>
+          </a:p>
+          <a:p>
+            <a:r>
+              <a:rPr lang="en-US" dirty="0"/>
+              <a:t>Lets run </a:t>
             </a:r>
             <a:r>
               <a:rPr lang="en-US" dirty="0">
                 <a:latin typeface="Consolas" panose="020B0609020204030204" pitchFamily="49" charset="0"/>
               </a:rPr>
-              <a:t>‘git branch --merged’ </a:t>
-            </a:r>
-            <a:r>
-              <a:rPr lang="en-US" dirty="0"/>
-              <a:t>and this merged branch will be listed there.</a:t>
-            </a:r>
-          </a:p>
-          <a:p>
-            <a:r>
-              <a:rPr lang="en-US" dirty="0"/>
-              <a:t>Run </a:t>
+              <a:t>‘git log --color --graph --all --</a:t>
+            </a:r>
+            <a:r>
+              <a:rPr lang="en-US" dirty="0" err="1">
+                <a:latin typeface="Consolas" panose="020B0609020204030204" pitchFamily="49" charset="0"/>
+              </a:rPr>
+              <a:t>oneline</a:t>
             </a:r>
             <a:r>
               <a:rPr lang="en-US" dirty="0">
                 <a:latin typeface="Consolas" panose="020B0609020204030204" pitchFamily="49" charset="0"/>
               </a:rPr>
-              <a:t>‘git log --color --graph --all’ </a:t>
-            </a:r>
-            <a:r>
-              <a:rPr lang="en-US" dirty="0"/>
-              <a:t>to see who merged was performed.</a:t>
+              <a:t>” </a:t>
+            </a:r>
+            <a:r>
+              <a:rPr lang="en-US" dirty="0"/>
+              <a:t>on master branch</a:t>
+            </a:r>
+          </a:p>
+          <a:p>
+            <a:r>
+              <a:rPr lang="en-US" dirty="0">
+                <a:latin typeface="Consolas" panose="020B0609020204030204" pitchFamily="49" charset="0"/>
+              </a:rPr>
+              <a:t>We can see the deviated branches.</a:t>
+            </a:r>
+          </a:p>
+          <a:p>
+            <a:endParaRPr lang="en-US" dirty="0">
+              <a:latin typeface="Consolas" panose="020B0609020204030204" pitchFamily="49" charset="0"/>
+            </a:endParaRPr>
+          </a:p>
+          <a:p>
+            <a:r>
+              <a:rPr lang="en-US" dirty="0"/>
+              <a:t>To merge, lets run </a:t>
+            </a:r>
+            <a:r>
+              <a:rPr lang="en-US" dirty="0">
+                <a:latin typeface="Consolas" panose="020B0609020204030204" pitchFamily="49" charset="0"/>
+              </a:rPr>
+              <a:t>‘git merge &lt;branch-name&gt;’ </a:t>
+            </a:r>
+            <a:r>
+              <a:rPr lang="en-US" dirty="0"/>
+              <a:t>and see what happens.</a:t>
+            </a:r>
+          </a:p>
+          <a:p>
+            <a:r>
+              <a:rPr lang="en-US" dirty="0"/>
+              <a:t>It will tell that automatic merge failed. It says to resolve the conflict and then perform a commit.</a:t>
             </a:r>
           </a:p>
           <a:p>
@@ -15011,7 +14941,21 @@
           <a:p>
             <a:r>
               <a:rPr lang="en-US" dirty="0"/>
-              <a:t>Explanation on white board!</a:t>
+              <a:t>Now, open the </a:t>
+            </a:r>
+            <a:r>
+              <a:rPr lang="en-US" dirty="0" err="1"/>
+              <a:t>xyz.c</a:t>
+            </a:r>
+            <a:r>
+              <a:rPr lang="en-US" dirty="0"/>
+              <a:t> file and you will see contents from branch mixed up with it.</a:t>
+            </a:r>
+          </a:p>
+          <a:p>
+            <a:r>
+              <a:rPr lang="en-US" dirty="0"/>
+              <a:t>How to resolve such a conflict, live demo!</a:t>
             </a:r>
           </a:p>
         </p:txBody>
@@ -15019,7 +14963,7 @@
     </p:spTree>
     <p:extLst>
       <p:ext uri="{BB962C8B-B14F-4D97-AF65-F5344CB8AC3E}">
-        <p14:creationId xmlns:p14="http://schemas.microsoft.com/office/powerpoint/2010/main" val="2039128749"/>
+        <p14:creationId xmlns:p14="http://schemas.microsoft.com/office/powerpoint/2010/main" val="1047154823"/>
       </p:ext>
     </p:extLst>
   </p:cSld>
@@ -15271,6 +15215,150 @@
           <p:cNvPr id="2" name="Title 1">
             <a:extLst>
               <a:ext uri="{FF2B5EF4-FFF2-40B4-BE49-F238E27FC236}">
+                <a16:creationId xmlns:a16="http://schemas.microsoft.com/office/drawing/2014/main" id="{E25F1150-F377-495D-AFEA-CBFEE7BCB2F9}"/>
+              </a:ext>
+            </a:extLst>
+          </p:cNvPr>
+          <p:cNvSpPr>
+            <a:spLocks noGrp="1"/>
+          </p:cNvSpPr>
+          <p:nvPr>
+            <p:ph type="title"/>
+          </p:nvPr>
+        </p:nvSpPr>
+        <p:spPr/>
+        <p:txBody>
+          <a:bodyPr/>
+          <a:lstStyle/>
+          <a:p>
+            <a:endParaRPr lang="en-US"/>
+          </a:p>
+        </p:txBody>
+      </p:sp>
+      <p:sp>
+        <p:nvSpPr>
+          <p:cNvPr id="3" name="Content Placeholder 2">
+            <a:extLst>
+              <a:ext uri="{FF2B5EF4-FFF2-40B4-BE49-F238E27FC236}">
+                <a16:creationId xmlns:a16="http://schemas.microsoft.com/office/drawing/2014/main" id="{0A5B1E4B-DA3C-4380-94B6-11031D1985F9}"/>
+              </a:ext>
+            </a:extLst>
+          </p:cNvPr>
+          <p:cNvSpPr>
+            <a:spLocks noGrp="1"/>
+          </p:cNvSpPr>
+          <p:nvPr>
+            <p:ph idx="1"/>
+          </p:nvPr>
+        </p:nvSpPr>
+        <p:spPr/>
+        <p:txBody>
+          <a:bodyPr/>
+          <a:lstStyle/>
+          <a:p>
+            <a:r>
+              <a:rPr lang="en-US" dirty="0"/>
+              <a:t>Now, we edit the </a:t>
+            </a:r>
+            <a:r>
+              <a:rPr lang="en-US" dirty="0" err="1"/>
+              <a:t>xyz.c</a:t>
+            </a:r>
+            <a:r>
+              <a:rPr lang="en-US" dirty="0"/>
+              <a:t> file as necessary, which changes to keep and which not to.</a:t>
+            </a:r>
+          </a:p>
+          <a:p>
+            <a:r>
+              <a:rPr lang="en-US" dirty="0"/>
+              <a:t>And then we stage the file and commit a change in master branch.</a:t>
+            </a:r>
+          </a:p>
+          <a:p>
+            <a:r>
+              <a:rPr lang="en-US" dirty="0"/>
+              <a:t>Now merge conflict is resolved and merge was successful.</a:t>
+            </a:r>
+          </a:p>
+          <a:p>
+            <a:r>
+              <a:rPr lang="en-US" dirty="0"/>
+              <a:t>Run </a:t>
+            </a:r>
+            <a:r>
+              <a:rPr lang="en-US" dirty="0">
+                <a:latin typeface="Consolas" panose="020B0609020204030204" pitchFamily="49" charset="0"/>
+              </a:rPr>
+              <a:t>‘git branch --merged’ </a:t>
+            </a:r>
+            <a:r>
+              <a:rPr lang="en-US" dirty="0"/>
+              <a:t>and this merged branch will be listed there.</a:t>
+            </a:r>
+          </a:p>
+          <a:p>
+            <a:r>
+              <a:rPr lang="en-US" dirty="0"/>
+              <a:t>Run </a:t>
+            </a:r>
+            <a:r>
+              <a:rPr lang="en-US" dirty="0">
+                <a:latin typeface="Consolas" panose="020B0609020204030204" pitchFamily="49" charset="0"/>
+              </a:rPr>
+              <a:t>‘git log --color --graph --all’ </a:t>
+            </a:r>
+            <a:r>
+              <a:rPr lang="en-US" dirty="0"/>
+              <a:t>to see who merged was performed.</a:t>
+            </a:r>
+          </a:p>
+          <a:p>
+            <a:endParaRPr lang="en-US" dirty="0"/>
+          </a:p>
+          <a:p>
+            <a:r>
+              <a:rPr lang="en-US" dirty="0"/>
+              <a:t>Explanation on white board!</a:t>
+            </a:r>
+          </a:p>
+        </p:txBody>
+      </p:sp>
+    </p:spTree>
+    <p:extLst>
+      <p:ext uri="{BB962C8B-B14F-4D97-AF65-F5344CB8AC3E}">
+        <p14:creationId xmlns:p14="http://schemas.microsoft.com/office/powerpoint/2010/main" val="2039128749"/>
+      </p:ext>
+    </p:extLst>
+  </p:cSld>
+  <p:clrMapOvr>
+    <a:masterClrMapping/>
+  </p:clrMapOvr>
+</p:sld>
+</file>
+
+<file path=ppt/slides/slide61.xml><?xml version="1.0" encoding="utf-8"?>
+<p:sld xmlns:a="http://schemas.openxmlformats.org/drawingml/2006/main" xmlns:r="http://schemas.openxmlformats.org/officeDocument/2006/relationships" xmlns:p="http://schemas.openxmlformats.org/presentationml/2006/main">
+  <p:cSld>
+    <p:spTree>
+      <p:nvGrpSpPr>
+        <p:cNvPr id="1" name=""/>
+        <p:cNvGrpSpPr/>
+        <p:nvPr/>
+      </p:nvGrpSpPr>
+      <p:grpSpPr>
+        <a:xfrm>
+          <a:off x="0" y="0"/>
+          <a:ext cx="0" cy="0"/>
+          <a:chOff x="0" y="0"/>
+          <a:chExt cx="0" cy="0"/>
+        </a:xfrm>
+      </p:grpSpPr>
+      <p:sp>
+        <p:nvSpPr>
+          <p:cNvPr id="2" name="Title 1">
+            <a:extLst>
+              <a:ext uri="{FF2B5EF4-FFF2-40B4-BE49-F238E27FC236}">
                 <a16:creationId xmlns:a16="http://schemas.microsoft.com/office/drawing/2014/main" id="{36350802-6BE8-4998-8B95-EDFD6307D35C}"/>
               </a:ext>
             </a:extLst>
@@ -15527,7 +15615,7 @@
 </p:sld>
 </file>
 
-<file path=ppt/slides/slide61.xml><?xml version="1.0" encoding="utf-8"?>
+<file path=ppt/slides/slide62.xml><?xml version="1.0" encoding="utf-8"?>
 <p:sld xmlns:a="http://schemas.openxmlformats.org/drawingml/2006/main" xmlns:r="http://schemas.openxmlformats.org/officeDocument/2006/relationships" xmlns:p="http://schemas.openxmlformats.org/presentationml/2006/main">
   <p:cSld>
     <p:spTree>
@@ -15692,7 +15780,7 @@
 </p:sld>
 </file>
 
-<file path=ppt/slides/slide62.xml><?xml version="1.0" encoding="utf-8"?>
+<file path=ppt/slides/slide63.xml><?xml version="1.0" encoding="utf-8"?>
 <p:sld xmlns:a="http://schemas.openxmlformats.org/drawingml/2006/main" xmlns:r="http://schemas.openxmlformats.org/officeDocument/2006/relationships" xmlns:p="http://schemas.openxmlformats.org/presentationml/2006/main">
   <p:cSld>
     <p:spTree>
@@ -16049,7 +16137,7 @@
 </p:sld>
 </file>
 
-<file path=ppt/slides/slide63.xml><?xml version="1.0" encoding="utf-8"?>
+<file path=ppt/slides/slide64.xml><?xml version="1.0" encoding="utf-8"?>
 <p:sld xmlns:a="http://schemas.openxmlformats.org/drawingml/2006/main" xmlns:r="http://schemas.openxmlformats.org/officeDocument/2006/relationships" xmlns:p="http://schemas.openxmlformats.org/presentationml/2006/main">
   <p:cSld>
     <p:spTree>

</xml_diff>